<commit_message>
Restructure Python for trainees
</commit_message>
<xml_diff>
--- a/python_trainees/4_scikit_learn/python_traineeship_4.pptx
+++ b/python_trainees/4_scikit_learn/python_traineeship_4.pptx
@@ -9,7 +9,9 @@
     <p:sldId id="257" r:id="rId3"/>
     <p:sldId id="335" r:id="rId4"/>
     <p:sldId id="326" r:id="rId5"/>
-    <p:sldId id="336" r:id="rId6"/>
+    <p:sldId id="339" r:id="rId6"/>
+    <p:sldId id="340" r:id="rId7"/>
+    <p:sldId id="336" r:id="rId8"/>
   </p:sldIdLst>
   <p:sldSz cx="12192000" cy="6858000"/>
   <p:notesSz cx="6858000" cy="9144000"/>
@@ -265,7 +267,7 @@
           <a:p>
             <a:fld id="{5E9D55AD-DA6B-4A9D-BFE6-D0A1673E6EA9}" type="datetimeFigureOut">
               <a:rPr lang="en-NL" smtClean="0"/>
-              <a:t>09/02/2023</a:t>
+              <a:t>20/02/2023</a:t>
             </a:fld>
             <a:endParaRPr lang="en-NL"/>
           </a:p>
@@ -465,7 +467,7 @@
           <a:p>
             <a:fld id="{5E9D55AD-DA6B-4A9D-BFE6-D0A1673E6EA9}" type="datetimeFigureOut">
               <a:rPr lang="en-NL" smtClean="0"/>
-              <a:t>09/02/2023</a:t>
+              <a:t>20/02/2023</a:t>
             </a:fld>
             <a:endParaRPr lang="en-NL"/>
           </a:p>
@@ -675,7 +677,7 @@
           <a:p>
             <a:fld id="{5E9D55AD-DA6B-4A9D-BFE6-D0A1673E6EA9}" type="datetimeFigureOut">
               <a:rPr lang="en-NL" smtClean="0"/>
-              <a:t>09/02/2023</a:t>
+              <a:t>20/02/2023</a:t>
             </a:fld>
             <a:endParaRPr lang="en-NL"/>
           </a:p>
@@ -875,7 +877,7 @@
           <a:p>
             <a:fld id="{5E9D55AD-DA6B-4A9D-BFE6-D0A1673E6EA9}" type="datetimeFigureOut">
               <a:rPr lang="en-NL" smtClean="0"/>
-              <a:t>09/02/2023</a:t>
+              <a:t>20/02/2023</a:t>
             </a:fld>
             <a:endParaRPr lang="en-NL"/>
           </a:p>
@@ -1151,7 +1153,7 @@
           <a:p>
             <a:fld id="{5E9D55AD-DA6B-4A9D-BFE6-D0A1673E6EA9}" type="datetimeFigureOut">
               <a:rPr lang="en-NL" smtClean="0"/>
-              <a:t>09/02/2023</a:t>
+              <a:t>20/02/2023</a:t>
             </a:fld>
             <a:endParaRPr lang="en-NL"/>
           </a:p>
@@ -1419,7 +1421,7 @@
           <a:p>
             <a:fld id="{5E9D55AD-DA6B-4A9D-BFE6-D0A1673E6EA9}" type="datetimeFigureOut">
               <a:rPr lang="en-NL" smtClean="0"/>
-              <a:t>09/02/2023</a:t>
+              <a:t>20/02/2023</a:t>
             </a:fld>
             <a:endParaRPr lang="en-NL"/>
           </a:p>
@@ -1834,7 +1836,7 @@
           <a:p>
             <a:fld id="{5E9D55AD-DA6B-4A9D-BFE6-D0A1673E6EA9}" type="datetimeFigureOut">
               <a:rPr lang="en-NL" smtClean="0"/>
-              <a:t>09/02/2023</a:t>
+              <a:t>20/02/2023</a:t>
             </a:fld>
             <a:endParaRPr lang="en-NL"/>
           </a:p>
@@ -1976,7 +1978,7 @@
           <a:p>
             <a:fld id="{5E9D55AD-DA6B-4A9D-BFE6-D0A1673E6EA9}" type="datetimeFigureOut">
               <a:rPr lang="en-NL" smtClean="0"/>
-              <a:t>09/02/2023</a:t>
+              <a:t>20/02/2023</a:t>
             </a:fld>
             <a:endParaRPr lang="en-NL"/>
           </a:p>
@@ -2089,7 +2091,7 @@
           <a:p>
             <a:fld id="{5E9D55AD-DA6B-4A9D-BFE6-D0A1673E6EA9}" type="datetimeFigureOut">
               <a:rPr lang="en-NL" smtClean="0"/>
-              <a:t>09/02/2023</a:t>
+              <a:t>20/02/2023</a:t>
             </a:fld>
             <a:endParaRPr lang="en-NL"/>
           </a:p>
@@ -2402,7 +2404,7 @@
           <a:p>
             <a:fld id="{5E9D55AD-DA6B-4A9D-BFE6-D0A1673E6EA9}" type="datetimeFigureOut">
               <a:rPr lang="en-NL" smtClean="0"/>
-              <a:t>09/02/2023</a:t>
+              <a:t>20/02/2023</a:t>
             </a:fld>
             <a:endParaRPr lang="en-NL"/>
           </a:p>
@@ -2691,7 +2693,7 @@
           <a:p>
             <a:fld id="{5E9D55AD-DA6B-4A9D-BFE6-D0A1673E6EA9}" type="datetimeFigureOut">
               <a:rPr lang="en-NL" smtClean="0"/>
-              <a:t>09/02/2023</a:t>
+              <a:t>20/02/2023</a:t>
             </a:fld>
             <a:endParaRPr lang="en-NL"/>
           </a:p>
@@ -2934,7 +2936,7 @@
           <a:p>
             <a:fld id="{5E9D55AD-DA6B-4A9D-BFE6-D0A1673E6EA9}" type="datetimeFigureOut">
               <a:rPr lang="en-NL" smtClean="0"/>
-              <a:t>09/02/2023</a:t>
+              <a:t>20/02/2023</a:t>
             </a:fld>
             <a:endParaRPr lang="en-NL"/>
           </a:p>
@@ -4379,7 +4381,7 @@
           <a:p>
             <a:r>
               <a:rPr lang="nl-NL" sz="3600" noProof="0" dirty="0"/>
-              <a:t>Overzicht API</a:t>
+              <a:t>Modelleer proces</a:t>
             </a:r>
           </a:p>
         </p:txBody>
@@ -4398,8 +4400,8 @@
         </p:nvSpPr>
         <p:spPr>
           <a:xfrm>
-            <a:off x="838200" y="1373511"/>
-            <a:ext cx="3208638" cy="2407657"/>
+            <a:off x="838200" y="1373512"/>
+            <a:ext cx="2423984" cy="1610646"/>
           </a:xfrm>
           <a:prstGeom prst="rect">
             <a:avLst/>
@@ -4407,13 +4409,13 @@
         </p:spPr>
         <p:style>
           <a:lnRef idx="1">
-            <a:schemeClr val="accent3"/>
+            <a:schemeClr val="accent4"/>
           </a:lnRef>
           <a:fillRef idx="2">
-            <a:schemeClr val="accent3"/>
+            <a:schemeClr val="accent4"/>
           </a:fillRef>
           <a:effectRef idx="1">
-            <a:schemeClr val="accent3"/>
+            <a:schemeClr val="accent4"/>
           </a:effectRef>
           <a:fontRef idx="minor">
             <a:schemeClr val="dk1"/>
@@ -4425,10 +4427,10 @@
           <a:p>
             <a:pPr algn="ctr"/>
             <a:r>
-              <a:rPr lang="en-US" dirty="0"/>
-              <a:t>Transformers</a:t>
-            </a:r>
-            <a:endParaRPr lang="en-NL" dirty="0"/>
+              <a:rPr lang="en-US" b="1" dirty="0"/>
+              <a:t>Data preparation</a:t>
+            </a:r>
+            <a:endParaRPr lang="en-NL" b="1" dirty="0"/>
           </a:p>
         </p:txBody>
       </p:sp>
@@ -4446,8 +4448,8 @@
         </p:nvSpPr>
         <p:spPr>
           <a:xfrm>
-            <a:off x="3343875" y="2387714"/>
-            <a:ext cx="3208638" cy="2407657"/>
+            <a:off x="3535405" y="2507635"/>
+            <a:ext cx="2423984" cy="1610646"/>
           </a:xfrm>
           <a:prstGeom prst="rect">
             <a:avLst/>
@@ -4455,13 +4457,13 @@
         </p:spPr>
         <p:style>
           <a:lnRef idx="1">
-            <a:schemeClr val="accent3"/>
+            <a:schemeClr val="accent5"/>
           </a:lnRef>
           <a:fillRef idx="2">
-            <a:schemeClr val="accent3"/>
+            <a:schemeClr val="accent5"/>
           </a:fillRef>
           <a:effectRef idx="1">
-            <a:schemeClr val="accent3"/>
+            <a:schemeClr val="accent5"/>
           </a:effectRef>
           <a:fontRef idx="minor">
             <a:schemeClr val="dk1"/>
@@ -4473,10 +4475,10 @@
           <a:p>
             <a:pPr algn="ctr"/>
             <a:r>
-              <a:rPr lang="en-US" dirty="0"/>
-              <a:t>Estimators</a:t>
-            </a:r>
-            <a:endParaRPr lang="en-NL" dirty="0"/>
+              <a:rPr lang="en-US" b="1" dirty="0"/>
+              <a:t>Model building</a:t>
+            </a:r>
+            <a:endParaRPr lang="en-NL" b="1" dirty="0"/>
           </a:p>
         </p:txBody>
       </p:sp>
@@ -4494,8 +4496,8 @@
         </p:nvSpPr>
         <p:spPr>
           <a:xfrm>
-            <a:off x="5849550" y="3165234"/>
-            <a:ext cx="3208638" cy="2407657"/>
+            <a:off x="6232610" y="3641758"/>
+            <a:ext cx="2423984" cy="1610646"/>
           </a:xfrm>
           <a:prstGeom prst="rect">
             <a:avLst/>
@@ -4503,13 +4505,13 @@
         </p:spPr>
         <p:style>
           <a:lnRef idx="1">
-            <a:schemeClr val="accent3"/>
+            <a:schemeClr val="accent6"/>
           </a:lnRef>
           <a:fillRef idx="2">
-            <a:schemeClr val="accent3"/>
+            <a:schemeClr val="accent6"/>
           </a:fillRef>
           <a:effectRef idx="1">
-            <a:schemeClr val="accent3"/>
+            <a:schemeClr val="accent6"/>
           </a:effectRef>
           <a:fontRef idx="minor">
             <a:schemeClr val="dk1"/>
@@ -4521,10 +4523,10 @@
           <a:p>
             <a:pPr algn="ctr"/>
             <a:r>
-              <a:rPr lang="en-US" dirty="0"/>
-              <a:t>Selection / Validation</a:t>
-            </a:r>
-            <a:endParaRPr lang="en-NL" dirty="0"/>
+              <a:rPr lang="en-US" b="1" dirty="0"/>
+              <a:t>Model validation</a:t>
+            </a:r>
+            <a:endParaRPr lang="en-NL" b="1" dirty="0"/>
           </a:p>
         </p:txBody>
       </p:sp>
@@ -4542,8 +4544,8 @@
         </p:nvSpPr>
         <p:spPr>
           <a:xfrm>
-            <a:off x="8355226" y="4223654"/>
-            <a:ext cx="3208638" cy="2407657"/>
+            <a:off x="8929816" y="4775881"/>
+            <a:ext cx="2423984" cy="1610646"/>
           </a:xfrm>
           <a:prstGeom prst="rect">
             <a:avLst/>
@@ -4551,13 +4553,13 @@
         </p:spPr>
         <p:style>
           <a:lnRef idx="1">
-            <a:schemeClr val="accent3"/>
+            <a:schemeClr val="accent2"/>
           </a:lnRef>
           <a:fillRef idx="2">
-            <a:schemeClr val="accent3"/>
+            <a:schemeClr val="accent2"/>
           </a:fillRef>
           <a:effectRef idx="1">
-            <a:schemeClr val="accent3"/>
+            <a:schemeClr val="accent2"/>
           </a:effectRef>
           <a:fontRef idx="minor">
             <a:schemeClr val="dk1"/>
@@ -4569,10 +4571,10 @@
           <a:p>
             <a:pPr algn="ctr"/>
             <a:r>
-              <a:rPr lang="en-US" dirty="0"/>
-              <a:t>Metrics</a:t>
-            </a:r>
-            <a:endParaRPr lang="en-NL" dirty="0"/>
+              <a:rPr lang="en-US" b="1" dirty="0"/>
+              <a:t>Model selection</a:t>
+            </a:r>
+            <a:endParaRPr lang="en-NL" b="1" dirty="0"/>
           </a:p>
         </p:txBody>
       </p:sp>
@@ -4590,6 +4592,983 @@
 </file>
 
 <file path=ppt/slides/slide5.xml><?xml version="1.0" encoding="utf-8"?>
+<p:sld xmlns:a="http://schemas.openxmlformats.org/drawingml/2006/main" xmlns:r="http://schemas.openxmlformats.org/officeDocument/2006/relationships" xmlns:p="http://schemas.openxmlformats.org/presentationml/2006/main">
+  <p:cSld>
+    <p:spTree>
+      <p:nvGrpSpPr>
+        <p:cNvPr id="1" name=""/>
+        <p:cNvGrpSpPr/>
+        <p:nvPr/>
+      </p:nvGrpSpPr>
+      <p:grpSpPr>
+        <a:xfrm>
+          <a:off x="0" y="0"/>
+          <a:ext cx="0" cy="0"/>
+          <a:chOff x="0" y="0"/>
+          <a:chExt cx="0" cy="0"/>
+        </a:xfrm>
+      </p:grpSpPr>
+      <p:sp>
+        <p:nvSpPr>
+          <p:cNvPr id="2" name="Title 1">
+            <a:extLst>
+              <a:ext uri="{FF2B5EF4-FFF2-40B4-BE49-F238E27FC236}">
+                <a16:creationId xmlns:a16="http://schemas.microsoft.com/office/drawing/2014/main" id="{39A1D606-8DD1-369C-5C09-471CDD551AD5}"/>
+              </a:ext>
+            </a:extLst>
+          </p:cNvPr>
+          <p:cNvSpPr>
+            <a:spLocks noGrp="1"/>
+          </p:cNvSpPr>
+          <p:nvPr>
+            <p:ph type="title"/>
+          </p:nvPr>
+        </p:nvSpPr>
+        <p:spPr>
+          <a:xfrm>
+            <a:off x="838200" y="365126"/>
+            <a:ext cx="10515600" cy="718608"/>
+          </a:xfrm>
+        </p:spPr>
+        <p:txBody>
+          <a:bodyPr>
+            <a:normAutofit/>
+          </a:bodyPr>
+          <a:lstStyle/>
+          <a:p>
+            <a:r>
+              <a:rPr lang="nl-NL" sz="3600" noProof="0" dirty="0"/>
+              <a:t>Overzicht </a:t>
+            </a:r>
+            <a:r>
+              <a:rPr lang="nl-NL" sz="3600" noProof="0" dirty="0" err="1"/>
+              <a:t>scikit-learn</a:t>
+            </a:r>
+            <a:endParaRPr lang="nl-NL" sz="3600" noProof="0" dirty="0"/>
+          </a:p>
+        </p:txBody>
+      </p:sp>
+      <p:sp>
+        <p:nvSpPr>
+          <p:cNvPr id="6" name="Rectangle 5">
+            <a:extLst>
+              <a:ext uri="{FF2B5EF4-FFF2-40B4-BE49-F238E27FC236}">
+                <a16:creationId xmlns:a16="http://schemas.microsoft.com/office/drawing/2014/main" id="{1D38F06A-7130-AC87-179C-0C18A1AA4CA8}"/>
+              </a:ext>
+            </a:extLst>
+          </p:cNvPr>
+          <p:cNvSpPr/>
+          <p:nvPr/>
+        </p:nvSpPr>
+        <p:spPr>
+          <a:xfrm>
+            <a:off x="838200" y="1373512"/>
+            <a:ext cx="2423984" cy="1610646"/>
+          </a:xfrm>
+          <a:prstGeom prst="rect">
+            <a:avLst/>
+          </a:prstGeom>
+        </p:spPr>
+        <p:style>
+          <a:lnRef idx="1">
+            <a:schemeClr val="accent4"/>
+          </a:lnRef>
+          <a:fillRef idx="2">
+            <a:schemeClr val="accent4"/>
+          </a:fillRef>
+          <a:effectRef idx="1">
+            <a:schemeClr val="accent4"/>
+          </a:effectRef>
+          <a:fontRef idx="minor">
+            <a:schemeClr val="dk1"/>
+          </a:fontRef>
+        </p:style>
+        <p:txBody>
+          <a:bodyPr rtlCol="0" anchor="t"/>
+          <a:lstStyle/>
+          <a:p>
+            <a:pPr algn="ctr"/>
+            <a:r>
+              <a:rPr lang="en-US" b="1" dirty="0"/>
+              <a:t>Data preparation</a:t>
+            </a:r>
+          </a:p>
+          <a:p>
+            <a:pPr algn="ctr"/>
+            <a:endParaRPr lang="en-US" dirty="0"/>
+          </a:p>
+          <a:p>
+            <a:pPr marL="285750" indent="-285750">
+              <a:buFont typeface="Arial" panose="020B0604020202020204" pitchFamily="34" charset="0"/>
+              <a:buChar char="•"/>
+            </a:pPr>
+            <a:r>
+              <a:rPr lang="en-US" dirty="0"/>
+              <a:t>preprocessing</a:t>
+            </a:r>
+          </a:p>
+          <a:p>
+            <a:pPr marL="285750" indent="-285750">
+              <a:buFont typeface="Arial" panose="020B0604020202020204" pitchFamily="34" charset="0"/>
+              <a:buChar char="•"/>
+            </a:pPr>
+            <a:r>
+              <a:rPr lang="en-US" dirty="0" err="1"/>
+              <a:t>feature_extraction</a:t>
+            </a:r>
+            <a:endParaRPr lang="en-US" dirty="0"/>
+          </a:p>
+          <a:p>
+            <a:pPr marL="285750" indent="-285750">
+              <a:buFont typeface="Arial" panose="020B0604020202020204" pitchFamily="34" charset="0"/>
+              <a:buChar char="•"/>
+            </a:pPr>
+            <a:r>
+              <a:rPr lang="en-US" dirty="0"/>
+              <a:t>impute</a:t>
+            </a:r>
+          </a:p>
+        </p:txBody>
+      </p:sp>
+      <p:sp>
+        <p:nvSpPr>
+          <p:cNvPr id="7" name="Rectangle 6">
+            <a:extLst>
+              <a:ext uri="{FF2B5EF4-FFF2-40B4-BE49-F238E27FC236}">
+                <a16:creationId xmlns:a16="http://schemas.microsoft.com/office/drawing/2014/main" id="{4FCD6A8C-29D6-E5C6-1838-8B707C443CD5}"/>
+              </a:ext>
+            </a:extLst>
+          </p:cNvPr>
+          <p:cNvSpPr/>
+          <p:nvPr/>
+        </p:nvSpPr>
+        <p:spPr>
+          <a:xfrm>
+            <a:off x="3535405" y="2507635"/>
+            <a:ext cx="2423984" cy="1610646"/>
+          </a:xfrm>
+          <a:prstGeom prst="rect">
+            <a:avLst/>
+          </a:prstGeom>
+        </p:spPr>
+        <p:style>
+          <a:lnRef idx="1">
+            <a:schemeClr val="accent5"/>
+          </a:lnRef>
+          <a:fillRef idx="2">
+            <a:schemeClr val="accent5"/>
+          </a:fillRef>
+          <a:effectRef idx="1">
+            <a:schemeClr val="accent5"/>
+          </a:effectRef>
+          <a:fontRef idx="minor">
+            <a:schemeClr val="dk1"/>
+          </a:fontRef>
+        </p:style>
+        <p:txBody>
+          <a:bodyPr rtlCol="0" anchor="t"/>
+          <a:lstStyle/>
+          <a:p>
+            <a:pPr algn="ctr"/>
+            <a:r>
+              <a:rPr lang="en-US" b="1" dirty="0"/>
+              <a:t>Model building</a:t>
+            </a:r>
+            <a:endParaRPr lang="en-US" dirty="0"/>
+          </a:p>
+          <a:p>
+            <a:pPr algn="ctr"/>
+            <a:endParaRPr lang="en-US" b="1" dirty="0"/>
+          </a:p>
+          <a:p>
+            <a:pPr marL="285750" indent="-285750">
+              <a:buFont typeface="Arial" panose="020B0604020202020204" pitchFamily="34" charset="0"/>
+              <a:buChar char="•"/>
+            </a:pPr>
+            <a:r>
+              <a:rPr lang="en-US" dirty="0" err="1"/>
+              <a:t>linear_model</a:t>
+            </a:r>
+            <a:endParaRPr lang="en-US" dirty="0"/>
+          </a:p>
+          <a:p>
+            <a:pPr marL="285750" indent="-285750">
+              <a:buFont typeface="Arial" panose="020B0604020202020204" pitchFamily="34" charset="0"/>
+              <a:buChar char="•"/>
+            </a:pPr>
+            <a:r>
+              <a:rPr lang="en-US" dirty="0"/>
+              <a:t>ensemble</a:t>
+            </a:r>
+          </a:p>
+          <a:p>
+            <a:pPr marL="285750" indent="-285750">
+              <a:buFont typeface="Arial" panose="020B0604020202020204" pitchFamily="34" charset="0"/>
+              <a:buChar char="•"/>
+            </a:pPr>
+            <a:r>
+              <a:rPr lang="en-US" dirty="0"/>
+              <a:t>cluster</a:t>
+            </a:r>
+          </a:p>
+        </p:txBody>
+      </p:sp>
+      <p:sp>
+        <p:nvSpPr>
+          <p:cNvPr id="10" name="Rectangle 9">
+            <a:extLst>
+              <a:ext uri="{FF2B5EF4-FFF2-40B4-BE49-F238E27FC236}">
+                <a16:creationId xmlns:a16="http://schemas.microsoft.com/office/drawing/2014/main" id="{06AA83AA-E066-ABF0-626E-4AF185EBD422}"/>
+              </a:ext>
+            </a:extLst>
+          </p:cNvPr>
+          <p:cNvSpPr/>
+          <p:nvPr/>
+        </p:nvSpPr>
+        <p:spPr>
+          <a:xfrm>
+            <a:off x="6232610" y="3641758"/>
+            <a:ext cx="2423984" cy="1610646"/>
+          </a:xfrm>
+          <a:prstGeom prst="rect">
+            <a:avLst/>
+          </a:prstGeom>
+        </p:spPr>
+        <p:style>
+          <a:lnRef idx="1">
+            <a:schemeClr val="accent6"/>
+          </a:lnRef>
+          <a:fillRef idx="2">
+            <a:schemeClr val="accent6"/>
+          </a:fillRef>
+          <a:effectRef idx="1">
+            <a:schemeClr val="accent6"/>
+          </a:effectRef>
+          <a:fontRef idx="minor">
+            <a:schemeClr val="dk1"/>
+          </a:fontRef>
+        </p:style>
+        <p:txBody>
+          <a:bodyPr rtlCol="0" anchor="t"/>
+          <a:lstStyle/>
+          <a:p>
+            <a:pPr algn="ctr"/>
+            <a:r>
+              <a:rPr lang="en-US" b="1" dirty="0"/>
+              <a:t>Model validation</a:t>
+            </a:r>
+          </a:p>
+          <a:p>
+            <a:pPr algn="ctr"/>
+            <a:endParaRPr lang="en-US" b="1" dirty="0"/>
+          </a:p>
+          <a:p>
+            <a:pPr marL="285750" indent="-285750">
+              <a:buFont typeface="Arial" panose="020B0604020202020204" pitchFamily="34" charset="0"/>
+              <a:buChar char="•"/>
+            </a:pPr>
+            <a:r>
+              <a:rPr lang="en-US" dirty="0"/>
+              <a:t>metrics</a:t>
+            </a:r>
+            <a:endParaRPr lang="en-NL" dirty="0"/>
+          </a:p>
+        </p:txBody>
+      </p:sp>
+      <p:sp>
+        <p:nvSpPr>
+          <p:cNvPr id="11" name="Rectangle 10">
+            <a:extLst>
+              <a:ext uri="{FF2B5EF4-FFF2-40B4-BE49-F238E27FC236}">
+                <a16:creationId xmlns:a16="http://schemas.microsoft.com/office/drawing/2014/main" id="{B0473AB4-D4AF-9327-400D-5D21E3A4A256}"/>
+              </a:ext>
+            </a:extLst>
+          </p:cNvPr>
+          <p:cNvSpPr/>
+          <p:nvPr/>
+        </p:nvSpPr>
+        <p:spPr>
+          <a:xfrm>
+            <a:off x="8929816" y="4775881"/>
+            <a:ext cx="2423984" cy="1610646"/>
+          </a:xfrm>
+          <a:prstGeom prst="rect">
+            <a:avLst/>
+          </a:prstGeom>
+        </p:spPr>
+        <p:style>
+          <a:lnRef idx="1">
+            <a:schemeClr val="accent2"/>
+          </a:lnRef>
+          <a:fillRef idx="2">
+            <a:schemeClr val="accent2"/>
+          </a:fillRef>
+          <a:effectRef idx="1">
+            <a:schemeClr val="accent2"/>
+          </a:effectRef>
+          <a:fontRef idx="minor">
+            <a:schemeClr val="dk1"/>
+          </a:fontRef>
+        </p:style>
+        <p:txBody>
+          <a:bodyPr rtlCol="0" anchor="t"/>
+          <a:lstStyle/>
+          <a:p>
+            <a:pPr algn="ctr"/>
+            <a:r>
+              <a:rPr lang="en-US" b="1" dirty="0"/>
+              <a:t>Model selection</a:t>
+            </a:r>
+          </a:p>
+          <a:p>
+            <a:pPr algn="ctr"/>
+            <a:endParaRPr lang="en-US" b="1" dirty="0"/>
+          </a:p>
+          <a:p>
+            <a:pPr marL="285750" indent="-285750" algn="ctr">
+              <a:buFont typeface="Arial" panose="020B0604020202020204" pitchFamily="34" charset="0"/>
+              <a:buChar char="•"/>
+            </a:pPr>
+            <a:r>
+              <a:rPr lang="en-US" dirty="0" err="1"/>
+              <a:t>model_selection</a:t>
+            </a:r>
+            <a:endParaRPr lang="en-NL" dirty="0"/>
+          </a:p>
+        </p:txBody>
+      </p:sp>
+    </p:spTree>
+    <p:extLst>
+      <p:ext uri="{BB962C8B-B14F-4D97-AF65-F5344CB8AC3E}">
+        <p14:creationId xmlns:p14="http://schemas.microsoft.com/office/powerpoint/2010/main" val="16402976"/>
+      </p:ext>
+    </p:extLst>
+  </p:cSld>
+  <p:clrMapOvr>
+    <a:masterClrMapping/>
+  </p:clrMapOvr>
+</p:sld>
+</file>
+
+<file path=ppt/slides/slide6.xml><?xml version="1.0" encoding="utf-8"?>
+<p:sld xmlns:a="http://schemas.openxmlformats.org/drawingml/2006/main" xmlns:r="http://schemas.openxmlformats.org/officeDocument/2006/relationships" xmlns:p="http://schemas.openxmlformats.org/presentationml/2006/main">
+  <p:cSld>
+    <p:spTree>
+      <p:nvGrpSpPr>
+        <p:cNvPr id="1" name=""/>
+        <p:cNvGrpSpPr/>
+        <p:nvPr/>
+      </p:nvGrpSpPr>
+      <p:grpSpPr>
+        <a:xfrm>
+          <a:off x="0" y="0"/>
+          <a:ext cx="0" cy="0"/>
+          <a:chOff x="0" y="0"/>
+          <a:chExt cx="0" cy="0"/>
+        </a:xfrm>
+      </p:grpSpPr>
+      <p:sp>
+        <p:nvSpPr>
+          <p:cNvPr id="2" name="Title 1">
+            <a:extLst>
+              <a:ext uri="{FF2B5EF4-FFF2-40B4-BE49-F238E27FC236}">
+                <a16:creationId xmlns:a16="http://schemas.microsoft.com/office/drawing/2014/main" id="{39A1D606-8DD1-369C-5C09-471CDD551AD5}"/>
+              </a:ext>
+            </a:extLst>
+          </p:cNvPr>
+          <p:cNvSpPr>
+            <a:spLocks noGrp="1"/>
+          </p:cNvSpPr>
+          <p:nvPr>
+            <p:ph type="title"/>
+          </p:nvPr>
+        </p:nvSpPr>
+        <p:spPr>
+          <a:xfrm>
+            <a:off x="838200" y="365126"/>
+            <a:ext cx="10515600" cy="718608"/>
+          </a:xfrm>
+        </p:spPr>
+        <p:txBody>
+          <a:bodyPr>
+            <a:normAutofit/>
+          </a:bodyPr>
+          <a:lstStyle/>
+          <a:p>
+            <a:r>
+              <a:rPr lang="nl-NL" sz="3600" noProof="0" dirty="0"/>
+              <a:t>Overzicht </a:t>
+            </a:r>
+            <a:r>
+              <a:rPr lang="nl-NL" sz="3600" noProof="0" dirty="0" err="1"/>
+              <a:t>scikit-learn</a:t>
+            </a:r>
+            <a:endParaRPr lang="nl-NL" sz="3600" noProof="0" dirty="0"/>
+          </a:p>
+        </p:txBody>
+      </p:sp>
+      <p:sp>
+        <p:nvSpPr>
+          <p:cNvPr id="6" name="Rectangle 5">
+            <a:extLst>
+              <a:ext uri="{FF2B5EF4-FFF2-40B4-BE49-F238E27FC236}">
+                <a16:creationId xmlns:a16="http://schemas.microsoft.com/office/drawing/2014/main" id="{1D38F06A-7130-AC87-179C-0C18A1AA4CA8}"/>
+              </a:ext>
+            </a:extLst>
+          </p:cNvPr>
+          <p:cNvSpPr/>
+          <p:nvPr/>
+        </p:nvSpPr>
+        <p:spPr>
+          <a:xfrm>
+            <a:off x="838200" y="1373512"/>
+            <a:ext cx="2423984" cy="1610646"/>
+          </a:xfrm>
+          <a:prstGeom prst="rect">
+            <a:avLst/>
+          </a:prstGeom>
+        </p:spPr>
+        <p:style>
+          <a:lnRef idx="1">
+            <a:schemeClr val="accent4"/>
+          </a:lnRef>
+          <a:fillRef idx="2">
+            <a:schemeClr val="accent4"/>
+          </a:fillRef>
+          <a:effectRef idx="1">
+            <a:schemeClr val="accent4"/>
+          </a:effectRef>
+          <a:fontRef idx="minor">
+            <a:schemeClr val="dk1"/>
+          </a:fontRef>
+        </p:style>
+        <p:txBody>
+          <a:bodyPr rtlCol="0" anchor="t"/>
+          <a:lstStyle/>
+          <a:p>
+            <a:pPr algn="ctr"/>
+            <a:r>
+              <a:rPr lang="en-US" b="1" dirty="0"/>
+              <a:t>Data preparation</a:t>
+            </a:r>
+          </a:p>
+          <a:p>
+            <a:pPr algn="ctr"/>
+            <a:endParaRPr lang="en-US" dirty="0"/>
+          </a:p>
+          <a:p>
+            <a:pPr marL="285750" indent="-285750">
+              <a:buFont typeface="Arial" panose="020B0604020202020204" pitchFamily="34" charset="0"/>
+              <a:buChar char="•"/>
+            </a:pPr>
+            <a:r>
+              <a:rPr lang="en-US" dirty="0"/>
+              <a:t>preprocessing</a:t>
+            </a:r>
+          </a:p>
+          <a:p>
+            <a:pPr marL="285750" indent="-285750">
+              <a:buFont typeface="Arial" panose="020B0604020202020204" pitchFamily="34" charset="0"/>
+              <a:buChar char="•"/>
+            </a:pPr>
+            <a:r>
+              <a:rPr lang="en-US" dirty="0" err="1"/>
+              <a:t>feature_extraction</a:t>
+            </a:r>
+            <a:endParaRPr lang="en-US" dirty="0"/>
+          </a:p>
+          <a:p>
+            <a:pPr marL="285750" indent="-285750">
+              <a:buFont typeface="Arial" panose="020B0604020202020204" pitchFamily="34" charset="0"/>
+              <a:buChar char="•"/>
+            </a:pPr>
+            <a:r>
+              <a:rPr lang="en-US" dirty="0"/>
+              <a:t>impute</a:t>
+            </a:r>
+          </a:p>
+        </p:txBody>
+      </p:sp>
+      <p:sp>
+        <p:nvSpPr>
+          <p:cNvPr id="7" name="Rectangle 6">
+            <a:extLst>
+              <a:ext uri="{FF2B5EF4-FFF2-40B4-BE49-F238E27FC236}">
+                <a16:creationId xmlns:a16="http://schemas.microsoft.com/office/drawing/2014/main" id="{4FCD6A8C-29D6-E5C6-1838-8B707C443CD5}"/>
+              </a:ext>
+            </a:extLst>
+          </p:cNvPr>
+          <p:cNvSpPr/>
+          <p:nvPr/>
+        </p:nvSpPr>
+        <p:spPr>
+          <a:xfrm>
+            <a:off x="3535405" y="2507635"/>
+            <a:ext cx="2423984" cy="1610646"/>
+          </a:xfrm>
+          <a:prstGeom prst="rect">
+            <a:avLst/>
+          </a:prstGeom>
+        </p:spPr>
+        <p:style>
+          <a:lnRef idx="1">
+            <a:schemeClr val="accent5"/>
+          </a:lnRef>
+          <a:fillRef idx="2">
+            <a:schemeClr val="accent5"/>
+          </a:fillRef>
+          <a:effectRef idx="1">
+            <a:schemeClr val="accent5"/>
+          </a:effectRef>
+          <a:fontRef idx="minor">
+            <a:schemeClr val="dk1"/>
+          </a:fontRef>
+        </p:style>
+        <p:txBody>
+          <a:bodyPr rtlCol="0" anchor="t"/>
+          <a:lstStyle/>
+          <a:p>
+            <a:pPr algn="ctr"/>
+            <a:r>
+              <a:rPr lang="en-US" b="1" dirty="0"/>
+              <a:t>Model building</a:t>
+            </a:r>
+            <a:endParaRPr lang="en-US" dirty="0"/>
+          </a:p>
+          <a:p>
+            <a:pPr algn="ctr"/>
+            <a:endParaRPr lang="en-US" b="1" dirty="0"/>
+          </a:p>
+          <a:p>
+            <a:pPr marL="285750" indent="-285750">
+              <a:buFont typeface="Arial" panose="020B0604020202020204" pitchFamily="34" charset="0"/>
+              <a:buChar char="•"/>
+            </a:pPr>
+            <a:r>
+              <a:rPr lang="en-US" dirty="0" err="1"/>
+              <a:t>linear_model</a:t>
+            </a:r>
+            <a:endParaRPr lang="en-US" dirty="0"/>
+          </a:p>
+          <a:p>
+            <a:pPr marL="285750" indent="-285750">
+              <a:buFont typeface="Arial" panose="020B0604020202020204" pitchFamily="34" charset="0"/>
+              <a:buChar char="•"/>
+            </a:pPr>
+            <a:r>
+              <a:rPr lang="en-US" dirty="0"/>
+              <a:t>ensemble</a:t>
+            </a:r>
+          </a:p>
+          <a:p>
+            <a:pPr marL="285750" indent="-285750">
+              <a:buFont typeface="Arial" panose="020B0604020202020204" pitchFamily="34" charset="0"/>
+              <a:buChar char="•"/>
+            </a:pPr>
+            <a:r>
+              <a:rPr lang="en-US" dirty="0"/>
+              <a:t>cluster</a:t>
+            </a:r>
+          </a:p>
+        </p:txBody>
+      </p:sp>
+      <p:sp>
+        <p:nvSpPr>
+          <p:cNvPr id="10" name="Rectangle 9">
+            <a:extLst>
+              <a:ext uri="{FF2B5EF4-FFF2-40B4-BE49-F238E27FC236}">
+                <a16:creationId xmlns:a16="http://schemas.microsoft.com/office/drawing/2014/main" id="{06AA83AA-E066-ABF0-626E-4AF185EBD422}"/>
+              </a:ext>
+            </a:extLst>
+          </p:cNvPr>
+          <p:cNvSpPr/>
+          <p:nvPr/>
+        </p:nvSpPr>
+        <p:spPr>
+          <a:xfrm>
+            <a:off x="6232610" y="3641758"/>
+            <a:ext cx="2423984" cy="1610646"/>
+          </a:xfrm>
+          <a:prstGeom prst="rect">
+            <a:avLst/>
+          </a:prstGeom>
+        </p:spPr>
+        <p:style>
+          <a:lnRef idx="1">
+            <a:schemeClr val="accent6"/>
+          </a:lnRef>
+          <a:fillRef idx="2">
+            <a:schemeClr val="accent6"/>
+          </a:fillRef>
+          <a:effectRef idx="1">
+            <a:schemeClr val="accent6"/>
+          </a:effectRef>
+          <a:fontRef idx="minor">
+            <a:schemeClr val="dk1"/>
+          </a:fontRef>
+        </p:style>
+        <p:txBody>
+          <a:bodyPr rtlCol="0" anchor="t"/>
+          <a:lstStyle/>
+          <a:p>
+            <a:pPr algn="ctr"/>
+            <a:r>
+              <a:rPr lang="en-US" b="1" dirty="0"/>
+              <a:t>Model validation</a:t>
+            </a:r>
+          </a:p>
+          <a:p>
+            <a:pPr algn="ctr"/>
+            <a:endParaRPr lang="en-US" b="1" dirty="0"/>
+          </a:p>
+          <a:p>
+            <a:pPr marL="285750" indent="-285750">
+              <a:buFont typeface="Arial" panose="020B0604020202020204" pitchFamily="34" charset="0"/>
+              <a:buChar char="•"/>
+            </a:pPr>
+            <a:r>
+              <a:rPr lang="en-US" dirty="0"/>
+              <a:t>metrics</a:t>
+            </a:r>
+            <a:endParaRPr lang="en-NL" dirty="0"/>
+          </a:p>
+        </p:txBody>
+      </p:sp>
+      <p:sp>
+        <p:nvSpPr>
+          <p:cNvPr id="11" name="Rectangle 10">
+            <a:extLst>
+              <a:ext uri="{FF2B5EF4-FFF2-40B4-BE49-F238E27FC236}">
+                <a16:creationId xmlns:a16="http://schemas.microsoft.com/office/drawing/2014/main" id="{B0473AB4-D4AF-9327-400D-5D21E3A4A256}"/>
+              </a:ext>
+            </a:extLst>
+          </p:cNvPr>
+          <p:cNvSpPr/>
+          <p:nvPr/>
+        </p:nvSpPr>
+        <p:spPr>
+          <a:xfrm>
+            <a:off x="8929816" y="4775881"/>
+            <a:ext cx="2423984" cy="1610646"/>
+          </a:xfrm>
+          <a:prstGeom prst="rect">
+            <a:avLst/>
+          </a:prstGeom>
+        </p:spPr>
+        <p:style>
+          <a:lnRef idx="1">
+            <a:schemeClr val="accent2"/>
+          </a:lnRef>
+          <a:fillRef idx="2">
+            <a:schemeClr val="accent2"/>
+          </a:fillRef>
+          <a:effectRef idx="1">
+            <a:schemeClr val="accent2"/>
+          </a:effectRef>
+          <a:fontRef idx="minor">
+            <a:schemeClr val="dk1"/>
+          </a:fontRef>
+        </p:style>
+        <p:txBody>
+          <a:bodyPr rtlCol="0" anchor="t"/>
+          <a:lstStyle/>
+          <a:p>
+            <a:pPr algn="ctr"/>
+            <a:r>
+              <a:rPr lang="en-US" b="1" dirty="0"/>
+              <a:t>Model selection</a:t>
+            </a:r>
+          </a:p>
+          <a:p>
+            <a:pPr algn="ctr"/>
+            <a:endParaRPr lang="en-US" b="1" dirty="0"/>
+          </a:p>
+          <a:p>
+            <a:pPr marL="285750" indent="-285750" algn="ctr">
+              <a:buFont typeface="Arial" panose="020B0604020202020204" pitchFamily="34" charset="0"/>
+              <a:buChar char="•"/>
+            </a:pPr>
+            <a:r>
+              <a:rPr lang="en-US" dirty="0" err="1"/>
+              <a:t>model_selection</a:t>
+            </a:r>
+            <a:endParaRPr lang="en-NL" dirty="0"/>
+          </a:p>
+        </p:txBody>
+      </p:sp>
+      <p:sp>
+        <p:nvSpPr>
+          <p:cNvPr id="5" name="Rectangle: Rounded Corners 4">
+            <a:extLst>
+              <a:ext uri="{FF2B5EF4-FFF2-40B4-BE49-F238E27FC236}">
+                <a16:creationId xmlns:a16="http://schemas.microsoft.com/office/drawing/2014/main" id="{3C976759-59E6-791E-895E-3D33EED4BAB9}"/>
+              </a:ext>
+            </a:extLst>
+          </p:cNvPr>
+          <p:cNvSpPr/>
+          <p:nvPr/>
+        </p:nvSpPr>
+        <p:spPr>
+          <a:xfrm>
+            <a:off x="1027670" y="3435178"/>
+            <a:ext cx="2045043" cy="1062681"/>
+          </a:xfrm>
+          <a:prstGeom prst="roundRect">
+            <a:avLst/>
+          </a:prstGeom>
+          <a:noFill/>
+        </p:spPr>
+        <p:style>
+          <a:lnRef idx="2">
+            <a:schemeClr val="accent1">
+              <a:shade val="50000"/>
+            </a:schemeClr>
+          </a:lnRef>
+          <a:fillRef idx="1">
+            <a:schemeClr val="accent1"/>
+          </a:fillRef>
+          <a:effectRef idx="0">
+            <a:schemeClr val="accent1"/>
+          </a:effectRef>
+          <a:fontRef idx="minor">
+            <a:schemeClr val="lt1"/>
+          </a:fontRef>
+        </p:style>
+        <p:txBody>
+          <a:bodyPr rtlCol="0" anchor="ctr"/>
+          <a:lstStyle/>
+          <a:p>
+            <a:pPr algn="ctr"/>
+            <a:r>
+              <a:rPr lang="en-US" b="1" dirty="0">
+                <a:solidFill>
+                  <a:schemeClr val="tx1"/>
+                </a:solidFill>
+              </a:rPr>
+              <a:t>Transformers</a:t>
+            </a:r>
+          </a:p>
+          <a:p>
+            <a:pPr marL="285750" indent="-285750">
+              <a:buFont typeface="Arial" panose="020B0604020202020204" pitchFamily="34" charset="0"/>
+              <a:buChar char="•"/>
+            </a:pPr>
+            <a:r>
+              <a:rPr lang="en-US" dirty="0">
+                <a:solidFill>
+                  <a:schemeClr val="tx1"/>
+                </a:solidFill>
+              </a:rPr>
+              <a:t>fit()</a:t>
+            </a:r>
+          </a:p>
+          <a:p>
+            <a:pPr marL="285750" indent="-285750">
+              <a:buFont typeface="Arial" panose="020B0604020202020204" pitchFamily="34" charset="0"/>
+              <a:buChar char="•"/>
+            </a:pPr>
+            <a:r>
+              <a:rPr lang="en-US" dirty="0">
+                <a:solidFill>
+                  <a:schemeClr val="tx1"/>
+                </a:solidFill>
+              </a:rPr>
+              <a:t>transform()</a:t>
+            </a:r>
+            <a:endParaRPr lang="en-NL" dirty="0">
+              <a:solidFill>
+                <a:schemeClr val="tx1"/>
+              </a:solidFill>
+            </a:endParaRPr>
+          </a:p>
+        </p:txBody>
+      </p:sp>
+      <p:cxnSp>
+        <p:nvCxnSpPr>
+          <p:cNvPr id="9" name="Straight Arrow Connector 8">
+            <a:extLst>
+              <a:ext uri="{FF2B5EF4-FFF2-40B4-BE49-F238E27FC236}">
+                <a16:creationId xmlns:a16="http://schemas.microsoft.com/office/drawing/2014/main" id="{A53A23B4-4F3D-704D-183A-F13654888F67}"/>
+              </a:ext>
+            </a:extLst>
+          </p:cNvPr>
+          <p:cNvCxnSpPr>
+            <a:cxnSpLocks/>
+            <a:stCxn id="6" idx="2"/>
+            <a:endCxn id="5" idx="0"/>
+          </p:cNvCxnSpPr>
+          <p:nvPr/>
+        </p:nvCxnSpPr>
+        <p:spPr>
+          <a:xfrm>
+            <a:off x="2050192" y="2984158"/>
+            <a:ext cx="0" cy="451020"/>
+          </a:xfrm>
+          <a:prstGeom prst="straightConnector1">
+            <a:avLst/>
+          </a:prstGeom>
+          <a:ln>
+            <a:tailEnd type="triangle"/>
+          </a:ln>
+        </p:spPr>
+        <p:style>
+          <a:lnRef idx="3">
+            <a:schemeClr val="dk1"/>
+          </a:lnRef>
+          <a:fillRef idx="0">
+            <a:schemeClr val="dk1"/>
+          </a:fillRef>
+          <a:effectRef idx="2">
+            <a:schemeClr val="dk1"/>
+          </a:effectRef>
+          <a:fontRef idx="minor">
+            <a:schemeClr val="tx1"/>
+          </a:fontRef>
+        </p:style>
+      </p:cxnSp>
+      <p:sp>
+        <p:nvSpPr>
+          <p:cNvPr id="12" name="Rectangle: Rounded Corners 11">
+            <a:extLst>
+              <a:ext uri="{FF2B5EF4-FFF2-40B4-BE49-F238E27FC236}">
+                <a16:creationId xmlns:a16="http://schemas.microsoft.com/office/drawing/2014/main" id="{9F5FDA7C-9972-E89A-E01D-AD9300872448}"/>
+              </a:ext>
+            </a:extLst>
+          </p:cNvPr>
+          <p:cNvSpPr/>
+          <p:nvPr/>
+        </p:nvSpPr>
+        <p:spPr>
+          <a:xfrm>
+            <a:off x="3724875" y="4549414"/>
+            <a:ext cx="2045043" cy="1062681"/>
+          </a:xfrm>
+          <a:prstGeom prst="roundRect">
+            <a:avLst/>
+          </a:prstGeom>
+          <a:noFill/>
+        </p:spPr>
+        <p:style>
+          <a:lnRef idx="2">
+            <a:schemeClr val="accent1">
+              <a:shade val="50000"/>
+            </a:schemeClr>
+          </a:lnRef>
+          <a:fillRef idx="1">
+            <a:schemeClr val="accent1"/>
+          </a:fillRef>
+          <a:effectRef idx="0">
+            <a:schemeClr val="accent1"/>
+          </a:effectRef>
+          <a:fontRef idx="minor">
+            <a:schemeClr val="lt1"/>
+          </a:fontRef>
+        </p:style>
+        <p:txBody>
+          <a:bodyPr rtlCol="0" anchor="ctr"/>
+          <a:lstStyle/>
+          <a:p>
+            <a:pPr algn="ctr"/>
+            <a:r>
+              <a:rPr lang="en-US" b="1" dirty="0">
+                <a:solidFill>
+                  <a:schemeClr val="tx1"/>
+                </a:solidFill>
+              </a:rPr>
+              <a:t>Estimators</a:t>
+            </a:r>
+          </a:p>
+          <a:p>
+            <a:pPr marL="285750" indent="-285750">
+              <a:buFont typeface="Arial" panose="020B0604020202020204" pitchFamily="34" charset="0"/>
+              <a:buChar char="•"/>
+            </a:pPr>
+            <a:r>
+              <a:rPr lang="en-US" dirty="0">
+                <a:solidFill>
+                  <a:schemeClr val="tx1"/>
+                </a:solidFill>
+              </a:rPr>
+              <a:t>fit()</a:t>
+            </a:r>
+          </a:p>
+          <a:p>
+            <a:pPr marL="285750" indent="-285750">
+              <a:buFont typeface="Arial" panose="020B0604020202020204" pitchFamily="34" charset="0"/>
+              <a:buChar char="•"/>
+            </a:pPr>
+            <a:r>
+              <a:rPr lang="en-US" dirty="0">
+                <a:solidFill>
+                  <a:schemeClr val="tx1"/>
+                </a:solidFill>
+              </a:rPr>
+              <a:t>predict()</a:t>
+            </a:r>
+            <a:endParaRPr lang="en-NL" dirty="0">
+              <a:solidFill>
+                <a:schemeClr val="tx1"/>
+              </a:solidFill>
+            </a:endParaRPr>
+          </a:p>
+        </p:txBody>
+      </p:sp>
+      <p:cxnSp>
+        <p:nvCxnSpPr>
+          <p:cNvPr id="15" name="Straight Arrow Connector 14">
+            <a:extLst>
+              <a:ext uri="{FF2B5EF4-FFF2-40B4-BE49-F238E27FC236}">
+                <a16:creationId xmlns:a16="http://schemas.microsoft.com/office/drawing/2014/main" id="{074E69CA-4CA1-28A4-5D35-5E7AF725DF6D}"/>
+              </a:ext>
+            </a:extLst>
+          </p:cNvPr>
+          <p:cNvCxnSpPr>
+            <a:stCxn id="7" idx="2"/>
+            <a:endCxn id="12" idx="0"/>
+          </p:cNvCxnSpPr>
+          <p:nvPr/>
+        </p:nvCxnSpPr>
+        <p:spPr>
+          <a:xfrm>
+            <a:off x="4747397" y="4118281"/>
+            <a:ext cx="0" cy="431133"/>
+          </a:xfrm>
+          <a:prstGeom prst="straightConnector1">
+            <a:avLst/>
+          </a:prstGeom>
+          <a:ln>
+            <a:tailEnd type="triangle"/>
+          </a:ln>
+        </p:spPr>
+        <p:style>
+          <a:lnRef idx="3">
+            <a:schemeClr val="dk1"/>
+          </a:lnRef>
+          <a:fillRef idx="0">
+            <a:schemeClr val="dk1"/>
+          </a:fillRef>
+          <a:effectRef idx="2">
+            <a:schemeClr val="dk1"/>
+          </a:effectRef>
+          <a:fontRef idx="minor">
+            <a:schemeClr val="tx1"/>
+          </a:fontRef>
+        </p:style>
+      </p:cxnSp>
+    </p:spTree>
+    <p:extLst>
+      <p:ext uri="{BB962C8B-B14F-4D97-AF65-F5344CB8AC3E}">
+        <p14:creationId xmlns:p14="http://schemas.microsoft.com/office/powerpoint/2010/main" val="2417014085"/>
+      </p:ext>
+    </p:extLst>
+  </p:cSld>
+  <p:clrMapOvr>
+    <a:masterClrMapping/>
+  </p:clrMapOvr>
+</p:sld>
+</file>
+
+<file path=ppt/slides/slide7.xml><?xml version="1.0" encoding="utf-8"?>
 <p:sld xmlns:a="http://schemas.openxmlformats.org/drawingml/2006/main" xmlns:r="http://schemas.openxmlformats.org/officeDocument/2006/relationships" xmlns:p="http://schemas.openxmlformats.org/presentationml/2006/main">
   <p:cSld>
     <p:spTree>

</xml_diff>

<commit_message>
Update Python trainees part 4
</commit_message>
<xml_diff>
--- a/python_trainees/4_scikit_learn/python_traineeship_4.pptx
+++ b/python_trainees/4_scikit_learn/python_traineeship_4.pptx
@@ -20,9 +20,15 @@
     <p:sldId id="353" r:id="rId14"/>
     <p:sldId id="354" r:id="rId15"/>
     <p:sldId id="344" r:id="rId16"/>
-    <p:sldId id="345" r:id="rId17"/>
-    <p:sldId id="346" r:id="rId18"/>
-    <p:sldId id="336" r:id="rId19"/>
+    <p:sldId id="355" r:id="rId17"/>
+    <p:sldId id="356" r:id="rId18"/>
+    <p:sldId id="357" r:id="rId19"/>
+    <p:sldId id="345" r:id="rId20"/>
+    <p:sldId id="358" r:id="rId21"/>
+    <p:sldId id="359" r:id="rId22"/>
+    <p:sldId id="360" r:id="rId23"/>
+    <p:sldId id="346" r:id="rId24"/>
+    <p:sldId id="336" r:id="rId25"/>
   </p:sldIdLst>
   <p:sldSz cx="12192000" cy="6858000"/>
   <p:notesSz cx="6858000" cy="9144000"/>
@@ -278,7 +284,7 @@
           <a:p>
             <a:fld id="{5E9D55AD-DA6B-4A9D-BFE6-D0A1673E6EA9}" type="datetimeFigureOut">
               <a:rPr lang="en-NL" smtClean="0"/>
-              <a:t>06/04/2023</a:t>
+              <a:t>07/04/2023</a:t>
             </a:fld>
             <a:endParaRPr lang="en-NL"/>
           </a:p>
@@ -478,7 +484,7 @@
           <a:p>
             <a:fld id="{5E9D55AD-DA6B-4A9D-BFE6-D0A1673E6EA9}" type="datetimeFigureOut">
               <a:rPr lang="en-NL" smtClean="0"/>
-              <a:t>06/04/2023</a:t>
+              <a:t>07/04/2023</a:t>
             </a:fld>
             <a:endParaRPr lang="en-NL"/>
           </a:p>
@@ -688,7 +694,7 @@
           <a:p>
             <a:fld id="{5E9D55AD-DA6B-4A9D-BFE6-D0A1673E6EA9}" type="datetimeFigureOut">
               <a:rPr lang="en-NL" smtClean="0"/>
-              <a:t>06/04/2023</a:t>
+              <a:t>07/04/2023</a:t>
             </a:fld>
             <a:endParaRPr lang="en-NL"/>
           </a:p>
@@ -888,7 +894,7 @@
           <a:p>
             <a:fld id="{5E9D55AD-DA6B-4A9D-BFE6-D0A1673E6EA9}" type="datetimeFigureOut">
               <a:rPr lang="en-NL" smtClean="0"/>
-              <a:t>06/04/2023</a:t>
+              <a:t>07/04/2023</a:t>
             </a:fld>
             <a:endParaRPr lang="en-NL"/>
           </a:p>
@@ -1164,7 +1170,7 @@
           <a:p>
             <a:fld id="{5E9D55AD-DA6B-4A9D-BFE6-D0A1673E6EA9}" type="datetimeFigureOut">
               <a:rPr lang="en-NL" smtClean="0"/>
-              <a:t>06/04/2023</a:t>
+              <a:t>07/04/2023</a:t>
             </a:fld>
             <a:endParaRPr lang="en-NL"/>
           </a:p>
@@ -1432,7 +1438,7 @@
           <a:p>
             <a:fld id="{5E9D55AD-DA6B-4A9D-BFE6-D0A1673E6EA9}" type="datetimeFigureOut">
               <a:rPr lang="en-NL" smtClean="0"/>
-              <a:t>06/04/2023</a:t>
+              <a:t>07/04/2023</a:t>
             </a:fld>
             <a:endParaRPr lang="en-NL"/>
           </a:p>
@@ -1847,7 +1853,7 @@
           <a:p>
             <a:fld id="{5E9D55AD-DA6B-4A9D-BFE6-D0A1673E6EA9}" type="datetimeFigureOut">
               <a:rPr lang="en-NL" smtClean="0"/>
-              <a:t>06/04/2023</a:t>
+              <a:t>07/04/2023</a:t>
             </a:fld>
             <a:endParaRPr lang="en-NL"/>
           </a:p>
@@ -1989,7 +1995,7 @@
           <a:p>
             <a:fld id="{5E9D55AD-DA6B-4A9D-BFE6-D0A1673E6EA9}" type="datetimeFigureOut">
               <a:rPr lang="en-NL" smtClean="0"/>
-              <a:t>06/04/2023</a:t>
+              <a:t>07/04/2023</a:t>
             </a:fld>
             <a:endParaRPr lang="en-NL"/>
           </a:p>
@@ -2102,7 +2108,7 @@
           <a:p>
             <a:fld id="{5E9D55AD-DA6B-4A9D-BFE6-D0A1673E6EA9}" type="datetimeFigureOut">
               <a:rPr lang="en-NL" smtClean="0"/>
-              <a:t>06/04/2023</a:t>
+              <a:t>07/04/2023</a:t>
             </a:fld>
             <a:endParaRPr lang="en-NL"/>
           </a:p>
@@ -2415,7 +2421,7 @@
           <a:p>
             <a:fld id="{5E9D55AD-DA6B-4A9D-BFE6-D0A1673E6EA9}" type="datetimeFigureOut">
               <a:rPr lang="en-NL" smtClean="0"/>
-              <a:t>06/04/2023</a:t>
+              <a:t>07/04/2023</a:t>
             </a:fld>
             <a:endParaRPr lang="en-NL"/>
           </a:p>
@@ -2704,7 +2710,7 @@
           <a:p>
             <a:fld id="{5E9D55AD-DA6B-4A9D-BFE6-D0A1673E6EA9}" type="datetimeFigureOut">
               <a:rPr lang="en-NL" smtClean="0"/>
-              <a:t>06/04/2023</a:t>
+              <a:t>07/04/2023</a:t>
             </a:fld>
             <a:endParaRPr lang="en-NL"/>
           </a:p>
@@ -2947,7 +2953,7 @@
           <a:p>
             <a:fld id="{5E9D55AD-DA6B-4A9D-BFE6-D0A1673E6EA9}" type="datetimeFigureOut">
               <a:rPr lang="en-NL" smtClean="0"/>
-              <a:t>06/04/2023</a:t>
+              <a:t>07/04/2023</a:t>
             </a:fld>
             <a:endParaRPr lang="en-NL"/>
           </a:p>
@@ -5504,7 +5510,7 @@
         </p:nvSpPr>
         <p:spPr>
           <a:xfrm>
-            <a:off x="3083257" y="2872597"/>
+            <a:off x="3083257" y="2877819"/>
             <a:ext cx="1761128" cy="369332"/>
           </a:xfrm>
           <a:prstGeom prst="rect">
@@ -6687,10 +6693,10 @@
       </p:grpSpPr>
       <p:sp>
         <p:nvSpPr>
-          <p:cNvPr id="4" name="Title 3">
-            <a:extLst>
-              <a:ext uri="{FF2B5EF4-FFF2-40B4-BE49-F238E27FC236}">
-                <a16:creationId xmlns:a16="http://schemas.microsoft.com/office/drawing/2014/main" id="{72C925CA-BCA3-3701-E08E-95652380B32E}"/>
+          <p:cNvPr id="2" name="Title 1">
+            <a:extLst>
+              <a:ext uri="{FF2B5EF4-FFF2-40B4-BE49-F238E27FC236}">
+                <a16:creationId xmlns:a16="http://schemas.microsoft.com/office/drawing/2014/main" id="{39A1D606-8DD1-369C-5C09-471CDD551AD5}"/>
               </a:ext>
             </a:extLst>
           </p:cNvPr>
@@ -6701,51 +6707,551 @@
             <p:ph type="title"/>
           </p:nvPr>
         </p:nvSpPr>
-        <p:spPr/>
-        <p:txBody>
-          <a:bodyPr/>
-          <a:lstStyle/>
-          <a:p>
-            <a:r>
-              <a:rPr lang="nl-NL" noProof="0" dirty="0" err="1"/>
-              <a:t>Validateren</a:t>
-            </a:r>
-            <a:r>
-              <a:rPr lang="nl-NL" noProof="0" dirty="0"/>
-              <a:t> en selecteren</a:t>
-            </a:r>
-          </a:p>
-        </p:txBody>
-      </p:sp>
-      <p:sp>
-        <p:nvSpPr>
-          <p:cNvPr id="5" name="Text Placeholder 4">
-            <a:extLst>
-              <a:ext uri="{FF2B5EF4-FFF2-40B4-BE49-F238E27FC236}">
-                <a16:creationId xmlns:a16="http://schemas.microsoft.com/office/drawing/2014/main" id="{1AB31C95-91AF-DF13-FB58-0DA5F2D9F6F7}"/>
-              </a:ext>
-            </a:extLst>
-          </p:cNvPr>
-          <p:cNvSpPr>
-            <a:spLocks noGrp="1"/>
-          </p:cNvSpPr>
-          <p:nvPr>
-            <p:ph type="body" idx="1"/>
-          </p:nvPr>
-        </p:nvSpPr>
-        <p:spPr/>
-        <p:txBody>
-          <a:bodyPr/>
-          <a:lstStyle/>
-          <a:p>
-            <a:endParaRPr lang="en-NL"/>
+        <p:spPr>
+          <a:xfrm>
+            <a:off x="838200" y="365126"/>
+            <a:ext cx="10515600" cy="718608"/>
+          </a:xfrm>
+        </p:spPr>
+        <p:txBody>
+          <a:bodyPr>
+            <a:normAutofit/>
+          </a:bodyPr>
+          <a:lstStyle/>
+          <a:p>
+            <a:r>
+              <a:rPr lang="nl-NL" sz="3600" noProof="0" dirty="0"/>
+              <a:t>Modelleren in </a:t>
+            </a:r>
+            <a:r>
+              <a:rPr lang="nl-NL" sz="3600" noProof="0" dirty="0" err="1"/>
+              <a:t>scikit</a:t>
+            </a:r>
+            <a:r>
+              <a:rPr lang="nl-NL" sz="3600" dirty="0"/>
+              <a:t>-</a:t>
+            </a:r>
+            <a:r>
+              <a:rPr lang="nl-NL" sz="3600" dirty="0" err="1"/>
+              <a:t>learn</a:t>
+            </a:r>
+            <a:endParaRPr lang="nl-NL" sz="3600" noProof="0" dirty="0"/>
+          </a:p>
+        </p:txBody>
+      </p:sp>
+      <p:sp>
+        <p:nvSpPr>
+          <p:cNvPr id="3" name="Rectangle 2">
+            <a:extLst>
+              <a:ext uri="{FF2B5EF4-FFF2-40B4-BE49-F238E27FC236}">
+                <a16:creationId xmlns:a16="http://schemas.microsoft.com/office/drawing/2014/main" id="{D98ECDAC-8F8E-5A33-FF03-91C3D9EE9CAF}"/>
+              </a:ext>
+            </a:extLst>
+          </p:cNvPr>
+          <p:cNvSpPr/>
+          <p:nvPr/>
+        </p:nvSpPr>
+        <p:spPr>
+          <a:xfrm>
+            <a:off x="1289718" y="2590853"/>
+            <a:ext cx="1782170" cy="718608"/>
+          </a:xfrm>
+          <a:prstGeom prst="rect">
+            <a:avLst/>
+          </a:prstGeom>
+        </p:spPr>
+        <p:style>
+          <a:lnRef idx="1">
+            <a:schemeClr val="accent4"/>
+          </a:lnRef>
+          <a:fillRef idx="2">
+            <a:schemeClr val="accent4"/>
+          </a:fillRef>
+          <a:effectRef idx="1">
+            <a:schemeClr val="accent4"/>
+          </a:effectRef>
+          <a:fontRef idx="minor">
+            <a:schemeClr val="dk1"/>
+          </a:fontRef>
+        </p:style>
+        <p:txBody>
+          <a:bodyPr rtlCol="0" anchor="ctr"/>
+          <a:lstStyle/>
+          <a:p>
+            <a:pPr algn="ctr"/>
+            <a:r>
+              <a:rPr lang="nl-NL" dirty="0"/>
+              <a:t>Train data</a:t>
+            </a:r>
+          </a:p>
+        </p:txBody>
+      </p:sp>
+      <p:sp>
+        <p:nvSpPr>
+          <p:cNvPr id="10" name="Rectangle 9">
+            <a:extLst>
+              <a:ext uri="{FF2B5EF4-FFF2-40B4-BE49-F238E27FC236}">
+                <a16:creationId xmlns:a16="http://schemas.microsoft.com/office/drawing/2014/main" id="{E2036101-89EC-A3AA-E697-624CB501D0F0}"/>
+              </a:ext>
+            </a:extLst>
+          </p:cNvPr>
+          <p:cNvSpPr/>
+          <p:nvPr/>
+        </p:nvSpPr>
+        <p:spPr>
+          <a:xfrm>
+            <a:off x="4886469" y="2590854"/>
+            <a:ext cx="1782170" cy="718608"/>
+          </a:xfrm>
+          <a:prstGeom prst="rect">
+            <a:avLst/>
+          </a:prstGeom>
+        </p:spPr>
+        <p:style>
+          <a:lnRef idx="1">
+            <a:schemeClr val="accent5"/>
+          </a:lnRef>
+          <a:fillRef idx="2">
+            <a:schemeClr val="accent5"/>
+          </a:fillRef>
+          <a:effectRef idx="1">
+            <a:schemeClr val="accent5"/>
+          </a:effectRef>
+          <a:fontRef idx="minor">
+            <a:schemeClr val="dk1"/>
+          </a:fontRef>
+        </p:style>
+        <p:txBody>
+          <a:bodyPr rtlCol="0" anchor="ctr"/>
+          <a:lstStyle/>
+          <a:p>
+            <a:pPr algn="ctr"/>
+            <a:r>
+              <a:rPr lang="nl-NL" dirty="0" err="1"/>
+              <a:t>Estimator</a:t>
+            </a:r>
+            <a:endParaRPr lang="nl-NL" dirty="0"/>
+          </a:p>
+        </p:txBody>
+      </p:sp>
+      <p:sp>
+        <p:nvSpPr>
+          <p:cNvPr id="29" name="TextBox 28">
+            <a:extLst>
+              <a:ext uri="{FF2B5EF4-FFF2-40B4-BE49-F238E27FC236}">
+                <a16:creationId xmlns:a16="http://schemas.microsoft.com/office/drawing/2014/main" id="{3B96C0EB-7058-74D5-FCDE-CF1CE696C866}"/>
+              </a:ext>
+            </a:extLst>
+          </p:cNvPr>
+          <p:cNvSpPr txBox="1"/>
+          <p:nvPr/>
+        </p:nvSpPr>
+        <p:spPr>
+          <a:xfrm>
+            <a:off x="1289718" y="3472830"/>
+            <a:ext cx="1210886" cy="1754326"/>
+          </a:xfrm>
+          <a:prstGeom prst="rect">
+            <a:avLst/>
+          </a:prstGeom>
+        </p:spPr>
+        <p:style>
+          <a:lnRef idx="2">
+            <a:schemeClr val="accent4"/>
+          </a:lnRef>
+          <a:fillRef idx="1">
+            <a:schemeClr val="lt1"/>
+          </a:fillRef>
+          <a:effectRef idx="0">
+            <a:schemeClr val="accent4"/>
+          </a:effectRef>
+          <a:fontRef idx="minor">
+            <a:schemeClr val="dk1"/>
+          </a:fontRef>
+        </p:style>
+        <p:txBody>
+          <a:bodyPr wrap="square" rtlCol="0">
+            <a:spAutoFit/>
+          </a:bodyPr>
+          <a:lstStyle/>
+          <a:p>
+            <a:pPr algn="ctr"/>
+            <a:r>
+              <a:rPr lang="en-US" b="1" dirty="0">
+                <a:latin typeface="Courier New" panose="02070309020205020404" pitchFamily="49" charset="0"/>
+                <a:cs typeface="Courier New" panose="02070309020205020404" pitchFamily="49" charset="0"/>
+              </a:rPr>
+              <a:t>X</a:t>
+            </a:r>
+          </a:p>
+          <a:p>
+            <a:pPr algn="ctr"/>
+            <a:endParaRPr lang="en-US" dirty="0">
+              <a:latin typeface="Courier New" panose="02070309020205020404" pitchFamily="49" charset="0"/>
+              <a:cs typeface="Courier New" panose="02070309020205020404" pitchFamily="49" charset="0"/>
+            </a:endParaRPr>
+          </a:p>
+          <a:p>
+            <a:pPr algn="ctr"/>
+            <a:r>
+              <a:rPr lang="en-US" dirty="0">
+                <a:latin typeface="Courier New" panose="02070309020205020404" pitchFamily="49" charset="0"/>
+                <a:cs typeface="Courier New" panose="02070309020205020404" pitchFamily="49" charset="0"/>
+              </a:rPr>
+              <a:t>6, A, 1</a:t>
+            </a:r>
+          </a:p>
+          <a:p>
+            <a:pPr algn="ctr"/>
+            <a:r>
+              <a:rPr lang="en-US" dirty="0">
+                <a:latin typeface="Courier New" panose="02070309020205020404" pitchFamily="49" charset="0"/>
+                <a:cs typeface="Courier New" panose="02070309020205020404" pitchFamily="49" charset="0"/>
+              </a:rPr>
+              <a:t>1, C, 1</a:t>
+            </a:r>
+          </a:p>
+          <a:p>
+            <a:pPr algn="ctr"/>
+            <a:r>
+              <a:rPr lang="en-US" dirty="0">
+                <a:latin typeface="Courier New" panose="02070309020205020404" pitchFamily="49" charset="0"/>
+                <a:cs typeface="Courier New" panose="02070309020205020404" pitchFamily="49" charset="0"/>
+              </a:rPr>
+              <a:t>4, B, 0</a:t>
+            </a:r>
+          </a:p>
+          <a:p>
+            <a:pPr algn="ctr"/>
+            <a:r>
+              <a:rPr lang="en-US" dirty="0">
+                <a:latin typeface="Courier New" panose="02070309020205020404" pitchFamily="49" charset="0"/>
+                <a:cs typeface="Courier New" panose="02070309020205020404" pitchFamily="49" charset="0"/>
+              </a:rPr>
+              <a:t>3, A, 0</a:t>
+            </a:r>
+            <a:endParaRPr lang="en-NL" dirty="0">
+              <a:latin typeface="Courier New" panose="02070309020205020404" pitchFamily="49" charset="0"/>
+              <a:cs typeface="Courier New" panose="02070309020205020404" pitchFamily="49" charset="0"/>
+            </a:endParaRPr>
+          </a:p>
+        </p:txBody>
+      </p:sp>
+      <p:sp>
+        <p:nvSpPr>
+          <p:cNvPr id="7" name="TextBox 6">
+            <a:extLst>
+              <a:ext uri="{FF2B5EF4-FFF2-40B4-BE49-F238E27FC236}">
+                <a16:creationId xmlns:a16="http://schemas.microsoft.com/office/drawing/2014/main" id="{A2091BC9-C0DB-3B30-0368-576E4207D09A}"/>
+              </a:ext>
+            </a:extLst>
+          </p:cNvPr>
+          <p:cNvSpPr txBox="1"/>
+          <p:nvPr/>
+        </p:nvSpPr>
+        <p:spPr>
+          <a:xfrm>
+            <a:off x="2733869" y="3472830"/>
+            <a:ext cx="338019" cy="1754326"/>
+          </a:xfrm>
+          <a:prstGeom prst="rect">
+            <a:avLst/>
+          </a:prstGeom>
+        </p:spPr>
+        <p:style>
+          <a:lnRef idx="2">
+            <a:schemeClr val="accent4"/>
+          </a:lnRef>
+          <a:fillRef idx="1">
+            <a:schemeClr val="lt1"/>
+          </a:fillRef>
+          <a:effectRef idx="0">
+            <a:schemeClr val="accent4"/>
+          </a:effectRef>
+          <a:fontRef idx="minor">
+            <a:schemeClr val="dk1"/>
+          </a:fontRef>
+        </p:style>
+        <p:txBody>
+          <a:bodyPr wrap="square" rtlCol="0">
+            <a:spAutoFit/>
+          </a:bodyPr>
+          <a:lstStyle/>
+          <a:p>
+            <a:pPr algn="ctr"/>
+            <a:r>
+              <a:rPr lang="en-US" b="1" dirty="0">
+                <a:latin typeface="Courier New" panose="02070309020205020404" pitchFamily="49" charset="0"/>
+                <a:cs typeface="Courier New" panose="02070309020205020404" pitchFamily="49" charset="0"/>
+              </a:rPr>
+              <a:t>y</a:t>
+            </a:r>
+          </a:p>
+          <a:p>
+            <a:pPr algn="ctr"/>
+            <a:endParaRPr lang="en-US" dirty="0">
+              <a:latin typeface="Courier New" panose="02070309020205020404" pitchFamily="49" charset="0"/>
+              <a:cs typeface="Courier New" panose="02070309020205020404" pitchFamily="49" charset="0"/>
+            </a:endParaRPr>
+          </a:p>
+          <a:p>
+            <a:pPr algn="ctr"/>
+            <a:r>
+              <a:rPr lang="en-US" dirty="0">
+                <a:latin typeface="Courier New" panose="02070309020205020404" pitchFamily="49" charset="0"/>
+                <a:cs typeface="Courier New" panose="02070309020205020404" pitchFamily="49" charset="0"/>
+              </a:rPr>
+              <a:t>J</a:t>
+            </a:r>
+          </a:p>
+          <a:p>
+            <a:pPr algn="ctr"/>
+            <a:r>
+              <a:rPr lang="en-US" dirty="0">
+                <a:latin typeface="Courier New" panose="02070309020205020404" pitchFamily="49" charset="0"/>
+                <a:cs typeface="Courier New" panose="02070309020205020404" pitchFamily="49" charset="0"/>
+              </a:rPr>
+              <a:t>N</a:t>
+            </a:r>
+          </a:p>
+          <a:p>
+            <a:pPr algn="ctr"/>
+            <a:r>
+              <a:rPr lang="en-US" dirty="0">
+                <a:latin typeface="Courier New" panose="02070309020205020404" pitchFamily="49" charset="0"/>
+                <a:cs typeface="Courier New" panose="02070309020205020404" pitchFamily="49" charset="0"/>
+              </a:rPr>
+              <a:t>J</a:t>
+            </a:r>
+          </a:p>
+          <a:p>
+            <a:pPr algn="ctr"/>
+            <a:r>
+              <a:rPr lang="en-US" dirty="0">
+                <a:latin typeface="Courier New" panose="02070309020205020404" pitchFamily="49" charset="0"/>
+                <a:cs typeface="Courier New" panose="02070309020205020404" pitchFamily="49" charset="0"/>
+              </a:rPr>
+              <a:t>J</a:t>
+            </a:r>
+          </a:p>
+        </p:txBody>
+      </p:sp>
+      <p:sp>
+        <p:nvSpPr>
+          <p:cNvPr id="8" name="TextBox 7">
+            <a:extLst>
+              <a:ext uri="{FF2B5EF4-FFF2-40B4-BE49-F238E27FC236}">
+                <a16:creationId xmlns:a16="http://schemas.microsoft.com/office/drawing/2014/main" id="{3B6B8D84-9DE4-9A64-6F1F-72B18AE69461}"/>
+              </a:ext>
+            </a:extLst>
+          </p:cNvPr>
+          <p:cNvSpPr txBox="1"/>
+          <p:nvPr/>
+        </p:nvSpPr>
+        <p:spPr>
+          <a:xfrm>
+            <a:off x="4886469" y="3472830"/>
+            <a:ext cx="1782169" cy="1754326"/>
+          </a:xfrm>
+          <a:prstGeom prst="rect">
+            <a:avLst/>
+          </a:prstGeom>
+        </p:spPr>
+        <p:style>
+          <a:lnRef idx="2">
+            <a:schemeClr val="accent1"/>
+          </a:lnRef>
+          <a:fillRef idx="1">
+            <a:schemeClr val="lt1"/>
+          </a:fillRef>
+          <a:effectRef idx="0">
+            <a:schemeClr val="accent1"/>
+          </a:effectRef>
+          <a:fontRef idx="minor">
+            <a:schemeClr val="dk1"/>
+          </a:fontRef>
+        </p:style>
+        <p:txBody>
+          <a:bodyPr wrap="square" rtlCol="0">
+            <a:spAutoFit/>
+          </a:bodyPr>
+          <a:lstStyle/>
+          <a:p>
+            <a:pPr algn="ctr"/>
+            <a:r>
+              <a:rPr lang="en-US" b="1" dirty="0">
+                <a:latin typeface="Courier New" panose="02070309020205020404" pitchFamily="49" charset="0"/>
+                <a:cs typeface="Courier New" panose="02070309020205020404" pitchFamily="49" charset="0"/>
+              </a:rPr>
+              <a:t>Weights</a:t>
+            </a:r>
+          </a:p>
+          <a:p>
+            <a:pPr algn="ctr"/>
+            <a:endParaRPr lang="en-US" b="1" dirty="0">
+              <a:latin typeface="Courier New" panose="02070309020205020404" pitchFamily="49" charset="0"/>
+              <a:cs typeface="Courier New" panose="02070309020205020404" pitchFamily="49" charset="0"/>
+            </a:endParaRPr>
+          </a:p>
+          <a:p>
+            <a:pPr algn="ctr"/>
+            <a:r>
+              <a:rPr lang="el-GR" dirty="0">
+                <a:latin typeface="Courier New" panose="02070309020205020404" pitchFamily="49" charset="0"/>
+                <a:cs typeface="Courier New" panose="02070309020205020404" pitchFamily="49" charset="0"/>
+              </a:rPr>
+              <a:t>β</a:t>
+            </a:r>
+            <a:r>
+              <a:rPr lang="en-US" dirty="0">
+                <a:latin typeface="Courier New" panose="02070309020205020404" pitchFamily="49" charset="0"/>
+                <a:cs typeface="Courier New" panose="02070309020205020404" pitchFamily="49" charset="0"/>
+              </a:rPr>
+              <a:t>0 = 20.0</a:t>
+            </a:r>
+          </a:p>
+          <a:p>
+            <a:pPr algn="ctr"/>
+            <a:r>
+              <a:rPr lang="el-GR" dirty="0">
+                <a:latin typeface="Courier New" panose="02070309020205020404" pitchFamily="49" charset="0"/>
+                <a:cs typeface="Courier New" panose="02070309020205020404" pitchFamily="49" charset="0"/>
+              </a:rPr>
+              <a:t>β</a:t>
+            </a:r>
+            <a:r>
+              <a:rPr lang="en-US" dirty="0">
+                <a:latin typeface="Courier New" panose="02070309020205020404" pitchFamily="49" charset="0"/>
+                <a:cs typeface="Courier New" panose="02070309020205020404" pitchFamily="49" charset="0"/>
+              </a:rPr>
+              <a:t>1 = -0.5</a:t>
+            </a:r>
+          </a:p>
+          <a:p>
+            <a:pPr algn="ctr"/>
+            <a:r>
+              <a:rPr lang="el-GR" dirty="0">
+                <a:latin typeface="Courier New" panose="02070309020205020404" pitchFamily="49" charset="0"/>
+                <a:cs typeface="Courier New" panose="02070309020205020404" pitchFamily="49" charset="0"/>
+              </a:rPr>
+              <a:t>β</a:t>
+            </a:r>
+            <a:r>
+              <a:rPr lang="en-US" dirty="0">
+                <a:latin typeface="Courier New" panose="02070309020205020404" pitchFamily="49" charset="0"/>
+                <a:cs typeface="Courier New" panose="02070309020205020404" pitchFamily="49" charset="0"/>
+              </a:rPr>
+              <a:t>2 =  5.3</a:t>
+            </a:r>
+          </a:p>
+          <a:p>
+            <a:pPr algn="ctr"/>
+            <a:r>
+              <a:rPr lang="el-GR" dirty="0">
+                <a:latin typeface="Courier New" panose="02070309020205020404" pitchFamily="49" charset="0"/>
+                <a:cs typeface="Courier New" panose="02070309020205020404" pitchFamily="49" charset="0"/>
+              </a:rPr>
+              <a:t>β</a:t>
+            </a:r>
+            <a:r>
+              <a:rPr lang="en-US" dirty="0">
+                <a:latin typeface="Courier New" panose="02070309020205020404" pitchFamily="49" charset="0"/>
+                <a:cs typeface="Courier New" panose="02070309020205020404" pitchFamily="49" charset="0"/>
+              </a:rPr>
+              <a:t>3 = -3.0</a:t>
+            </a:r>
+          </a:p>
+        </p:txBody>
+      </p:sp>
+      <p:cxnSp>
+        <p:nvCxnSpPr>
+          <p:cNvPr id="11" name="Straight Arrow Connector 10">
+            <a:extLst>
+              <a:ext uri="{FF2B5EF4-FFF2-40B4-BE49-F238E27FC236}">
+                <a16:creationId xmlns:a16="http://schemas.microsoft.com/office/drawing/2014/main" id="{FF3D3B16-050A-E0DC-7795-6CE8D1254478}"/>
+              </a:ext>
+            </a:extLst>
+          </p:cNvPr>
+          <p:cNvCxnSpPr>
+            <a:stCxn id="3" idx="3"/>
+            <a:endCxn id="10" idx="1"/>
+          </p:cNvCxnSpPr>
+          <p:nvPr/>
+        </p:nvCxnSpPr>
+        <p:spPr>
+          <a:xfrm>
+            <a:off x="3071888" y="2950157"/>
+            <a:ext cx="1814581" cy="1"/>
+          </a:xfrm>
+          <a:prstGeom prst="straightConnector1">
+            <a:avLst/>
+          </a:prstGeom>
+          <a:ln>
+            <a:tailEnd type="triangle"/>
+          </a:ln>
+        </p:spPr>
+        <p:style>
+          <a:lnRef idx="3">
+            <a:schemeClr val="dk1"/>
+          </a:lnRef>
+          <a:fillRef idx="0">
+            <a:schemeClr val="dk1"/>
+          </a:fillRef>
+          <a:effectRef idx="2">
+            <a:schemeClr val="dk1"/>
+          </a:effectRef>
+          <a:fontRef idx="minor">
+            <a:schemeClr val="tx1"/>
+          </a:fontRef>
+        </p:style>
+      </p:cxnSp>
+      <p:sp>
+        <p:nvSpPr>
+          <p:cNvPr id="12" name="TextBox 11">
+            <a:extLst>
+              <a:ext uri="{FF2B5EF4-FFF2-40B4-BE49-F238E27FC236}">
+                <a16:creationId xmlns:a16="http://schemas.microsoft.com/office/drawing/2014/main" id="{C4399471-B6CB-1D73-E6A7-76E4359793F7}"/>
+              </a:ext>
+            </a:extLst>
+          </p:cNvPr>
+          <p:cNvSpPr txBox="1"/>
+          <p:nvPr/>
+        </p:nvSpPr>
+        <p:spPr>
+          <a:xfrm>
+            <a:off x="3071888" y="2590853"/>
+            <a:ext cx="1761128" cy="369332"/>
+          </a:xfrm>
+          <a:prstGeom prst="rect">
+            <a:avLst/>
+          </a:prstGeom>
+          <a:noFill/>
+        </p:spPr>
+        <p:txBody>
+          <a:bodyPr wrap="square" rtlCol="0">
+            <a:spAutoFit/>
+          </a:bodyPr>
+          <a:lstStyle/>
+          <a:p>
+            <a:pPr algn="ctr"/>
+            <a:r>
+              <a:rPr lang="en-US" dirty="0">
+                <a:latin typeface="Courier New" panose="02070309020205020404" pitchFamily="49" charset="0"/>
+                <a:cs typeface="Courier New" panose="02070309020205020404" pitchFamily="49" charset="0"/>
+              </a:rPr>
+              <a:t>fit()</a:t>
+            </a:r>
+            <a:endParaRPr lang="en-NL" dirty="0">
+              <a:latin typeface="Courier New" panose="02070309020205020404" pitchFamily="49" charset="0"/>
+              <a:cs typeface="Courier New" panose="02070309020205020404" pitchFamily="49" charset="0"/>
+            </a:endParaRPr>
           </a:p>
         </p:txBody>
       </p:sp>
     </p:spTree>
     <p:extLst>
       <p:ext uri="{BB962C8B-B14F-4D97-AF65-F5344CB8AC3E}">
-        <p14:creationId xmlns:p14="http://schemas.microsoft.com/office/powerpoint/2010/main" val="3662473669"/>
+        <p14:creationId xmlns:p14="http://schemas.microsoft.com/office/powerpoint/2010/main" val="355802705"/>
       </p:ext>
     </p:extLst>
   </p:cSld>
@@ -6774,10 +7280,10 @@
       </p:grpSpPr>
       <p:sp>
         <p:nvSpPr>
-          <p:cNvPr id="4" name="Title 3">
-            <a:extLst>
-              <a:ext uri="{FF2B5EF4-FFF2-40B4-BE49-F238E27FC236}">
-                <a16:creationId xmlns:a16="http://schemas.microsoft.com/office/drawing/2014/main" id="{72C925CA-BCA3-3701-E08E-95652380B32E}"/>
+          <p:cNvPr id="2" name="Title 1">
+            <a:extLst>
+              <a:ext uri="{FF2B5EF4-FFF2-40B4-BE49-F238E27FC236}">
+                <a16:creationId xmlns:a16="http://schemas.microsoft.com/office/drawing/2014/main" id="{39A1D606-8DD1-369C-5C09-471CDD551AD5}"/>
               </a:ext>
             </a:extLst>
           </p:cNvPr>
@@ -6788,47 +7294,761 @@
             <p:ph type="title"/>
           </p:nvPr>
         </p:nvSpPr>
-        <p:spPr/>
-        <p:txBody>
-          <a:bodyPr/>
-          <a:lstStyle/>
-          <a:p>
-            <a:r>
-              <a:rPr lang="nl-NL" noProof="0" dirty="0"/>
-              <a:t>Natural Language Processing</a:t>
-            </a:r>
-          </a:p>
-        </p:txBody>
-      </p:sp>
-      <p:sp>
-        <p:nvSpPr>
-          <p:cNvPr id="5" name="Text Placeholder 4">
-            <a:extLst>
-              <a:ext uri="{FF2B5EF4-FFF2-40B4-BE49-F238E27FC236}">
-                <a16:creationId xmlns:a16="http://schemas.microsoft.com/office/drawing/2014/main" id="{1AB31C95-91AF-DF13-FB58-0DA5F2D9F6F7}"/>
-              </a:ext>
-            </a:extLst>
-          </p:cNvPr>
-          <p:cNvSpPr>
-            <a:spLocks noGrp="1"/>
-          </p:cNvSpPr>
-          <p:nvPr>
-            <p:ph type="body" idx="1"/>
-          </p:nvPr>
-        </p:nvSpPr>
-        <p:spPr/>
-        <p:txBody>
-          <a:bodyPr/>
-          <a:lstStyle/>
-          <a:p>
-            <a:endParaRPr lang="en-NL"/>
+        <p:spPr>
+          <a:xfrm>
+            <a:off x="838200" y="365126"/>
+            <a:ext cx="10515600" cy="718608"/>
+          </a:xfrm>
+        </p:spPr>
+        <p:txBody>
+          <a:bodyPr>
+            <a:normAutofit/>
+          </a:bodyPr>
+          <a:lstStyle/>
+          <a:p>
+            <a:r>
+              <a:rPr lang="nl-NL" sz="3600" noProof="0" dirty="0"/>
+              <a:t>Modelleren in </a:t>
+            </a:r>
+            <a:r>
+              <a:rPr lang="nl-NL" sz="3600" noProof="0" dirty="0" err="1"/>
+              <a:t>scikit</a:t>
+            </a:r>
+            <a:r>
+              <a:rPr lang="nl-NL" sz="3600" dirty="0"/>
+              <a:t>-</a:t>
+            </a:r>
+            <a:r>
+              <a:rPr lang="nl-NL" sz="3600" dirty="0" err="1"/>
+              <a:t>learn</a:t>
+            </a:r>
+            <a:endParaRPr lang="nl-NL" sz="3600" noProof="0" dirty="0"/>
+          </a:p>
+        </p:txBody>
+      </p:sp>
+      <p:sp>
+        <p:nvSpPr>
+          <p:cNvPr id="3" name="Rectangle 2">
+            <a:extLst>
+              <a:ext uri="{FF2B5EF4-FFF2-40B4-BE49-F238E27FC236}">
+                <a16:creationId xmlns:a16="http://schemas.microsoft.com/office/drawing/2014/main" id="{D98ECDAC-8F8E-5A33-FF03-91C3D9EE9CAF}"/>
+              </a:ext>
+            </a:extLst>
+          </p:cNvPr>
+          <p:cNvSpPr/>
+          <p:nvPr/>
+        </p:nvSpPr>
+        <p:spPr>
+          <a:xfrm>
+            <a:off x="1289718" y="2590853"/>
+            <a:ext cx="1782170" cy="718608"/>
+          </a:xfrm>
+          <a:prstGeom prst="rect">
+            <a:avLst/>
+          </a:prstGeom>
+        </p:spPr>
+        <p:style>
+          <a:lnRef idx="1">
+            <a:schemeClr val="accent4"/>
+          </a:lnRef>
+          <a:fillRef idx="2">
+            <a:schemeClr val="accent4"/>
+          </a:fillRef>
+          <a:effectRef idx="1">
+            <a:schemeClr val="accent4"/>
+          </a:effectRef>
+          <a:fontRef idx="minor">
+            <a:schemeClr val="dk1"/>
+          </a:fontRef>
+        </p:style>
+        <p:txBody>
+          <a:bodyPr rtlCol="0" anchor="ctr"/>
+          <a:lstStyle/>
+          <a:p>
+            <a:pPr algn="ctr"/>
+            <a:r>
+              <a:rPr lang="nl-NL" dirty="0"/>
+              <a:t>Train data</a:t>
+            </a:r>
+          </a:p>
+        </p:txBody>
+      </p:sp>
+      <p:sp>
+        <p:nvSpPr>
+          <p:cNvPr id="10" name="Rectangle 9">
+            <a:extLst>
+              <a:ext uri="{FF2B5EF4-FFF2-40B4-BE49-F238E27FC236}">
+                <a16:creationId xmlns:a16="http://schemas.microsoft.com/office/drawing/2014/main" id="{E2036101-89EC-A3AA-E697-624CB501D0F0}"/>
+              </a:ext>
+            </a:extLst>
+          </p:cNvPr>
+          <p:cNvSpPr/>
+          <p:nvPr/>
+        </p:nvSpPr>
+        <p:spPr>
+          <a:xfrm>
+            <a:off x="4886469" y="2590854"/>
+            <a:ext cx="1782170" cy="718608"/>
+          </a:xfrm>
+          <a:prstGeom prst="rect">
+            <a:avLst/>
+          </a:prstGeom>
+        </p:spPr>
+        <p:style>
+          <a:lnRef idx="1">
+            <a:schemeClr val="accent5"/>
+          </a:lnRef>
+          <a:fillRef idx="2">
+            <a:schemeClr val="accent5"/>
+          </a:fillRef>
+          <a:effectRef idx="1">
+            <a:schemeClr val="accent5"/>
+          </a:effectRef>
+          <a:fontRef idx="minor">
+            <a:schemeClr val="dk1"/>
+          </a:fontRef>
+        </p:style>
+        <p:txBody>
+          <a:bodyPr rtlCol="0" anchor="ctr"/>
+          <a:lstStyle/>
+          <a:p>
+            <a:pPr algn="ctr"/>
+            <a:r>
+              <a:rPr lang="nl-NL" dirty="0" err="1"/>
+              <a:t>Estimator</a:t>
+            </a:r>
+            <a:endParaRPr lang="nl-NL" dirty="0"/>
+          </a:p>
+        </p:txBody>
+      </p:sp>
+      <p:sp>
+        <p:nvSpPr>
+          <p:cNvPr id="29" name="TextBox 28">
+            <a:extLst>
+              <a:ext uri="{FF2B5EF4-FFF2-40B4-BE49-F238E27FC236}">
+                <a16:creationId xmlns:a16="http://schemas.microsoft.com/office/drawing/2014/main" id="{3B96C0EB-7058-74D5-FCDE-CF1CE696C866}"/>
+              </a:ext>
+            </a:extLst>
+          </p:cNvPr>
+          <p:cNvSpPr txBox="1"/>
+          <p:nvPr/>
+        </p:nvSpPr>
+        <p:spPr>
+          <a:xfrm>
+            <a:off x="1289718" y="3472830"/>
+            <a:ext cx="1210886" cy="1754326"/>
+          </a:xfrm>
+          <a:prstGeom prst="rect">
+            <a:avLst/>
+          </a:prstGeom>
+        </p:spPr>
+        <p:style>
+          <a:lnRef idx="2">
+            <a:schemeClr val="accent4"/>
+          </a:lnRef>
+          <a:fillRef idx="1">
+            <a:schemeClr val="lt1"/>
+          </a:fillRef>
+          <a:effectRef idx="0">
+            <a:schemeClr val="accent4"/>
+          </a:effectRef>
+          <a:fontRef idx="minor">
+            <a:schemeClr val="dk1"/>
+          </a:fontRef>
+        </p:style>
+        <p:txBody>
+          <a:bodyPr wrap="square" rtlCol="0">
+            <a:spAutoFit/>
+          </a:bodyPr>
+          <a:lstStyle/>
+          <a:p>
+            <a:pPr algn="ctr"/>
+            <a:r>
+              <a:rPr lang="en-US" b="1" dirty="0">
+                <a:latin typeface="Courier New" panose="02070309020205020404" pitchFamily="49" charset="0"/>
+                <a:cs typeface="Courier New" panose="02070309020205020404" pitchFamily="49" charset="0"/>
+              </a:rPr>
+              <a:t>X</a:t>
+            </a:r>
+          </a:p>
+          <a:p>
+            <a:pPr algn="ctr"/>
+            <a:endParaRPr lang="en-US" dirty="0">
+              <a:latin typeface="Courier New" panose="02070309020205020404" pitchFamily="49" charset="0"/>
+              <a:cs typeface="Courier New" panose="02070309020205020404" pitchFamily="49" charset="0"/>
+            </a:endParaRPr>
+          </a:p>
+          <a:p>
+            <a:pPr algn="ctr"/>
+            <a:r>
+              <a:rPr lang="en-US" dirty="0">
+                <a:latin typeface="Courier New" panose="02070309020205020404" pitchFamily="49" charset="0"/>
+                <a:cs typeface="Courier New" panose="02070309020205020404" pitchFamily="49" charset="0"/>
+              </a:rPr>
+              <a:t>6, A, 1</a:t>
+            </a:r>
+          </a:p>
+          <a:p>
+            <a:pPr algn="ctr"/>
+            <a:r>
+              <a:rPr lang="en-US" dirty="0">
+                <a:latin typeface="Courier New" panose="02070309020205020404" pitchFamily="49" charset="0"/>
+                <a:cs typeface="Courier New" panose="02070309020205020404" pitchFamily="49" charset="0"/>
+              </a:rPr>
+              <a:t>1, C, 1</a:t>
+            </a:r>
+          </a:p>
+          <a:p>
+            <a:pPr algn="ctr"/>
+            <a:r>
+              <a:rPr lang="en-US" dirty="0">
+                <a:latin typeface="Courier New" panose="02070309020205020404" pitchFamily="49" charset="0"/>
+                <a:cs typeface="Courier New" panose="02070309020205020404" pitchFamily="49" charset="0"/>
+              </a:rPr>
+              <a:t>4, B, 0</a:t>
+            </a:r>
+          </a:p>
+          <a:p>
+            <a:pPr algn="ctr"/>
+            <a:r>
+              <a:rPr lang="en-US" dirty="0">
+                <a:latin typeface="Courier New" panose="02070309020205020404" pitchFamily="49" charset="0"/>
+                <a:cs typeface="Courier New" panose="02070309020205020404" pitchFamily="49" charset="0"/>
+              </a:rPr>
+              <a:t>3, A, 0</a:t>
+            </a:r>
+            <a:endParaRPr lang="en-NL" dirty="0">
+              <a:latin typeface="Courier New" panose="02070309020205020404" pitchFamily="49" charset="0"/>
+              <a:cs typeface="Courier New" panose="02070309020205020404" pitchFamily="49" charset="0"/>
+            </a:endParaRPr>
+          </a:p>
+        </p:txBody>
+      </p:sp>
+      <p:sp>
+        <p:nvSpPr>
+          <p:cNvPr id="7" name="TextBox 6">
+            <a:extLst>
+              <a:ext uri="{FF2B5EF4-FFF2-40B4-BE49-F238E27FC236}">
+                <a16:creationId xmlns:a16="http://schemas.microsoft.com/office/drawing/2014/main" id="{A2091BC9-C0DB-3B30-0368-576E4207D09A}"/>
+              </a:ext>
+            </a:extLst>
+          </p:cNvPr>
+          <p:cNvSpPr txBox="1"/>
+          <p:nvPr/>
+        </p:nvSpPr>
+        <p:spPr>
+          <a:xfrm>
+            <a:off x="2733869" y="3472830"/>
+            <a:ext cx="338019" cy="1754326"/>
+          </a:xfrm>
+          <a:prstGeom prst="rect">
+            <a:avLst/>
+          </a:prstGeom>
+        </p:spPr>
+        <p:style>
+          <a:lnRef idx="2">
+            <a:schemeClr val="accent4"/>
+          </a:lnRef>
+          <a:fillRef idx="1">
+            <a:schemeClr val="lt1"/>
+          </a:fillRef>
+          <a:effectRef idx="0">
+            <a:schemeClr val="accent4"/>
+          </a:effectRef>
+          <a:fontRef idx="minor">
+            <a:schemeClr val="dk1"/>
+          </a:fontRef>
+        </p:style>
+        <p:txBody>
+          <a:bodyPr wrap="square" rtlCol="0">
+            <a:spAutoFit/>
+          </a:bodyPr>
+          <a:lstStyle/>
+          <a:p>
+            <a:pPr algn="ctr"/>
+            <a:r>
+              <a:rPr lang="en-US" b="1" dirty="0">
+                <a:latin typeface="Courier New" panose="02070309020205020404" pitchFamily="49" charset="0"/>
+                <a:cs typeface="Courier New" panose="02070309020205020404" pitchFamily="49" charset="0"/>
+              </a:rPr>
+              <a:t>y</a:t>
+            </a:r>
+          </a:p>
+          <a:p>
+            <a:pPr algn="ctr"/>
+            <a:endParaRPr lang="en-US" dirty="0">
+              <a:latin typeface="Courier New" panose="02070309020205020404" pitchFamily="49" charset="0"/>
+              <a:cs typeface="Courier New" panose="02070309020205020404" pitchFamily="49" charset="0"/>
+            </a:endParaRPr>
+          </a:p>
+          <a:p>
+            <a:pPr algn="ctr"/>
+            <a:r>
+              <a:rPr lang="en-US" dirty="0">
+                <a:latin typeface="Courier New" panose="02070309020205020404" pitchFamily="49" charset="0"/>
+                <a:cs typeface="Courier New" panose="02070309020205020404" pitchFamily="49" charset="0"/>
+              </a:rPr>
+              <a:t>J</a:t>
+            </a:r>
+          </a:p>
+          <a:p>
+            <a:pPr algn="ctr"/>
+            <a:r>
+              <a:rPr lang="en-US" dirty="0">
+                <a:latin typeface="Courier New" panose="02070309020205020404" pitchFamily="49" charset="0"/>
+                <a:cs typeface="Courier New" panose="02070309020205020404" pitchFamily="49" charset="0"/>
+              </a:rPr>
+              <a:t>N</a:t>
+            </a:r>
+          </a:p>
+          <a:p>
+            <a:pPr algn="ctr"/>
+            <a:r>
+              <a:rPr lang="en-US" dirty="0">
+                <a:latin typeface="Courier New" panose="02070309020205020404" pitchFamily="49" charset="0"/>
+                <a:cs typeface="Courier New" panose="02070309020205020404" pitchFamily="49" charset="0"/>
+              </a:rPr>
+              <a:t>J</a:t>
+            </a:r>
+          </a:p>
+          <a:p>
+            <a:pPr algn="ctr"/>
+            <a:r>
+              <a:rPr lang="en-US" dirty="0">
+                <a:latin typeface="Courier New" panose="02070309020205020404" pitchFamily="49" charset="0"/>
+                <a:cs typeface="Courier New" panose="02070309020205020404" pitchFamily="49" charset="0"/>
+              </a:rPr>
+              <a:t>J</a:t>
+            </a:r>
+          </a:p>
+        </p:txBody>
+      </p:sp>
+      <p:sp>
+        <p:nvSpPr>
+          <p:cNvPr id="8" name="TextBox 7">
+            <a:extLst>
+              <a:ext uri="{FF2B5EF4-FFF2-40B4-BE49-F238E27FC236}">
+                <a16:creationId xmlns:a16="http://schemas.microsoft.com/office/drawing/2014/main" id="{3B6B8D84-9DE4-9A64-6F1F-72B18AE69461}"/>
+              </a:ext>
+            </a:extLst>
+          </p:cNvPr>
+          <p:cNvSpPr txBox="1"/>
+          <p:nvPr/>
+        </p:nvSpPr>
+        <p:spPr>
+          <a:xfrm>
+            <a:off x="4886467" y="3472830"/>
+            <a:ext cx="1782169" cy="1754326"/>
+          </a:xfrm>
+          <a:prstGeom prst="rect">
+            <a:avLst/>
+          </a:prstGeom>
+        </p:spPr>
+        <p:style>
+          <a:lnRef idx="2">
+            <a:schemeClr val="accent1"/>
+          </a:lnRef>
+          <a:fillRef idx="1">
+            <a:schemeClr val="lt1"/>
+          </a:fillRef>
+          <a:effectRef idx="0">
+            <a:schemeClr val="accent1"/>
+          </a:effectRef>
+          <a:fontRef idx="minor">
+            <a:schemeClr val="dk1"/>
+          </a:fontRef>
+        </p:style>
+        <p:txBody>
+          <a:bodyPr wrap="square" rtlCol="0">
+            <a:spAutoFit/>
+          </a:bodyPr>
+          <a:lstStyle/>
+          <a:p>
+            <a:pPr algn="ctr"/>
+            <a:r>
+              <a:rPr lang="en-US" b="1" dirty="0">
+                <a:latin typeface="Courier New" panose="02070309020205020404" pitchFamily="49" charset="0"/>
+                <a:cs typeface="Courier New" panose="02070309020205020404" pitchFamily="49" charset="0"/>
+              </a:rPr>
+              <a:t>Weights</a:t>
+            </a:r>
+          </a:p>
+          <a:p>
+            <a:pPr algn="ctr"/>
+            <a:endParaRPr lang="en-US" b="1" dirty="0">
+              <a:latin typeface="Courier New" panose="02070309020205020404" pitchFamily="49" charset="0"/>
+              <a:cs typeface="Courier New" panose="02070309020205020404" pitchFamily="49" charset="0"/>
+            </a:endParaRPr>
+          </a:p>
+          <a:p>
+            <a:pPr algn="ctr"/>
+            <a:r>
+              <a:rPr lang="el-GR" dirty="0">
+                <a:latin typeface="Courier New" panose="02070309020205020404" pitchFamily="49" charset="0"/>
+                <a:cs typeface="Courier New" panose="02070309020205020404" pitchFamily="49" charset="0"/>
+              </a:rPr>
+              <a:t>β</a:t>
+            </a:r>
+            <a:r>
+              <a:rPr lang="en-US" dirty="0">
+                <a:latin typeface="Courier New" panose="02070309020205020404" pitchFamily="49" charset="0"/>
+                <a:cs typeface="Courier New" panose="02070309020205020404" pitchFamily="49" charset="0"/>
+              </a:rPr>
+              <a:t>0 = 20.0</a:t>
+            </a:r>
+          </a:p>
+          <a:p>
+            <a:pPr algn="ctr"/>
+            <a:r>
+              <a:rPr lang="el-GR" dirty="0">
+                <a:latin typeface="Courier New" panose="02070309020205020404" pitchFamily="49" charset="0"/>
+                <a:cs typeface="Courier New" panose="02070309020205020404" pitchFamily="49" charset="0"/>
+              </a:rPr>
+              <a:t>β</a:t>
+            </a:r>
+            <a:r>
+              <a:rPr lang="en-US" dirty="0">
+                <a:latin typeface="Courier New" panose="02070309020205020404" pitchFamily="49" charset="0"/>
+                <a:cs typeface="Courier New" panose="02070309020205020404" pitchFamily="49" charset="0"/>
+              </a:rPr>
+              <a:t>1 = -0.5</a:t>
+            </a:r>
+          </a:p>
+          <a:p>
+            <a:pPr algn="ctr"/>
+            <a:r>
+              <a:rPr lang="el-GR" dirty="0">
+                <a:latin typeface="Courier New" panose="02070309020205020404" pitchFamily="49" charset="0"/>
+                <a:cs typeface="Courier New" panose="02070309020205020404" pitchFamily="49" charset="0"/>
+              </a:rPr>
+              <a:t>β</a:t>
+            </a:r>
+            <a:r>
+              <a:rPr lang="en-US" dirty="0">
+                <a:latin typeface="Courier New" panose="02070309020205020404" pitchFamily="49" charset="0"/>
+                <a:cs typeface="Courier New" panose="02070309020205020404" pitchFamily="49" charset="0"/>
+              </a:rPr>
+              <a:t>2 =  5.3</a:t>
+            </a:r>
+          </a:p>
+          <a:p>
+            <a:pPr algn="ctr"/>
+            <a:r>
+              <a:rPr lang="el-GR" dirty="0">
+                <a:latin typeface="Courier New" panose="02070309020205020404" pitchFamily="49" charset="0"/>
+                <a:cs typeface="Courier New" panose="02070309020205020404" pitchFamily="49" charset="0"/>
+              </a:rPr>
+              <a:t>β</a:t>
+            </a:r>
+            <a:r>
+              <a:rPr lang="en-US" dirty="0">
+                <a:latin typeface="Courier New" panose="02070309020205020404" pitchFamily="49" charset="0"/>
+                <a:cs typeface="Courier New" panose="02070309020205020404" pitchFamily="49" charset="0"/>
+              </a:rPr>
+              <a:t>3 = -3.0</a:t>
+            </a:r>
+          </a:p>
+        </p:txBody>
+      </p:sp>
+      <p:cxnSp>
+        <p:nvCxnSpPr>
+          <p:cNvPr id="11" name="Straight Arrow Connector 10">
+            <a:extLst>
+              <a:ext uri="{FF2B5EF4-FFF2-40B4-BE49-F238E27FC236}">
+                <a16:creationId xmlns:a16="http://schemas.microsoft.com/office/drawing/2014/main" id="{FF3D3B16-050A-E0DC-7795-6CE8D1254478}"/>
+              </a:ext>
+            </a:extLst>
+          </p:cNvPr>
+          <p:cNvCxnSpPr>
+            <a:stCxn id="3" idx="3"/>
+            <a:endCxn id="10" idx="1"/>
+          </p:cNvCxnSpPr>
+          <p:nvPr/>
+        </p:nvCxnSpPr>
+        <p:spPr>
+          <a:xfrm>
+            <a:off x="3071888" y="2950157"/>
+            <a:ext cx="1814581" cy="1"/>
+          </a:xfrm>
+          <a:prstGeom prst="straightConnector1">
+            <a:avLst/>
+          </a:prstGeom>
+          <a:ln>
+            <a:tailEnd type="triangle"/>
+          </a:ln>
+        </p:spPr>
+        <p:style>
+          <a:lnRef idx="3">
+            <a:schemeClr val="dk1"/>
+          </a:lnRef>
+          <a:fillRef idx="0">
+            <a:schemeClr val="dk1"/>
+          </a:fillRef>
+          <a:effectRef idx="2">
+            <a:schemeClr val="dk1"/>
+          </a:effectRef>
+          <a:fontRef idx="minor">
+            <a:schemeClr val="tx1"/>
+          </a:fontRef>
+        </p:style>
+      </p:cxnSp>
+      <p:sp>
+        <p:nvSpPr>
+          <p:cNvPr id="12" name="TextBox 11">
+            <a:extLst>
+              <a:ext uri="{FF2B5EF4-FFF2-40B4-BE49-F238E27FC236}">
+                <a16:creationId xmlns:a16="http://schemas.microsoft.com/office/drawing/2014/main" id="{C4399471-B6CB-1D73-E6A7-76E4359793F7}"/>
+              </a:ext>
+            </a:extLst>
+          </p:cNvPr>
+          <p:cNvSpPr txBox="1"/>
+          <p:nvPr/>
+        </p:nvSpPr>
+        <p:spPr>
+          <a:xfrm>
+            <a:off x="3071888" y="2590853"/>
+            <a:ext cx="1761128" cy="369332"/>
+          </a:xfrm>
+          <a:prstGeom prst="rect">
+            <a:avLst/>
+          </a:prstGeom>
+          <a:noFill/>
+        </p:spPr>
+        <p:txBody>
+          <a:bodyPr wrap="square" rtlCol="0">
+            <a:spAutoFit/>
+          </a:bodyPr>
+          <a:lstStyle/>
+          <a:p>
+            <a:pPr algn="ctr"/>
+            <a:r>
+              <a:rPr lang="en-US" dirty="0">
+                <a:latin typeface="Courier New" panose="02070309020205020404" pitchFamily="49" charset="0"/>
+                <a:cs typeface="Courier New" panose="02070309020205020404" pitchFamily="49" charset="0"/>
+              </a:rPr>
+              <a:t>fit()</a:t>
+            </a:r>
+            <a:endParaRPr lang="en-NL" dirty="0">
+              <a:latin typeface="Courier New" panose="02070309020205020404" pitchFamily="49" charset="0"/>
+              <a:cs typeface="Courier New" panose="02070309020205020404" pitchFamily="49" charset="0"/>
+            </a:endParaRPr>
+          </a:p>
+        </p:txBody>
+      </p:sp>
+      <p:sp>
+        <p:nvSpPr>
+          <p:cNvPr id="4" name="Rectangle 3">
+            <a:extLst>
+              <a:ext uri="{FF2B5EF4-FFF2-40B4-BE49-F238E27FC236}">
+                <a16:creationId xmlns:a16="http://schemas.microsoft.com/office/drawing/2014/main" id="{B3C955DC-C8B4-639C-2E09-15849F6B59CF}"/>
+              </a:ext>
+            </a:extLst>
+          </p:cNvPr>
+          <p:cNvSpPr/>
+          <p:nvPr/>
+        </p:nvSpPr>
+        <p:spPr>
+          <a:xfrm>
+            <a:off x="8483215" y="1083734"/>
+            <a:ext cx="1782170" cy="718608"/>
+          </a:xfrm>
+          <a:prstGeom prst="rect">
+            <a:avLst/>
+          </a:prstGeom>
+        </p:spPr>
+        <p:style>
+          <a:lnRef idx="1">
+            <a:schemeClr val="accent2"/>
+          </a:lnRef>
+          <a:fillRef idx="2">
+            <a:schemeClr val="accent2"/>
+          </a:fillRef>
+          <a:effectRef idx="1">
+            <a:schemeClr val="accent2"/>
+          </a:effectRef>
+          <a:fontRef idx="minor">
+            <a:schemeClr val="dk1"/>
+          </a:fontRef>
+        </p:style>
+        <p:txBody>
+          <a:bodyPr rtlCol="0" anchor="ctr"/>
+          <a:lstStyle/>
+          <a:p>
+            <a:pPr algn="ctr"/>
+            <a:r>
+              <a:rPr lang="nl-NL" dirty="0"/>
+              <a:t>Score data</a:t>
+            </a:r>
+          </a:p>
+        </p:txBody>
+      </p:sp>
+      <p:sp>
+        <p:nvSpPr>
+          <p:cNvPr id="5" name="TextBox 4">
+            <a:extLst>
+              <a:ext uri="{FF2B5EF4-FFF2-40B4-BE49-F238E27FC236}">
+                <a16:creationId xmlns:a16="http://schemas.microsoft.com/office/drawing/2014/main" id="{2EA6F49D-F163-06F2-D31F-58F7CDFBDC52}"/>
+              </a:ext>
+            </a:extLst>
+          </p:cNvPr>
+          <p:cNvSpPr txBox="1"/>
+          <p:nvPr/>
+        </p:nvSpPr>
+        <p:spPr>
+          <a:xfrm>
+            <a:off x="8483216" y="1963860"/>
+            <a:ext cx="1782169" cy="1200329"/>
+          </a:xfrm>
+          <a:prstGeom prst="rect">
+            <a:avLst/>
+          </a:prstGeom>
+        </p:spPr>
+        <p:style>
+          <a:lnRef idx="2">
+            <a:schemeClr val="accent2"/>
+          </a:lnRef>
+          <a:fillRef idx="1">
+            <a:schemeClr val="lt1"/>
+          </a:fillRef>
+          <a:effectRef idx="0">
+            <a:schemeClr val="accent2"/>
+          </a:effectRef>
+          <a:fontRef idx="minor">
+            <a:schemeClr val="dk1"/>
+          </a:fontRef>
+        </p:style>
+        <p:txBody>
+          <a:bodyPr wrap="square" rtlCol="0">
+            <a:spAutoFit/>
+          </a:bodyPr>
+          <a:lstStyle/>
+          <a:p>
+            <a:pPr algn="ctr"/>
+            <a:r>
+              <a:rPr lang="en-US" b="1" dirty="0">
+                <a:latin typeface="Courier New" panose="02070309020205020404" pitchFamily="49" charset="0"/>
+                <a:cs typeface="Courier New" panose="02070309020205020404" pitchFamily="49" charset="0"/>
+              </a:rPr>
+              <a:t>X</a:t>
+            </a:r>
+          </a:p>
+          <a:p>
+            <a:pPr algn="ctr"/>
+            <a:endParaRPr lang="en-US" dirty="0">
+              <a:latin typeface="Courier New" panose="02070309020205020404" pitchFamily="49" charset="0"/>
+              <a:cs typeface="Courier New" panose="02070309020205020404" pitchFamily="49" charset="0"/>
+            </a:endParaRPr>
+          </a:p>
+          <a:p>
+            <a:pPr algn="ctr"/>
+            <a:r>
+              <a:rPr lang="en-US" dirty="0">
+                <a:latin typeface="Courier New" panose="02070309020205020404" pitchFamily="49" charset="0"/>
+                <a:cs typeface="Courier New" panose="02070309020205020404" pitchFamily="49" charset="0"/>
+              </a:rPr>
+              <a:t>7, A, 0</a:t>
+            </a:r>
+          </a:p>
+          <a:p>
+            <a:pPr algn="ctr"/>
+            <a:r>
+              <a:rPr lang="en-US" dirty="0">
+                <a:latin typeface="Courier New" panose="02070309020205020404" pitchFamily="49" charset="0"/>
+                <a:cs typeface="Courier New" panose="02070309020205020404" pitchFamily="49" charset="0"/>
+              </a:rPr>
+              <a:t>3, B, 0</a:t>
+            </a:r>
+          </a:p>
+        </p:txBody>
+      </p:sp>
+      <p:cxnSp>
+        <p:nvCxnSpPr>
+          <p:cNvPr id="13" name="Straight Arrow Connector 12">
+            <a:extLst>
+              <a:ext uri="{FF2B5EF4-FFF2-40B4-BE49-F238E27FC236}">
+                <a16:creationId xmlns:a16="http://schemas.microsoft.com/office/drawing/2014/main" id="{7530C0B6-FD4C-1189-A454-41C537622827}"/>
+              </a:ext>
+            </a:extLst>
+          </p:cNvPr>
+          <p:cNvCxnSpPr>
+            <a:stCxn id="4" idx="1"/>
+            <a:endCxn id="10" idx="3"/>
+          </p:cNvCxnSpPr>
+          <p:nvPr/>
+        </p:nvCxnSpPr>
+        <p:spPr>
+          <a:xfrm flipH="1">
+            <a:off x="6668639" y="1443038"/>
+            <a:ext cx="1814576" cy="1507120"/>
+          </a:xfrm>
+          <a:prstGeom prst="straightConnector1">
+            <a:avLst/>
+          </a:prstGeom>
+          <a:ln>
+            <a:tailEnd type="triangle"/>
+          </a:ln>
+        </p:spPr>
+        <p:style>
+          <a:lnRef idx="3">
+            <a:schemeClr val="dk1"/>
+          </a:lnRef>
+          <a:fillRef idx="0">
+            <a:schemeClr val="dk1"/>
+          </a:fillRef>
+          <a:effectRef idx="2">
+            <a:schemeClr val="dk1"/>
+          </a:effectRef>
+          <a:fontRef idx="minor">
+            <a:schemeClr val="tx1"/>
+          </a:fontRef>
+        </p:style>
+      </p:cxnSp>
+      <p:sp>
+        <p:nvSpPr>
+          <p:cNvPr id="14" name="TextBox 13">
+            <a:extLst>
+              <a:ext uri="{FF2B5EF4-FFF2-40B4-BE49-F238E27FC236}">
+                <a16:creationId xmlns:a16="http://schemas.microsoft.com/office/drawing/2014/main" id="{A9E7BF65-0C3A-1972-D427-56AC78BD677E}"/>
+              </a:ext>
+            </a:extLst>
+          </p:cNvPr>
+          <p:cNvSpPr txBox="1"/>
+          <p:nvPr/>
+        </p:nvSpPr>
+        <p:spPr>
+          <a:xfrm>
+            <a:off x="6096000" y="1779194"/>
+            <a:ext cx="1425390" cy="369332"/>
+          </a:xfrm>
+          <a:prstGeom prst="rect">
+            <a:avLst/>
+          </a:prstGeom>
+          <a:noFill/>
+        </p:spPr>
+        <p:txBody>
+          <a:bodyPr wrap="none" rtlCol="0">
+            <a:spAutoFit/>
+          </a:bodyPr>
+          <a:lstStyle/>
+          <a:p>
+            <a:r>
+              <a:rPr lang="en-US" dirty="0">
+                <a:latin typeface="Courier New" panose="02070309020205020404" pitchFamily="49" charset="0"/>
+                <a:cs typeface="Courier New" panose="02070309020205020404" pitchFamily="49" charset="0"/>
+              </a:rPr>
+              <a:t>predict()</a:t>
+            </a:r>
+            <a:endParaRPr lang="en-NL" dirty="0">
+              <a:latin typeface="Courier New" panose="02070309020205020404" pitchFamily="49" charset="0"/>
+              <a:cs typeface="Courier New" panose="02070309020205020404" pitchFamily="49" charset="0"/>
+            </a:endParaRPr>
           </a:p>
         </p:txBody>
       </p:sp>
     </p:spTree>
     <p:extLst>
       <p:ext uri="{BB962C8B-B14F-4D97-AF65-F5344CB8AC3E}">
-        <p14:creationId xmlns:p14="http://schemas.microsoft.com/office/powerpoint/2010/main" val="2675372687"/>
+        <p14:creationId xmlns:p14="http://schemas.microsoft.com/office/powerpoint/2010/main" val="3668002465"/>
       </p:ext>
     </p:extLst>
   </p:cSld>
@@ -6885,17 +8105,920 @@
           <a:p>
             <a:r>
               <a:rPr lang="nl-NL" sz="3600" noProof="0" dirty="0"/>
-              <a:t>Waar op te letten?</a:t>
-            </a:r>
-          </a:p>
-        </p:txBody>
-      </p:sp>
-      <p:sp>
-        <p:nvSpPr>
-          <p:cNvPr id="3" name="Content Placeholder 2">
-            <a:extLst>
-              <a:ext uri="{FF2B5EF4-FFF2-40B4-BE49-F238E27FC236}">
-                <a16:creationId xmlns:a16="http://schemas.microsoft.com/office/drawing/2014/main" id="{8F4C0E08-92A4-9F30-EF70-67DFBC8C5B8D}"/>
+              <a:t>Modelleren in </a:t>
+            </a:r>
+            <a:r>
+              <a:rPr lang="nl-NL" sz="3600" noProof="0" dirty="0" err="1"/>
+              <a:t>scikit</a:t>
+            </a:r>
+            <a:r>
+              <a:rPr lang="nl-NL" sz="3600" dirty="0"/>
+              <a:t>-</a:t>
+            </a:r>
+            <a:r>
+              <a:rPr lang="nl-NL" sz="3600" dirty="0" err="1"/>
+              <a:t>learn</a:t>
+            </a:r>
+            <a:endParaRPr lang="nl-NL" sz="3600" noProof="0" dirty="0"/>
+          </a:p>
+        </p:txBody>
+      </p:sp>
+      <p:sp>
+        <p:nvSpPr>
+          <p:cNvPr id="3" name="Rectangle 2">
+            <a:extLst>
+              <a:ext uri="{FF2B5EF4-FFF2-40B4-BE49-F238E27FC236}">
+                <a16:creationId xmlns:a16="http://schemas.microsoft.com/office/drawing/2014/main" id="{D98ECDAC-8F8E-5A33-FF03-91C3D9EE9CAF}"/>
+              </a:ext>
+            </a:extLst>
+          </p:cNvPr>
+          <p:cNvSpPr/>
+          <p:nvPr/>
+        </p:nvSpPr>
+        <p:spPr>
+          <a:xfrm>
+            <a:off x="1289718" y="2590853"/>
+            <a:ext cx="1782170" cy="718608"/>
+          </a:xfrm>
+          <a:prstGeom prst="rect">
+            <a:avLst/>
+          </a:prstGeom>
+        </p:spPr>
+        <p:style>
+          <a:lnRef idx="1">
+            <a:schemeClr val="accent4"/>
+          </a:lnRef>
+          <a:fillRef idx="2">
+            <a:schemeClr val="accent4"/>
+          </a:fillRef>
+          <a:effectRef idx="1">
+            <a:schemeClr val="accent4"/>
+          </a:effectRef>
+          <a:fontRef idx="minor">
+            <a:schemeClr val="dk1"/>
+          </a:fontRef>
+        </p:style>
+        <p:txBody>
+          <a:bodyPr rtlCol="0" anchor="ctr"/>
+          <a:lstStyle/>
+          <a:p>
+            <a:pPr algn="ctr"/>
+            <a:r>
+              <a:rPr lang="nl-NL" dirty="0"/>
+              <a:t>Train data</a:t>
+            </a:r>
+          </a:p>
+        </p:txBody>
+      </p:sp>
+      <p:sp>
+        <p:nvSpPr>
+          <p:cNvPr id="10" name="Rectangle 9">
+            <a:extLst>
+              <a:ext uri="{FF2B5EF4-FFF2-40B4-BE49-F238E27FC236}">
+                <a16:creationId xmlns:a16="http://schemas.microsoft.com/office/drawing/2014/main" id="{E2036101-89EC-A3AA-E697-624CB501D0F0}"/>
+              </a:ext>
+            </a:extLst>
+          </p:cNvPr>
+          <p:cNvSpPr/>
+          <p:nvPr/>
+        </p:nvSpPr>
+        <p:spPr>
+          <a:xfrm>
+            <a:off x="4886469" y="2590854"/>
+            <a:ext cx="1782170" cy="718608"/>
+          </a:xfrm>
+          <a:prstGeom prst="rect">
+            <a:avLst/>
+          </a:prstGeom>
+        </p:spPr>
+        <p:style>
+          <a:lnRef idx="1">
+            <a:schemeClr val="accent5"/>
+          </a:lnRef>
+          <a:fillRef idx="2">
+            <a:schemeClr val="accent5"/>
+          </a:fillRef>
+          <a:effectRef idx="1">
+            <a:schemeClr val="accent5"/>
+          </a:effectRef>
+          <a:fontRef idx="minor">
+            <a:schemeClr val="dk1"/>
+          </a:fontRef>
+        </p:style>
+        <p:txBody>
+          <a:bodyPr rtlCol="0" anchor="ctr"/>
+          <a:lstStyle/>
+          <a:p>
+            <a:pPr algn="ctr"/>
+            <a:r>
+              <a:rPr lang="nl-NL" dirty="0" err="1"/>
+              <a:t>Estimator</a:t>
+            </a:r>
+            <a:endParaRPr lang="nl-NL" dirty="0"/>
+          </a:p>
+        </p:txBody>
+      </p:sp>
+      <p:sp>
+        <p:nvSpPr>
+          <p:cNvPr id="29" name="TextBox 28">
+            <a:extLst>
+              <a:ext uri="{FF2B5EF4-FFF2-40B4-BE49-F238E27FC236}">
+                <a16:creationId xmlns:a16="http://schemas.microsoft.com/office/drawing/2014/main" id="{3B96C0EB-7058-74D5-FCDE-CF1CE696C866}"/>
+              </a:ext>
+            </a:extLst>
+          </p:cNvPr>
+          <p:cNvSpPr txBox="1"/>
+          <p:nvPr/>
+        </p:nvSpPr>
+        <p:spPr>
+          <a:xfrm>
+            <a:off x="1289718" y="3472830"/>
+            <a:ext cx="1210886" cy="1754326"/>
+          </a:xfrm>
+          <a:prstGeom prst="rect">
+            <a:avLst/>
+          </a:prstGeom>
+        </p:spPr>
+        <p:style>
+          <a:lnRef idx="2">
+            <a:schemeClr val="accent4"/>
+          </a:lnRef>
+          <a:fillRef idx="1">
+            <a:schemeClr val="lt1"/>
+          </a:fillRef>
+          <a:effectRef idx="0">
+            <a:schemeClr val="accent4"/>
+          </a:effectRef>
+          <a:fontRef idx="minor">
+            <a:schemeClr val="dk1"/>
+          </a:fontRef>
+        </p:style>
+        <p:txBody>
+          <a:bodyPr wrap="square" rtlCol="0">
+            <a:spAutoFit/>
+          </a:bodyPr>
+          <a:lstStyle/>
+          <a:p>
+            <a:pPr algn="ctr"/>
+            <a:r>
+              <a:rPr lang="en-US" b="1" dirty="0">
+                <a:latin typeface="Courier New" panose="02070309020205020404" pitchFamily="49" charset="0"/>
+                <a:cs typeface="Courier New" panose="02070309020205020404" pitchFamily="49" charset="0"/>
+              </a:rPr>
+              <a:t>X</a:t>
+            </a:r>
+          </a:p>
+          <a:p>
+            <a:pPr algn="ctr"/>
+            <a:endParaRPr lang="en-US" dirty="0">
+              <a:latin typeface="Courier New" panose="02070309020205020404" pitchFamily="49" charset="0"/>
+              <a:cs typeface="Courier New" panose="02070309020205020404" pitchFamily="49" charset="0"/>
+            </a:endParaRPr>
+          </a:p>
+          <a:p>
+            <a:pPr algn="ctr"/>
+            <a:r>
+              <a:rPr lang="en-US" dirty="0">
+                <a:latin typeface="Courier New" panose="02070309020205020404" pitchFamily="49" charset="0"/>
+                <a:cs typeface="Courier New" panose="02070309020205020404" pitchFamily="49" charset="0"/>
+              </a:rPr>
+              <a:t>6, A, 1</a:t>
+            </a:r>
+          </a:p>
+          <a:p>
+            <a:pPr algn="ctr"/>
+            <a:r>
+              <a:rPr lang="en-US" dirty="0">
+                <a:latin typeface="Courier New" panose="02070309020205020404" pitchFamily="49" charset="0"/>
+                <a:cs typeface="Courier New" panose="02070309020205020404" pitchFamily="49" charset="0"/>
+              </a:rPr>
+              <a:t>1, C, 1</a:t>
+            </a:r>
+          </a:p>
+          <a:p>
+            <a:pPr algn="ctr"/>
+            <a:r>
+              <a:rPr lang="en-US" dirty="0">
+                <a:latin typeface="Courier New" panose="02070309020205020404" pitchFamily="49" charset="0"/>
+                <a:cs typeface="Courier New" panose="02070309020205020404" pitchFamily="49" charset="0"/>
+              </a:rPr>
+              <a:t>4, B, 0</a:t>
+            </a:r>
+          </a:p>
+          <a:p>
+            <a:pPr algn="ctr"/>
+            <a:r>
+              <a:rPr lang="en-US" dirty="0">
+                <a:latin typeface="Courier New" panose="02070309020205020404" pitchFamily="49" charset="0"/>
+                <a:cs typeface="Courier New" panose="02070309020205020404" pitchFamily="49" charset="0"/>
+              </a:rPr>
+              <a:t>3, A, 0</a:t>
+            </a:r>
+            <a:endParaRPr lang="en-NL" dirty="0">
+              <a:latin typeface="Courier New" panose="02070309020205020404" pitchFamily="49" charset="0"/>
+              <a:cs typeface="Courier New" panose="02070309020205020404" pitchFamily="49" charset="0"/>
+            </a:endParaRPr>
+          </a:p>
+        </p:txBody>
+      </p:sp>
+      <p:sp>
+        <p:nvSpPr>
+          <p:cNvPr id="7" name="TextBox 6">
+            <a:extLst>
+              <a:ext uri="{FF2B5EF4-FFF2-40B4-BE49-F238E27FC236}">
+                <a16:creationId xmlns:a16="http://schemas.microsoft.com/office/drawing/2014/main" id="{A2091BC9-C0DB-3B30-0368-576E4207D09A}"/>
+              </a:ext>
+            </a:extLst>
+          </p:cNvPr>
+          <p:cNvSpPr txBox="1"/>
+          <p:nvPr/>
+        </p:nvSpPr>
+        <p:spPr>
+          <a:xfrm>
+            <a:off x="2733869" y="3472830"/>
+            <a:ext cx="338019" cy="1754326"/>
+          </a:xfrm>
+          <a:prstGeom prst="rect">
+            <a:avLst/>
+          </a:prstGeom>
+        </p:spPr>
+        <p:style>
+          <a:lnRef idx="2">
+            <a:schemeClr val="accent4"/>
+          </a:lnRef>
+          <a:fillRef idx="1">
+            <a:schemeClr val="lt1"/>
+          </a:fillRef>
+          <a:effectRef idx="0">
+            <a:schemeClr val="accent4"/>
+          </a:effectRef>
+          <a:fontRef idx="minor">
+            <a:schemeClr val="dk1"/>
+          </a:fontRef>
+        </p:style>
+        <p:txBody>
+          <a:bodyPr wrap="square" rtlCol="0">
+            <a:spAutoFit/>
+          </a:bodyPr>
+          <a:lstStyle/>
+          <a:p>
+            <a:pPr algn="ctr"/>
+            <a:r>
+              <a:rPr lang="en-US" b="1" dirty="0">
+                <a:latin typeface="Courier New" panose="02070309020205020404" pitchFamily="49" charset="0"/>
+                <a:cs typeface="Courier New" panose="02070309020205020404" pitchFamily="49" charset="0"/>
+              </a:rPr>
+              <a:t>y</a:t>
+            </a:r>
+          </a:p>
+          <a:p>
+            <a:pPr algn="ctr"/>
+            <a:endParaRPr lang="en-US" dirty="0">
+              <a:latin typeface="Courier New" panose="02070309020205020404" pitchFamily="49" charset="0"/>
+              <a:cs typeface="Courier New" panose="02070309020205020404" pitchFamily="49" charset="0"/>
+            </a:endParaRPr>
+          </a:p>
+          <a:p>
+            <a:pPr algn="ctr"/>
+            <a:r>
+              <a:rPr lang="en-US" dirty="0">
+                <a:latin typeface="Courier New" panose="02070309020205020404" pitchFamily="49" charset="0"/>
+                <a:cs typeface="Courier New" panose="02070309020205020404" pitchFamily="49" charset="0"/>
+              </a:rPr>
+              <a:t>J</a:t>
+            </a:r>
+          </a:p>
+          <a:p>
+            <a:pPr algn="ctr"/>
+            <a:r>
+              <a:rPr lang="en-US" dirty="0">
+                <a:latin typeface="Courier New" panose="02070309020205020404" pitchFamily="49" charset="0"/>
+                <a:cs typeface="Courier New" panose="02070309020205020404" pitchFamily="49" charset="0"/>
+              </a:rPr>
+              <a:t>N</a:t>
+            </a:r>
+          </a:p>
+          <a:p>
+            <a:pPr algn="ctr"/>
+            <a:r>
+              <a:rPr lang="en-US" dirty="0">
+                <a:latin typeface="Courier New" panose="02070309020205020404" pitchFamily="49" charset="0"/>
+                <a:cs typeface="Courier New" panose="02070309020205020404" pitchFamily="49" charset="0"/>
+              </a:rPr>
+              <a:t>J</a:t>
+            </a:r>
+          </a:p>
+          <a:p>
+            <a:pPr algn="ctr"/>
+            <a:r>
+              <a:rPr lang="en-US" dirty="0">
+                <a:latin typeface="Courier New" panose="02070309020205020404" pitchFamily="49" charset="0"/>
+                <a:cs typeface="Courier New" panose="02070309020205020404" pitchFamily="49" charset="0"/>
+              </a:rPr>
+              <a:t>J</a:t>
+            </a:r>
+          </a:p>
+        </p:txBody>
+      </p:sp>
+      <p:sp>
+        <p:nvSpPr>
+          <p:cNvPr id="8" name="TextBox 7">
+            <a:extLst>
+              <a:ext uri="{FF2B5EF4-FFF2-40B4-BE49-F238E27FC236}">
+                <a16:creationId xmlns:a16="http://schemas.microsoft.com/office/drawing/2014/main" id="{3B6B8D84-9DE4-9A64-6F1F-72B18AE69461}"/>
+              </a:ext>
+            </a:extLst>
+          </p:cNvPr>
+          <p:cNvSpPr txBox="1"/>
+          <p:nvPr/>
+        </p:nvSpPr>
+        <p:spPr>
+          <a:xfrm>
+            <a:off x="4886467" y="3472830"/>
+            <a:ext cx="1782169" cy="1754326"/>
+          </a:xfrm>
+          <a:prstGeom prst="rect">
+            <a:avLst/>
+          </a:prstGeom>
+        </p:spPr>
+        <p:style>
+          <a:lnRef idx="2">
+            <a:schemeClr val="accent1"/>
+          </a:lnRef>
+          <a:fillRef idx="1">
+            <a:schemeClr val="lt1"/>
+          </a:fillRef>
+          <a:effectRef idx="0">
+            <a:schemeClr val="accent1"/>
+          </a:effectRef>
+          <a:fontRef idx="minor">
+            <a:schemeClr val="dk1"/>
+          </a:fontRef>
+        </p:style>
+        <p:txBody>
+          <a:bodyPr wrap="square" rtlCol="0">
+            <a:spAutoFit/>
+          </a:bodyPr>
+          <a:lstStyle/>
+          <a:p>
+            <a:pPr algn="ctr"/>
+            <a:r>
+              <a:rPr lang="en-US" b="1" dirty="0">
+                <a:latin typeface="Courier New" panose="02070309020205020404" pitchFamily="49" charset="0"/>
+                <a:cs typeface="Courier New" panose="02070309020205020404" pitchFamily="49" charset="0"/>
+              </a:rPr>
+              <a:t>Weights</a:t>
+            </a:r>
+          </a:p>
+          <a:p>
+            <a:pPr algn="ctr"/>
+            <a:endParaRPr lang="en-US" b="1" dirty="0">
+              <a:latin typeface="Courier New" panose="02070309020205020404" pitchFamily="49" charset="0"/>
+              <a:cs typeface="Courier New" panose="02070309020205020404" pitchFamily="49" charset="0"/>
+            </a:endParaRPr>
+          </a:p>
+          <a:p>
+            <a:pPr algn="ctr"/>
+            <a:r>
+              <a:rPr lang="el-GR" dirty="0">
+                <a:latin typeface="Courier New" panose="02070309020205020404" pitchFamily="49" charset="0"/>
+                <a:cs typeface="Courier New" panose="02070309020205020404" pitchFamily="49" charset="0"/>
+              </a:rPr>
+              <a:t>β</a:t>
+            </a:r>
+            <a:r>
+              <a:rPr lang="en-US" dirty="0">
+                <a:latin typeface="Courier New" panose="02070309020205020404" pitchFamily="49" charset="0"/>
+                <a:cs typeface="Courier New" panose="02070309020205020404" pitchFamily="49" charset="0"/>
+              </a:rPr>
+              <a:t>0 = 20.0</a:t>
+            </a:r>
+          </a:p>
+          <a:p>
+            <a:pPr algn="ctr"/>
+            <a:r>
+              <a:rPr lang="el-GR" dirty="0">
+                <a:latin typeface="Courier New" panose="02070309020205020404" pitchFamily="49" charset="0"/>
+                <a:cs typeface="Courier New" panose="02070309020205020404" pitchFamily="49" charset="0"/>
+              </a:rPr>
+              <a:t>β</a:t>
+            </a:r>
+            <a:r>
+              <a:rPr lang="en-US" dirty="0">
+                <a:latin typeface="Courier New" panose="02070309020205020404" pitchFamily="49" charset="0"/>
+                <a:cs typeface="Courier New" panose="02070309020205020404" pitchFamily="49" charset="0"/>
+              </a:rPr>
+              <a:t>1 = -0.5</a:t>
+            </a:r>
+          </a:p>
+          <a:p>
+            <a:pPr algn="ctr"/>
+            <a:r>
+              <a:rPr lang="el-GR" dirty="0">
+                <a:latin typeface="Courier New" panose="02070309020205020404" pitchFamily="49" charset="0"/>
+                <a:cs typeface="Courier New" panose="02070309020205020404" pitchFamily="49" charset="0"/>
+              </a:rPr>
+              <a:t>β</a:t>
+            </a:r>
+            <a:r>
+              <a:rPr lang="en-US" dirty="0">
+                <a:latin typeface="Courier New" panose="02070309020205020404" pitchFamily="49" charset="0"/>
+                <a:cs typeface="Courier New" panose="02070309020205020404" pitchFamily="49" charset="0"/>
+              </a:rPr>
+              <a:t>2 =  5.3</a:t>
+            </a:r>
+          </a:p>
+          <a:p>
+            <a:pPr algn="ctr"/>
+            <a:r>
+              <a:rPr lang="el-GR" dirty="0">
+                <a:latin typeface="Courier New" panose="02070309020205020404" pitchFamily="49" charset="0"/>
+                <a:cs typeface="Courier New" panose="02070309020205020404" pitchFamily="49" charset="0"/>
+              </a:rPr>
+              <a:t>β</a:t>
+            </a:r>
+            <a:r>
+              <a:rPr lang="en-US" dirty="0">
+                <a:latin typeface="Courier New" panose="02070309020205020404" pitchFamily="49" charset="0"/>
+                <a:cs typeface="Courier New" panose="02070309020205020404" pitchFamily="49" charset="0"/>
+              </a:rPr>
+              <a:t>3 = -3.0</a:t>
+            </a:r>
+          </a:p>
+        </p:txBody>
+      </p:sp>
+      <p:cxnSp>
+        <p:nvCxnSpPr>
+          <p:cNvPr id="11" name="Straight Arrow Connector 10">
+            <a:extLst>
+              <a:ext uri="{FF2B5EF4-FFF2-40B4-BE49-F238E27FC236}">
+                <a16:creationId xmlns:a16="http://schemas.microsoft.com/office/drawing/2014/main" id="{FF3D3B16-050A-E0DC-7795-6CE8D1254478}"/>
+              </a:ext>
+            </a:extLst>
+          </p:cNvPr>
+          <p:cNvCxnSpPr>
+            <a:stCxn id="3" idx="3"/>
+            <a:endCxn id="10" idx="1"/>
+          </p:cNvCxnSpPr>
+          <p:nvPr/>
+        </p:nvCxnSpPr>
+        <p:spPr>
+          <a:xfrm>
+            <a:off x="3071888" y="2950157"/>
+            <a:ext cx="1814581" cy="1"/>
+          </a:xfrm>
+          <a:prstGeom prst="straightConnector1">
+            <a:avLst/>
+          </a:prstGeom>
+          <a:ln>
+            <a:tailEnd type="triangle"/>
+          </a:ln>
+        </p:spPr>
+        <p:style>
+          <a:lnRef idx="3">
+            <a:schemeClr val="dk1"/>
+          </a:lnRef>
+          <a:fillRef idx="0">
+            <a:schemeClr val="dk1"/>
+          </a:fillRef>
+          <a:effectRef idx="2">
+            <a:schemeClr val="dk1"/>
+          </a:effectRef>
+          <a:fontRef idx="minor">
+            <a:schemeClr val="tx1"/>
+          </a:fontRef>
+        </p:style>
+      </p:cxnSp>
+      <p:sp>
+        <p:nvSpPr>
+          <p:cNvPr id="12" name="TextBox 11">
+            <a:extLst>
+              <a:ext uri="{FF2B5EF4-FFF2-40B4-BE49-F238E27FC236}">
+                <a16:creationId xmlns:a16="http://schemas.microsoft.com/office/drawing/2014/main" id="{C4399471-B6CB-1D73-E6A7-76E4359793F7}"/>
+              </a:ext>
+            </a:extLst>
+          </p:cNvPr>
+          <p:cNvSpPr txBox="1"/>
+          <p:nvPr/>
+        </p:nvSpPr>
+        <p:spPr>
+          <a:xfrm>
+            <a:off x="3071888" y="2590853"/>
+            <a:ext cx="1761128" cy="369332"/>
+          </a:xfrm>
+          <a:prstGeom prst="rect">
+            <a:avLst/>
+          </a:prstGeom>
+          <a:noFill/>
+        </p:spPr>
+        <p:txBody>
+          <a:bodyPr wrap="square" rtlCol="0">
+            <a:spAutoFit/>
+          </a:bodyPr>
+          <a:lstStyle/>
+          <a:p>
+            <a:pPr algn="ctr"/>
+            <a:r>
+              <a:rPr lang="en-US" dirty="0">
+                <a:latin typeface="Courier New" panose="02070309020205020404" pitchFamily="49" charset="0"/>
+                <a:cs typeface="Courier New" panose="02070309020205020404" pitchFamily="49" charset="0"/>
+              </a:rPr>
+              <a:t>fit()</a:t>
+            </a:r>
+            <a:endParaRPr lang="en-NL" dirty="0">
+              <a:latin typeface="Courier New" panose="02070309020205020404" pitchFamily="49" charset="0"/>
+              <a:cs typeface="Courier New" panose="02070309020205020404" pitchFamily="49" charset="0"/>
+            </a:endParaRPr>
+          </a:p>
+        </p:txBody>
+      </p:sp>
+      <p:sp>
+        <p:nvSpPr>
+          <p:cNvPr id="4" name="Rectangle 3">
+            <a:extLst>
+              <a:ext uri="{FF2B5EF4-FFF2-40B4-BE49-F238E27FC236}">
+                <a16:creationId xmlns:a16="http://schemas.microsoft.com/office/drawing/2014/main" id="{B3C955DC-C8B4-639C-2E09-15849F6B59CF}"/>
+              </a:ext>
+            </a:extLst>
+          </p:cNvPr>
+          <p:cNvSpPr/>
+          <p:nvPr/>
+        </p:nvSpPr>
+        <p:spPr>
+          <a:xfrm>
+            <a:off x="8483215" y="1083734"/>
+            <a:ext cx="1782170" cy="718608"/>
+          </a:xfrm>
+          <a:prstGeom prst="rect">
+            <a:avLst/>
+          </a:prstGeom>
+        </p:spPr>
+        <p:style>
+          <a:lnRef idx="1">
+            <a:schemeClr val="accent2"/>
+          </a:lnRef>
+          <a:fillRef idx="2">
+            <a:schemeClr val="accent2"/>
+          </a:fillRef>
+          <a:effectRef idx="1">
+            <a:schemeClr val="accent2"/>
+          </a:effectRef>
+          <a:fontRef idx="minor">
+            <a:schemeClr val="dk1"/>
+          </a:fontRef>
+        </p:style>
+        <p:txBody>
+          <a:bodyPr rtlCol="0" anchor="ctr"/>
+          <a:lstStyle/>
+          <a:p>
+            <a:pPr algn="ctr"/>
+            <a:r>
+              <a:rPr lang="nl-NL" dirty="0"/>
+              <a:t>Score data</a:t>
+            </a:r>
+          </a:p>
+        </p:txBody>
+      </p:sp>
+      <p:sp>
+        <p:nvSpPr>
+          <p:cNvPr id="5" name="TextBox 4">
+            <a:extLst>
+              <a:ext uri="{FF2B5EF4-FFF2-40B4-BE49-F238E27FC236}">
+                <a16:creationId xmlns:a16="http://schemas.microsoft.com/office/drawing/2014/main" id="{2EA6F49D-F163-06F2-D31F-58F7CDFBDC52}"/>
+              </a:ext>
+            </a:extLst>
+          </p:cNvPr>
+          <p:cNvSpPr txBox="1"/>
+          <p:nvPr/>
+        </p:nvSpPr>
+        <p:spPr>
+          <a:xfrm>
+            <a:off x="8483216" y="1963860"/>
+            <a:ext cx="1782169" cy="1200329"/>
+          </a:xfrm>
+          <a:prstGeom prst="rect">
+            <a:avLst/>
+          </a:prstGeom>
+        </p:spPr>
+        <p:style>
+          <a:lnRef idx="2">
+            <a:schemeClr val="accent2"/>
+          </a:lnRef>
+          <a:fillRef idx="1">
+            <a:schemeClr val="lt1"/>
+          </a:fillRef>
+          <a:effectRef idx="0">
+            <a:schemeClr val="accent2"/>
+          </a:effectRef>
+          <a:fontRef idx="minor">
+            <a:schemeClr val="dk1"/>
+          </a:fontRef>
+        </p:style>
+        <p:txBody>
+          <a:bodyPr wrap="square" rtlCol="0">
+            <a:spAutoFit/>
+          </a:bodyPr>
+          <a:lstStyle/>
+          <a:p>
+            <a:pPr algn="ctr"/>
+            <a:r>
+              <a:rPr lang="en-US" b="1" dirty="0">
+                <a:latin typeface="Courier New" panose="02070309020205020404" pitchFamily="49" charset="0"/>
+                <a:cs typeface="Courier New" panose="02070309020205020404" pitchFamily="49" charset="0"/>
+              </a:rPr>
+              <a:t>X</a:t>
+            </a:r>
+          </a:p>
+          <a:p>
+            <a:pPr algn="ctr"/>
+            <a:endParaRPr lang="en-US" dirty="0">
+              <a:latin typeface="Courier New" panose="02070309020205020404" pitchFamily="49" charset="0"/>
+              <a:cs typeface="Courier New" panose="02070309020205020404" pitchFamily="49" charset="0"/>
+            </a:endParaRPr>
+          </a:p>
+          <a:p>
+            <a:pPr algn="ctr"/>
+            <a:r>
+              <a:rPr lang="en-US" dirty="0">
+                <a:latin typeface="Courier New" panose="02070309020205020404" pitchFamily="49" charset="0"/>
+                <a:cs typeface="Courier New" panose="02070309020205020404" pitchFamily="49" charset="0"/>
+              </a:rPr>
+              <a:t>7, A, 0</a:t>
+            </a:r>
+          </a:p>
+          <a:p>
+            <a:pPr algn="ctr"/>
+            <a:r>
+              <a:rPr lang="en-US" dirty="0">
+                <a:latin typeface="Courier New" panose="02070309020205020404" pitchFamily="49" charset="0"/>
+                <a:cs typeface="Courier New" panose="02070309020205020404" pitchFamily="49" charset="0"/>
+              </a:rPr>
+              <a:t>3, B, 0</a:t>
+            </a:r>
+          </a:p>
+        </p:txBody>
+      </p:sp>
+      <p:cxnSp>
+        <p:nvCxnSpPr>
+          <p:cNvPr id="13" name="Straight Arrow Connector 12">
+            <a:extLst>
+              <a:ext uri="{FF2B5EF4-FFF2-40B4-BE49-F238E27FC236}">
+                <a16:creationId xmlns:a16="http://schemas.microsoft.com/office/drawing/2014/main" id="{7530C0B6-FD4C-1189-A454-41C537622827}"/>
+              </a:ext>
+            </a:extLst>
+          </p:cNvPr>
+          <p:cNvCxnSpPr>
+            <a:stCxn id="4" idx="1"/>
+            <a:endCxn id="10" idx="3"/>
+          </p:cNvCxnSpPr>
+          <p:nvPr/>
+        </p:nvCxnSpPr>
+        <p:spPr>
+          <a:xfrm flipH="1">
+            <a:off x="6668639" y="1443038"/>
+            <a:ext cx="1814576" cy="1507120"/>
+          </a:xfrm>
+          <a:prstGeom prst="straightConnector1">
+            <a:avLst/>
+          </a:prstGeom>
+          <a:ln>
+            <a:tailEnd type="triangle"/>
+          </a:ln>
+        </p:spPr>
+        <p:style>
+          <a:lnRef idx="3">
+            <a:schemeClr val="dk1"/>
+          </a:lnRef>
+          <a:fillRef idx="0">
+            <a:schemeClr val="dk1"/>
+          </a:fillRef>
+          <a:effectRef idx="2">
+            <a:schemeClr val="dk1"/>
+          </a:effectRef>
+          <a:fontRef idx="minor">
+            <a:schemeClr val="tx1"/>
+          </a:fontRef>
+        </p:style>
+      </p:cxnSp>
+      <p:sp>
+        <p:nvSpPr>
+          <p:cNvPr id="14" name="TextBox 13">
+            <a:extLst>
+              <a:ext uri="{FF2B5EF4-FFF2-40B4-BE49-F238E27FC236}">
+                <a16:creationId xmlns:a16="http://schemas.microsoft.com/office/drawing/2014/main" id="{A9E7BF65-0C3A-1972-D427-56AC78BD677E}"/>
+              </a:ext>
+            </a:extLst>
+          </p:cNvPr>
+          <p:cNvSpPr txBox="1"/>
+          <p:nvPr/>
+        </p:nvSpPr>
+        <p:spPr>
+          <a:xfrm>
+            <a:off x="6096000" y="1779194"/>
+            <a:ext cx="1425390" cy="369332"/>
+          </a:xfrm>
+          <a:prstGeom prst="rect">
+            <a:avLst/>
+          </a:prstGeom>
+          <a:noFill/>
+        </p:spPr>
+        <p:txBody>
+          <a:bodyPr wrap="none" rtlCol="0">
+            <a:spAutoFit/>
+          </a:bodyPr>
+          <a:lstStyle/>
+          <a:p>
+            <a:r>
+              <a:rPr lang="en-US" dirty="0">
+                <a:latin typeface="Courier New" panose="02070309020205020404" pitchFamily="49" charset="0"/>
+                <a:cs typeface="Courier New" panose="02070309020205020404" pitchFamily="49" charset="0"/>
+              </a:rPr>
+              <a:t>predict()</a:t>
+            </a:r>
+            <a:endParaRPr lang="en-NL" dirty="0">
+              <a:latin typeface="Courier New" panose="02070309020205020404" pitchFamily="49" charset="0"/>
+              <a:cs typeface="Courier New" panose="02070309020205020404" pitchFamily="49" charset="0"/>
+            </a:endParaRPr>
+          </a:p>
+        </p:txBody>
+      </p:sp>
+      <p:sp>
+        <p:nvSpPr>
+          <p:cNvPr id="16" name="Rectangle 15">
+            <a:extLst>
+              <a:ext uri="{FF2B5EF4-FFF2-40B4-BE49-F238E27FC236}">
+                <a16:creationId xmlns:a16="http://schemas.microsoft.com/office/drawing/2014/main" id="{F5ABB64D-683B-AAF5-7B5D-3BDC7106FC76}"/>
+              </a:ext>
+            </a:extLst>
+          </p:cNvPr>
+          <p:cNvSpPr/>
+          <p:nvPr/>
+        </p:nvSpPr>
+        <p:spPr>
+          <a:xfrm>
+            <a:off x="8483215" y="3990689"/>
+            <a:ext cx="1782170" cy="718608"/>
+          </a:xfrm>
+          <a:prstGeom prst="rect">
+            <a:avLst/>
+          </a:prstGeom>
+        </p:spPr>
+        <p:style>
+          <a:lnRef idx="1">
+            <a:schemeClr val="accent6"/>
+          </a:lnRef>
+          <a:fillRef idx="2">
+            <a:schemeClr val="accent6"/>
+          </a:fillRef>
+          <a:effectRef idx="1">
+            <a:schemeClr val="accent6"/>
+          </a:effectRef>
+          <a:fontRef idx="minor">
+            <a:schemeClr val="dk1"/>
+          </a:fontRef>
+        </p:style>
+        <p:txBody>
+          <a:bodyPr rtlCol="0" anchor="ctr"/>
+          <a:lstStyle/>
+          <a:p>
+            <a:pPr algn="ctr"/>
+            <a:r>
+              <a:rPr lang="nl-NL" dirty="0"/>
+              <a:t>Voorspellingen</a:t>
+            </a:r>
+          </a:p>
+        </p:txBody>
+      </p:sp>
+      <p:sp>
+        <p:nvSpPr>
+          <p:cNvPr id="17" name="TextBox 16">
+            <a:extLst>
+              <a:ext uri="{FF2B5EF4-FFF2-40B4-BE49-F238E27FC236}">
+                <a16:creationId xmlns:a16="http://schemas.microsoft.com/office/drawing/2014/main" id="{F4A24288-901E-B22C-41E6-AA18A6F1E4E7}"/>
+              </a:ext>
+            </a:extLst>
+          </p:cNvPr>
+          <p:cNvSpPr txBox="1"/>
+          <p:nvPr/>
+        </p:nvSpPr>
+        <p:spPr>
+          <a:xfrm>
+            <a:off x="8483216" y="4857824"/>
+            <a:ext cx="1782169" cy="369332"/>
+          </a:xfrm>
+          <a:prstGeom prst="rect">
+            <a:avLst/>
+          </a:prstGeom>
+        </p:spPr>
+        <p:style>
+          <a:lnRef idx="2">
+            <a:schemeClr val="accent6"/>
+          </a:lnRef>
+          <a:fillRef idx="1">
+            <a:schemeClr val="lt1"/>
+          </a:fillRef>
+          <a:effectRef idx="0">
+            <a:schemeClr val="accent6"/>
+          </a:effectRef>
+          <a:fontRef idx="minor">
+            <a:schemeClr val="dk1"/>
+          </a:fontRef>
+        </p:style>
+        <p:txBody>
+          <a:bodyPr wrap="square" rtlCol="0">
+            <a:spAutoFit/>
+          </a:bodyPr>
+          <a:lstStyle/>
+          <a:p>
+            <a:pPr algn="ctr"/>
+            <a:r>
+              <a:rPr lang="en-US" dirty="0">
+                <a:latin typeface="Courier New" panose="02070309020205020404" pitchFamily="49" charset="0"/>
+                <a:cs typeface="Courier New" panose="02070309020205020404" pitchFamily="49" charset="0"/>
+              </a:rPr>
+              <a:t>J N</a:t>
+            </a:r>
+          </a:p>
+        </p:txBody>
+      </p:sp>
+      <p:cxnSp>
+        <p:nvCxnSpPr>
+          <p:cNvPr id="20" name="Straight Arrow Connector 19">
+            <a:extLst>
+              <a:ext uri="{FF2B5EF4-FFF2-40B4-BE49-F238E27FC236}">
+                <a16:creationId xmlns:a16="http://schemas.microsoft.com/office/drawing/2014/main" id="{C55C79AD-9AB7-1B6D-FEE5-E67C596001E0}"/>
+              </a:ext>
+            </a:extLst>
+          </p:cNvPr>
+          <p:cNvCxnSpPr>
+            <a:stCxn id="10" idx="3"/>
+            <a:endCxn id="16" idx="1"/>
+          </p:cNvCxnSpPr>
+          <p:nvPr/>
+        </p:nvCxnSpPr>
+        <p:spPr>
+          <a:xfrm>
+            <a:off x="6668639" y="2950158"/>
+            <a:ext cx="1814576" cy="1399835"/>
+          </a:xfrm>
+          <a:prstGeom prst="straightConnector1">
+            <a:avLst/>
+          </a:prstGeom>
+          <a:ln>
+            <a:tailEnd type="triangle"/>
+          </a:ln>
+        </p:spPr>
+        <p:style>
+          <a:lnRef idx="3">
+            <a:schemeClr val="dk1"/>
+          </a:lnRef>
+          <a:fillRef idx="0">
+            <a:schemeClr val="dk1"/>
+          </a:fillRef>
+          <a:effectRef idx="2">
+            <a:schemeClr val="dk1"/>
+          </a:effectRef>
+          <a:fontRef idx="minor">
+            <a:schemeClr val="tx1"/>
+          </a:fontRef>
+        </p:style>
+      </p:cxnSp>
+    </p:spTree>
+    <p:extLst>
+      <p:ext uri="{BB962C8B-B14F-4D97-AF65-F5344CB8AC3E}">
+        <p14:creationId xmlns:p14="http://schemas.microsoft.com/office/powerpoint/2010/main" val="3732690073"/>
+      </p:ext>
+    </p:extLst>
+  </p:cSld>
+  <p:clrMapOvr>
+    <a:masterClrMapping/>
+  </p:clrMapOvr>
+</p:sld>
+</file>
+
+<file path=ppt/slides/slide19.xml><?xml version="1.0" encoding="utf-8"?>
+<p:sld xmlns:a="http://schemas.openxmlformats.org/drawingml/2006/main" xmlns:r="http://schemas.openxmlformats.org/officeDocument/2006/relationships" xmlns:p="http://schemas.openxmlformats.org/presentationml/2006/main">
+  <p:cSld>
+    <p:spTree>
+      <p:nvGrpSpPr>
+        <p:cNvPr id="1" name=""/>
+        <p:cNvGrpSpPr/>
+        <p:nvPr/>
+      </p:nvGrpSpPr>
+      <p:grpSpPr>
+        <a:xfrm>
+          <a:off x="0" y="0"/>
+          <a:ext cx="0" cy="0"/>
+          <a:chOff x="0" y="0"/>
+          <a:chExt cx="0" cy="0"/>
+        </a:xfrm>
+      </p:grpSpPr>
+      <p:sp>
+        <p:nvSpPr>
+          <p:cNvPr id="4" name="Title 3">
+            <a:extLst>
+              <a:ext uri="{FF2B5EF4-FFF2-40B4-BE49-F238E27FC236}">
+                <a16:creationId xmlns:a16="http://schemas.microsoft.com/office/drawing/2014/main" id="{72C925CA-BCA3-3701-E08E-95652380B32E}"/>
               </a:ext>
             </a:extLst>
           </p:cNvPr>
@@ -6903,126 +9026,50 @@
             <a:spLocks noGrp="1"/>
           </p:cNvSpPr>
           <p:nvPr>
-            <p:ph idx="1"/>
+            <p:ph type="title"/>
           </p:nvPr>
         </p:nvSpPr>
-        <p:spPr>
-          <a:xfrm>
-            <a:off x="838200" y="1456267"/>
-            <a:ext cx="9658865" cy="4720696"/>
-          </a:xfrm>
-        </p:spPr>
-        <p:txBody>
-          <a:bodyPr>
-            <a:normAutofit/>
-          </a:bodyPr>
-          <a:lstStyle/>
-          <a:p>
-            <a:pPr marL="0" indent="0">
-              <a:buNone/>
-            </a:pPr>
-            <a:r>
-              <a:rPr lang="nl-NL" sz="2000" b="1" noProof="0" dirty="0"/>
-              <a:t>Ken je data!</a:t>
-            </a:r>
-          </a:p>
-          <a:p>
-            <a:pPr>
-              <a:buFontTx/>
-              <a:buChar char="-"/>
-            </a:pPr>
-            <a:r>
-              <a:rPr lang="nl-NL" sz="2000" dirty="0"/>
-              <a:t>Data is belangrijkste sleutel voor succes!</a:t>
-            </a:r>
-          </a:p>
-          <a:p>
-            <a:pPr>
-              <a:buFontTx/>
-              <a:buChar char="-"/>
-            </a:pPr>
-            <a:r>
-              <a:rPr lang="nl-NL" sz="2000" dirty="0"/>
-              <a:t>Ken de achterliggende concepten en processen.</a:t>
-            </a:r>
-          </a:p>
-          <a:p>
-            <a:pPr marL="0" indent="0">
-              <a:buNone/>
-            </a:pPr>
-            <a:endParaRPr lang="nl-NL" sz="2000" b="1" noProof="0" dirty="0"/>
-          </a:p>
-          <a:p>
-            <a:pPr marL="0" indent="0">
-              <a:buNone/>
-            </a:pPr>
-            <a:r>
-              <a:rPr lang="nl-NL" sz="2000" b="1" dirty="0"/>
-              <a:t>Wat is het doel?</a:t>
-            </a:r>
-          </a:p>
-          <a:p>
-            <a:pPr>
-              <a:buFontTx/>
-              <a:buChar char="-"/>
-            </a:pPr>
-            <a:r>
-              <a:rPr lang="nl-NL" sz="2000" dirty="0"/>
-              <a:t>Wat wil men bereiken en wat is daarvoor belangrijk?</a:t>
-            </a:r>
-          </a:p>
-          <a:p>
-            <a:pPr>
-              <a:buFontTx/>
-              <a:buChar char="-"/>
-            </a:pPr>
-            <a:r>
-              <a:rPr lang="nl-NL" sz="2000" noProof="0" dirty="0"/>
-              <a:t>Accuratesse, geen fouten maken, uitlegbaarheid?</a:t>
-            </a:r>
-          </a:p>
-          <a:p>
-            <a:pPr>
-              <a:buFontTx/>
-              <a:buChar char="-"/>
-            </a:pPr>
-            <a:r>
-              <a:rPr lang="nl-NL" sz="2000" dirty="0"/>
-              <a:t>ML is niet altijd </a:t>
-            </a:r>
-            <a:r>
-              <a:rPr lang="nl-NL" sz="2000"/>
-              <a:t>de beste </a:t>
-            </a:r>
-            <a:r>
-              <a:rPr lang="nl-NL" sz="2000" dirty="0"/>
-              <a:t>optie…</a:t>
-            </a:r>
-          </a:p>
-          <a:p>
-            <a:pPr marL="0" indent="0">
-              <a:buNone/>
-            </a:pPr>
-            <a:endParaRPr lang="nl-NL" sz="2000" noProof="0" dirty="0"/>
-          </a:p>
-          <a:p>
-            <a:pPr marL="0" indent="0">
-              <a:buNone/>
-            </a:pPr>
-            <a:endParaRPr lang="nl-NL" sz="2000" noProof="0" dirty="0"/>
-          </a:p>
-          <a:p>
-            <a:pPr marL="0" indent="0">
-              <a:buNone/>
-            </a:pPr>
-            <a:endParaRPr lang="nl-NL" sz="2000" dirty="0"/>
+        <p:spPr/>
+        <p:txBody>
+          <a:bodyPr/>
+          <a:lstStyle/>
+          <a:p>
+            <a:r>
+              <a:rPr lang="nl-NL" noProof="0" dirty="0"/>
+              <a:t>Valideren</a:t>
+            </a:r>
+          </a:p>
+        </p:txBody>
+      </p:sp>
+      <p:sp>
+        <p:nvSpPr>
+          <p:cNvPr id="5" name="Text Placeholder 4">
+            <a:extLst>
+              <a:ext uri="{FF2B5EF4-FFF2-40B4-BE49-F238E27FC236}">
+                <a16:creationId xmlns:a16="http://schemas.microsoft.com/office/drawing/2014/main" id="{1AB31C95-91AF-DF13-FB58-0DA5F2D9F6F7}"/>
+              </a:ext>
+            </a:extLst>
+          </p:cNvPr>
+          <p:cNvSpPr>
+            <a:spLocks noGrp="1"/>
+          </p:cNvSpPr>
+          <p:nvPr>
+            <p:ph type="body" idx="1"/>
+          </p:nvPr>
+        </p:nvSpPr>
+        <p:spPr/>
+        <p:txBody>
+          <a:bodyPr/>
+          <a:lstStyle/>
+          <a:p>
+            <a:endParaRPr lang="en-NL"/>
           </a:p>
         </p:txBody>
       </p:sp>
     </p:spTree>
     <p:extLst>
       <p:ext uri="{BB962C8B-B14F-4D97-AF65-F5344CB8AC3E}">
-        <p14:creationId xmlns:p14="http://schemas.microsoft.com/office/powerpoint/2010/main" val="1542375319"/>
+        <p14:creationId xmlns:p14="http://schemas.microsoft.com/office/powerpoint/2010/main" val="3662473669"/>
       </p:ext>
     </p:extLst>
   </p:cSld>
@@ -7271,6 +9318,1874 @@
     <p:extLst>
       <p:ext uri="{BB962C8B-B14F-4D97-AF65-F5344CB8AC3E}">
         <p14:creationId xmlns:p14="http://schemas.microsoft.com/office/powerpoint/2010/main" val="1265611121"/>
+      </p:ext>
+    </p:extLst>
+  </p:cSld>
+  <p:clrMapOvr>
+    <a:masterClrMapping/>
+  </p:clrMapOvr>
+</p:sld>
+</file>
+
+<file path=ppt/slides/slide20.xml><?xml version="1.0" encoding="utf-8"?>
+<p:sld xmlns:a="http://schemas.openxmlformats.org/drawingml/2006/main" xmlns:r="http://schemas.openxmlformats.org/officeDocument/2006/relationships" xmlns:p="http://schemas.openxmlformats.org/presentationml/2006/main">
+  <p:cSld>
+    <p:spTree>
+      <p:nvGrpSpPr>
+        <p:cNvPr id="1" name=""/>
+        <p:cNvGrpSpPr/>
+        <p:nvPr/>
+      </p:nvGrpSpPr>
+      <p:grpSpPr>
+        <a:xfrm>
+          <a:off x="0" y="0"/>
+          <a:ext cx="0" cy="0"/>
+          <a:chOff x="0" y="0"/>
+          <a:chExt cx="0" cy="0"/>
+        </a:xfrm>
+      </p:grpSpPr>
+      <p:sp>
+        <p:nvSpPr>
+          <p:cNvPr id="2" name="Title 1">
+            <a:extLst>
+              <a:ext uri="{FF2B5EF4-FFF2-40B4-BE49-F238E27FC236}">
+                <a16:creationId xmlns:a16="http://schemas.microsoft.com/office/drawing/2014/main" id="{39A1D606-8DD1-369C-5C09-471CDD551AD5}"/>
+              </a:ext>
+            </a:extLst>
+          </p:cNvPr>
+          <p:cNvSpPr>
+            <a:spLocks noGrp="1"/>
+          </p:cNvSpPr>
+          <p:nvPr>
+            <p:ph type="title"/>
+          </p:nvPr>
+        </p:nvSpPr>
+        <p:spPr>
+          <a:xfrm>
+            <a:off x="838200" y="365126"/>
+            <a:ext cx="10515600" cy="718608"/>
+          </a:xfrm>
+        </p:spPr>
+        <p:txBody>
+          <a:bodyPr>
+            <a:normAutofit/>
+          </a:bodyPr>
+          <a:lstStyle/>
+          <a:p>
+            <a:r>
+              <a:rPr lang="nl-NL" sz="3600" noProof="0" dirty="0"/>
+              <a:t>Valideren van een model</a:t>
+            </a:r>
+          </a:p>
+        </p:txBody>
+      </p:sp>
+      <p:sp>
+        <p:nvSpPr>
+          <p:cNvPr id="4" name="TextBox 3">
+            <a:extLst>
+              <a:ext uri="{FF2B5EF4-FFF2-40B4-BE49-F238E27FC236}">
+                <a16:creationId xmlns:a16="http://schemas.microsoft.com/office/drawing/2014/main" id="{B47EA95A-6DDD-ED89-357A-943A5BC87A94}"/>
+              </a:ext>
+            </a:extLst>
+          </p:cNvPr>
+          <p:cNvSpPr txBox="1"/>
+          <p:nvPr/>
+        </p:nvSpPr>
+        <p:spPr>
+          <a:xfrm>
+            <a:off x="6555232" y="2530561"/>
+            <a:ext cx="184731" cy="369332"/>
+          </a:xfrm>
+          <a:prstGeom prst="rect">
+            <a:avLst/>
+          </a:prstGeom>
+          <a:noFill/>
+        </p:spPr>
+        <p:txBody>
+          <a:bodyPr wrap="none" rtlCol="0">
+            <a:spAutoFit/>
+          </a:bodyPr>
+          <a:lstStyle/>
+          <a:p>
+            <a:endParaRPr lang="en-NL" dirty="0"/>
+          </a:p>
+        </p:txBody>
+      </p:sp>
+      <p:sp>
+        <p:nvSpPr>
+          <p:cNvPr id="9" name="Content Placeholder 2">
+            <a:extLst>
+              <a:ext uri="{FF2B5EF4-FFF2-40B4-BE49-F238E27FC236}">
+                <a16:creationId xmlns:a16="http://schemas.microsoft.com/office/drawing/2014/main" id="{859EFECF-ED02-A3B2-D77A-667F104FEDE5}"/>
+              </a:ext>
+            </a:extLst>
+          </p:cNvPr>
+          <p:cNvSpPr txBox="1">
+            <a:spLocks/>
+          </p:cNvSpPr>
+          <p:nvPr/>
+        </p:nvSpPr>
+        <p:spPr>
+          <a:xfrm>
+            <a:off x="990601" y="1608667"/>
+            <a:ext cx="6996403" cy="4720696"/>
+          </a:xfrm>
+          <a:prstGeom prst="rect">
+            <a:avLst/>
+          </a:prstGeom>
+        </p:spPr>
+        <p:txBody>
+          <a:bodyPr vert="horz" lIns="91440" tIns="45720" rIns="91440" bIns="45720" rtlCol="0">
+            <a:normAutofit/>
+          </a:bodyPr>
+          <a:lstStyle>
+            <a:lvl1pPr marL="228600" indent="-228600" algn="l" defTabSz="914400" rtl="0" eaLnBrk="1" latinLnBrk="0" hangingPunct="1">
+              <a:lnSpc>
+                <a:spcPct val="90000"/>
+              </a:lnSpc>
+              <a:spcBef>
+                <a:spcPts val="1000"/>
+              </a:spcBef>
+              <a:buFont typeface="Arial" panose="020B0604020202020204" pitchFamily="34" charset="0"/>
+              <a:buChar char="•"/>
+              <a:defRPr sz="2800" kern="1200">
+                <a:solidFill>
+                  <a:schemeClr val="tx1"/>
+                </a:solidFill>
+                <a:latin typeface="+mn-lt"/>
+                <a:ea typeface="+mn-ea"/>
+                <a:cs typeface="+mn-cs"/>
+              </a:defRPr>
+            </a:lvl1pPr>
+            <a:lvl2pPr marL="685800" indent="-228600" algn="l" defTabSz="914400" rtl="0" eaLnBrk="1" latinLnBrk="0" hangingPunct="1">
+              <a:lnSpc>
+                <a:spcPct val="90000"/>
+              </a:lnSpc>
+              <a:spcBef>
+                <a:spcPts val="500"/>
+              </a:spcBef>
+              <a:buFont typeface="Arial" panose="020B0604020202020204" pitchFamily="34" charset="0"/>
+              <a:buChar char="•"/>
+              <a:defRPr sz="2400" kern="1200">
+                <a:solidFill>
+                  <a:schemeClr val="tx1"/>
+                </a:solidFill>
+                <a:latin typeface="+mn-lt"/>
+                <a:ea typeface="+mn-ea"/>
+                <a:cs typeface="+mn-cs"/>
+              </a:defRPr>
+            </a:lvl2pPr>
+            <a:lvl3pPr marL="1143000" indent="-228600" algn="l" defTabSz="914400" rtl="0" eaLnBrk="1" latinLnBrk="0" hangingPunct="1">
+              <a:lnSpc>
+                <a:spcPct val="90000"/>
+              </a:lnSpc>
+              <a:spcBef>
+                <a:spcPts val="500"/>
+              </a:spcBef>
+              <a:buFont typeface="Arial" panose="020B0604020202020204" pitchFamily="34" charset="0"/>
+              <a:buChar char="•"/>
+              <a:defRPr sz="2000" kern="1200">
+                <a:solidFill>
+                  <a:schemeClr val="tx1"/>
+                </a:solidFill>
+                <a:latin typeface="+mn-lt"/>
+                <a:ea typeface="+mn-ea"/>
+                <a:cs typeface="+mn-cs"/>
+              </a:defRPr>
+            </a:lvl3pPr>
+            <a:lvl4pPr marL="1600200" indent="-228600" algn="l" defTabSz="914400" rtl="0" eaLnBrk="1" latinLnBrk="0" hangingPunct="1">
+              <a:lnSpc>
+                <a:spcPct val="90000"/>
+              </a:lnSpc>
+              <a:spcBef>
+                <a:spcPts val="500"/>
+              </a:spcBef>
+              <a:buFont typeface="Arial" panose="020B0604020202020204" pitchFamily="34" charset="0"/>
+              <a:buChar char="•"/>
+              <a:defRPr sz="1800" kern="1200">
+                <a:solidFill>
+                  <a:schemeClr val="tx1"/>
+                </a:solidFill>
+                <a:latin typeface="+mn-lt"/>
+                <a:ea typeface="+mn-ea"/>
+                <a:cs typeface="+mn-cs"/>
+              </a:defRPr>
+            </a:lvl4pPr>
+            <a:lvl5pPr marL="2057400" indent="-228600" algn="l" defTabSz="914400" rtl="0" eaLnBrk="1" latinLnBrk="0" hangingPunct="1">
+              <a:lnSpc>
+                <a:spcPct val="90000"/>
+              </a:lnSpc>
+              <a:spcBef>
+                <a:spcPts val="500"/>
+              </a:spcBef>
+              <a:buFont typeface="Arial" panose="020B0604020202020204" pitchFamily="34" charset="0"/>
+              <a:buChar char="•"/>
+              <a:defRPr sz="1800" kern="1200">
+                <a:solidFill>
+                  <a:schemeClr val="tx1"/>
+                </a:solidFill>
+                <a:latin typeface="+mn-lt"/>
+                <a:ea typeface="+mn-ea"/>
+                <a:cs typeface="+mn-cs"/>
+              </a:defRPr>
+            </a:lvl5pPr>
+            <a:lvl6pPr marL="2514600" indent="-228600" algn="l" defTabSz="914400" rtl="0" eaLnBrk="1" latinLnBrk="0" hangingPunct="1">
+              <a:lnSpc>
+                <a:spcPct val="90000"/>
+              </a:lnSpc>
+              <a:spcBef>
+                <a:spcPts val="500"/>
+              </a:spcBef>
+              <a:buFont typeface="Arial" panose="020B0604020202020204" pitchFamily="34" charset="0"/>
+              <a:buChar char="•"/>
+              <a:defRPr sz="1800" kern="1200">
+                <a:solidFill>
+                  <a:schemeClr val="tx1"/>
+                </a:solidFill>
+                <a:latin typeface="+mn-lt"/>
+                <a:ea typeface="+mn-ea"/>
+                <a:cs typeface="+mn-cs"/>
+              </a:defRPr>
+            </a:lvl6pPr>
+            <a:lvl7pPr marL="2971800" indent="-228600" algn="l" defTabSz="914400" rtl="0" eaLnBrk="1" latinLnBrk="0" hangingPunct="1">
+              <a:lnSpc>
+                <a:spcPct val="90000"/>
+              </a:lnSpc>
+              <a:spcBef>
+                <a:spcPts val="500"/>
+              </a:spcBef>
+              <a:buFont typeface="Arial" panose="020B0604020202020204" pitchFamily="34" charset="0"/>
+              <a:buChar char="•"/>
+              <a:defRPr sz="1800" kern="1200">
+                <a:solidFill>
+                  <a:schemeClr val="tx1"/>
+                </a:solidFill>
+                <a:latin typeface="+mn-lt"/>
+                <a:ea typeface="+mn-ea"/>
+                <a:cs typeface="+mn-cs"/>
+              </a:defRPr>
+            </a:lvl7pPr>
+            <a:lvl8pPr marL="3429000" indent="-228600" algn="l" defTabSz="914400" rtl="0" eaLnBrk="1" latinLnBrk="0" hangingPunct="1">
+              <a:lnSpc>
+                <a:spcPct val="90000"/>
+              </a:lnSpc>
+              <a:spcBef>
+                <a:spcPts val="500"/>
+              </a:spcBef>
+              <a:buFont typeface="Arial" panose="020B0604020202020204" pitchFamily="34" charset="0"/>
+              <a:buChar char="•"/>
+              <a:defRPr sz="1800" kern="1200">
+                <a:solidFill>
+                  <a:schemeClr val="tx1"/>
+                </a:solidFill>
+                <a:latin typeface="+mn-lt"/>
+                <a:ea typeface="+mn-ea"/>
+                <a:cs typeface="+mn-cs"/>
+              </a:defRPr>
+            </a:lvl8pPr>
+            <a:lvl9pPr marL="3886200" indent="-228600" algn="l" defTabSz="914400" rtl="0" eaLnBrk="1" latinLnBrk="0" hangingPunct="1">
+              <a:lnSpc>
+                <a:spcPct val="90000"/>
+              </a:lnSpc>
+              <a:spcBef>
+                <a:spcPts val="500"/>
+              </a:spcBef>
+              <a:buFont typeface="Arial" panose="020B0604020202020204" pitchFamily="34" charset="0"/>
+              <a:buChar char="•"/>
+              <a:defRPr sz="1800" kern="1200">
+                <a:solidFill>
+                  <a:schemeClr val="tx1"/>
+                </a:solidFill>
+                <a:latin typeface="+mn-lt"/>
+                <a:ea typeface="+mn-ea"/>
+                <a:cs typeface="+mn-cs"/>
+              </a:defRPr>
+            </a:lvl9pPr>
+          </a:lstStyle>
+          <a:p>
+            <a:pPr marL="0" indent="0">
+              <a:buNone/>
+            </a:pPr>
+            <a:r>
+              <a:rPr lang="en-US" sz="2000" dirty="0"/>
+              <a:t>Maten </a:t>
+            </a:r>
+            <a:r>
+              <a:rPr lang="en-US" sz="2000" dirty="0" err="1"/>
+              <a:t>voor</a:t>
+            </a:r>
+            <a:r>
+              <a:rPr lang="en-US" sz="2000" dirty="0"/>
+              <a:t> </a:t>
+            </a:r>
+            <a:r>
+              <a:rPr lang="en-US" sz="2000" dirty="0" err="1"/>
+              <a:t>kwaliteit</a:t>
+            </a:r>
+            <a:r>
+              <a:rPr lang="en-US" sz="2000" dirty="0"/>
+              <a:t> van </a:t>
+            </a:r>
+            <a:r>
+              <a:rPr lang="en-US" sz="2000" dirty="0" err="1"/>
+              <a:t>een</a:t>
+            </a:r>
+            <a:r>
+              <a:rPr lang="en-US" sz="2000" dirty="0"/>
+              <a:t> model:</a:t>
+            </a:r>
+          </a:p>
+          <a:p>
+            <a:pPr>
+              <a:buFontTx/>
+              <a:buChar char="-"/>
+            </a:pPr>
+            <a:r>
+              <a:rPr lang="en-US" sz="2000" dirty="0"/>
+              <a:t>Continue:	RMSE, mean absolute error, etc.</a:t>
+            </a:r>
+          </a:p>
+          <a:p>
+            <a:pPr>
+              <a:buFontTx/>
+              <a:buChar char="-"/>
+            </a:pPr>
+            <a:r>
+              <a:rPr lang="en-US" sz="2000" dirty="0" err="1"/>
+              <a:t>Categorisch</a:t>
+            </a:r>
+            <a:r>
+              <a:rPr lang="en-US" sz="2000" dirty="0"/>
+              <a:t>:	Accuracy, precision, recall, log loss, etc.</a:t>
+            </a:r>
+          </a:p>
+          <a:p>
+            <a:pPr marL="0" indent="0">
+              <a:buNone/>
+            </a:pPr>
+            <a:endParaRPr lang="nl-NL" sz="2000" dirty="0"/>
+          </a:p>
+          <a:p>
+            <a:pPr marL="0" indent="0">
+              <a:buNone/>
+            </a:pPr>
+            <a:r>
+              <a:rPr lang="nl-NL" sz="2000" dirty="0"/>
+              <a:t>Maar: waar vergelijk je mee?</a:t>
+            </a:r>
+            <a:endParaRPr lang="en-US" sz="2000" dirty="0"/>
+          </a:p>
+          <a:p>
+            <a:pPr>
+              <a:buFontTx/>
+              <a:buChar char="-"/>
+            </a:pPr>
+            <a:r>
+              <a:rPr lang="en-US" sz="2000" dirty="0" err="1"/>
+              <a:t>Kies</a:t>
+            </a:r>
+            <a:r>
+              <a:rPr lang="en-US" sz="2000" dirty="0"/>
+              <a:t> </a:t>
+            </a:r>
+            <a:r>
+              <a:rPr lang="en-US" sz="2000" dirty="0" err="1"/>
+              <a:t>altijd</a:t>
+            </a:r>
+            <a:r>
+              <a:rPr lang="en-US" sz="2000" dirty="0"/>
+              <a:t> </a:t>
+            </a:r>
+            <a:r>
+              <a:rPr lang="en-US" sz="2000" dirty="0" err="1"/>
+              <a:t>een</a:t>
+            </a:r>
+            <a:r>
+              <a:rPr lang="en-US" sz="2000" dirty="0"/>
+              <a:t> baseline model!</a:t>
+            </a:r>
+          </a:p>
+          <a:p>
+            <a:pPr>
+              <a:buFontTx/>
+              <a:buChar char="-"/>
+            </a:pPr>
+            <a:r>
+              <a:rPr lang="en-US" sz="2000" dirty="0" err="1"/>
+              <a:t>Gebruik</a:t>
+            </a:r>
+            <a:r>
+              <a:rPr lang="en-US" sz="2000" dirty="0"/>
+              <a:t> </a:t>
+            </a:r>
+            <a:r>
+              <a:rPr lang="en-US" sz="2000" dirty="0" err="1"/>
+              <a:t>een</a:t>
+            </a:r>
+            <a:r>
+              <a:rPr lang="en-US" sz="2000" dirty="0"/>
+              <a:t> </a:t>
+            </a:r>
+            <a:r>
+              <a:rPr lang="en-US" sz="2000" dirty="0" err="1"/>
+              <a:t>DummyRegressor</a:t>
+            </a:r>
+            <a:r>
+              <a:rPr lang="en-US" sz="2000" dirty="0"/>
+              <a:t> of </a:t>
+            </a:r>
+            <a:r>
+              <a:rPr lang="en-US" sz="2000" dirty="0" err="1"/>
+              <a:t>DummyClassifier</a:t>
+            </a:r>
+            <a:r>
+              <a:rPr lang="en-US" sz="2000" dirty="0"/>
+              <a:t>.</a:t>
+            </a:r>
+          </a:p>
+          <a:p>
+            <a:pPr marL="0" indent="0">
+              <a:buNone/>
+            </a:pPr>
+            <a:endParaRPr lang="nl-NL" sz="2000" dirty="0"/>
+          </a:p>
+          <a:p>
+            <a:pPr marL="0" indent="0">
+              <a:buNone/>
+            </a:pPr>
+            <a:r>
+              <a:rPr lang="en-US" sz="2000" dirty="0"/>
+              <a:t>Tot slot:</a:t>
+            </a:r>
+          </a:p>
+          <a:p>
+            <a:pPr>
+              <a:buFontTx/>
+              <a:buChar char="-"/>
+            </a:pPr>
+            <a:r>
+              <a:rPr lang="en-US" sz="2000" dirty="0" err="1"/>
+              <a:t>Valideer</a:t>
+            </a:r>
+            <a:r>
+              <a:rPr lang="en-US" sz="2000" dirty="0"/>
+              <a:t> of de </a:t>
+            </a:r>
+            <a:r>
+              <a:rPr lang="en-US" sz="2000" dirty="0" err="1"/>
+              <a:t>uitkomsten</a:t>
+            </a:r>
+            <a:r>
+              <a:rPr lang="en-US" sz="2000" dirty="0"/>
+              <a:t> </a:t>
+            </a:r>
+            <a:r>
+              <a:rPr lang="en-US" sz="2000" dirty="0" err="1"/>
+              <a:t>overeenkomen</a:t>
+            </a:r>
+            <a:r>
+              <a:rPr lang="en-US" sz="2000" dirty="0"/>
+              <a:t> met de </a:t>
+            </a:r>
+            <a:r>
+              <a:rPr lang="en-US" sz="2000" dirty="0" err="1"/>
+              <a:t>theorie</a:t>
+            </a:r>
+            <a:r>
+              <a:rPr lang="en-US" sz="2000" dirty="0"/>
+              <a:t>!</a:t>
+            </a:r>
+          </a:p>
+          <a:p>
+            <a:pPr marL="0" indent="0">
+              <a:buNone/>
+            </a:pPr>
+            <a:endParaRPr lang="nl-NL" sz="2000" dirty="0"/>
+          </a:p>
+        </p:txBody>
+      </p:sp>
+      <p:pic>
+        <p:nvPicPr>
+          <p:cNvPr id="11" name="Picture 10">
+            <a:extLst>
+              <a:ext uri="{FF2B5EF4-FFF2-40B4-BE49-F238E27FC236}">
+                <a16:creationId xmlns:a16="http://schemas.microsoft.com/office/drawing/2014/main" id="{5294E80B-3BA2-38FB-B257-7FFE439D227E}"/>
+              </a:ext>
+            </a:extLst>
+          </p:cNvPr>
+          <p:cNvPicPr>
+            <a:picLocks noChangeAspect="1"/>
+          </p:cNvPicPr>
+          <p:nvPr/>
+        </p:nvPicPr>
+        <p:blipFill>
+          <a:blip r:embed="rId2"/>
+          <a:stretch>
+            <a:fillRect/>
+          </a:stretch>
+        </p:blipFill>
+        <p:spPr>
+          <a:xfrm>
+            <a:off x="8727169" y="1035154"/>
+            <a:ext cx="2850566" cy="2779139"/>
+          </a:xfrm>
+          <a:prstGeom prst="rect">
+            <a:avLst/>
+          </a:prstGeom>
+        </p:spPr>
+      </p:pic>
+      <p:graphicFrame>
+        <p:nvGraphicFramePr>
+          <p:cNvPr id="12" name="Table 12">
+            <a:extLst>
+              <a:ext uri="{FF2B5EF4-FFF2-40B4-BE49-F238E27FC236}">
+                <a16:creationId xmlns:a16="http://schemas.microsoft.com/office/drawing/2014/main" id="{9032A68B-98A6-3019-038E-C9215620CE97}"/>
+              </a:ext>
+            </a:extLst>
+          </p:cNvPr>
+          <p:cNvGraphicFramePr>
+            <a:graphicFrameLocks noGrp="1"/>
+          </p:cNvGraphicFramePr>
+          <p:nvPr>
+            <p:extLst>
+              <p:ext uri="{D42A27DB-BD31-4B8C-83A1-F6EECF244321}">
+                <p14:modId xmlns:p14="http://schemas.microsoft.com/office/powerpoint/2010/main" val="2844657728"/>
+              </p:ext>
+            </p:extLst>
+          </p:nvPr>
+        </p:nvGraphicFramePr>
+        <p:xfrm>
+          <a:off x="8948058" y="4582537"/>
+          <a:ext cx="2537925" cy="1709144"/>
+        </p:xfrm>
+        <a:graphic>
+          <a:graphicData uri="http://schemas.openxmlformats.org/drawingml/2006/table">
+            <a:tbl>
+              <a:tblPr firstRow="1" bandRow="1">
+                <a:tableStyleId>{5940675A-B579-460E-94D1-54222C63F5DA}</a:tableStyleId>
+              </a:tblPr>
+              <a:tblGrid>
+                <a:gridCol w="447869">
+                  <a:extLst>
+                    <a:ext uri="{9D8B030D-6E8A-4147-A177-3AD203B41FA5}">
+                      <a16:colId xmlns:a16="http://schemas.microsoft.com/office/drawing/2014/main" val="842927131"/>
+                    </a:ext>
+                  </a:extLst>
+                </a:gridCol>
+                <a:gridCol w="1073020">
+                  <a:extLst>
+                    <a:ext uri="{9D8B030D-6E8A-4147-A177-3AD203B41FA5}">
+                      <a16:colId xmlns:a16="http://schemas.microsoft.com/office/drawing/2014/main" val="1663509690"/>
+                    </a:ext>
+                  </a:extLst>
+                </a:gridCol>
+                <a:gridCol w="1017036">
+                  <a:extLst>
+                    <a:ext uri="{9D8B030D-6E8A-4147-A177-3AD203B41FA5}">
+                      <a16:colId xmlns:a16="http://schemas.microsoft.com/office/drawing/2014/main" val="963932423"/>
+                    </a:ext>
+                  </a:extLst>
+                </a:gridCol>
+              </a:tblGrid>
+              <a:tr h="400010">
+                <a:tc>
+                  <a:txBody>
+                    <a:bodyPr/>
+                    <a:lstStyle/>
+                    <a:p>
+                      <a:pPr algn="ctr"/>
+                      <a:endParaRPr lang="nl-NL" dirty="0"/>
+                    </a:p>
+                  </a:txBody>
+                  <a:tcPr anchor="ctr"/>
+                </a:tc>
+                <a:tc>
+                  <a:txBody>
+                    <a:bodyPr/>
+                    <a:lstStyle/>
+                    <a:p>
+                      <a:pPr algn="ctr"/>
+                      <a:r>
+                        <a:rPr lang="en-US" dirty="0"/>
+                        <a:t>Y</a:t>
+                      </a:r>
+                      <a:endParaRPr lang="nl-NL" dirty="0"/>
+                    </a:p>
+                  </a:txBody>
+                  <a:tcPr anchor="ctr"/>
+                </a:tc>
+                <a:tc>
+                  <a:txBody>
+                    <a:bodyPr/>
+                    <a:lstStyle/>
+                    <a:p>
+                      <a:pPr algn="ctr"/>
+                      <a:r>
+                        <a:rPr lang="en-US" dirty="0"/>
+                        <a:t>N</a:t>
+                      </a:r>
+                      <a:endParaRPr lang="nl-NL" dirty="0"/>
+                    </a:p>
+                  </a:txBody>
+                  <a:tcPr anchor="ctr"/>
+                </a:tc>
+                <a:extLst>
+                  <a:ext uri="{0D108BD9-81ED-4DB2-BD59-A6C34878D82A}">
+                    <a16:rowId xmlns:a16="http://schemas.microsoft.com/office/drawing/2014/main" val="782275975"/>
+                  </a:ext>
+                </a:extLst>
+              </a:tr>
+              <a:tr h="654567">
+                <a:tc>
+                  <a:txBody>
+                    <a:bodyPr/>
+                    <a:lstStyle/>
+                    <a:p>
+                      <a:pPr algn="ctr"/>
+                      <a:r>
+                        <a:rPr lang="en-US" dirty="0"/>
+                        <a:t>Y</a:t>
+                      </a:r>
+                      <a:endParaRPr lang="nl-NL" dirty="0"/>
+                    </a:p>
+                  </a:txBody>
+                  <a:tcPr anchor="ctr"/>
+                </a:tc>
+                <a:tc>
+                  <a:txBody>
+                    <a:bodyPr/>
+                    <a:lstStyle/>
+                    <a:p>
+                      <a:pPr algn="ctr"/>
+                      <a:r>
+                        <a:rPr lang="en-US" dirty="0"/>
+                        <a:t>80</a:t>
+                      </a:r>
+                      <a:endParaRPr lang="nl-NL" dirty="0"/>
+                    </a:p>
+                  </a:txBody>
+                  <a:tcPr anchor="ctr">
+                    <a:solidFill>
+                      <a:schemeClr val="accent6">
+                        <a:lumMod val="40000"/>
+                        <a:lumOff val="60000"/>
+                      </a:schemeClr>
+                    </a:solidFill>
+                  </a:tcPr>
+                </a:tc>
+                <a:tc>
+                  <a:txBody>
+                    <a:bodyPr/>
+                    <a:lstStyle/>
+                    <a:p>
+                      <a:pPr algn="ctr"/>
+                      <a:r>
+                        <a:rPr lang="en-US" dirty="0"/>
+                        <a:t>5</a:t>
+                      </a:r>
+                      <a:endParaRPr lang="nl-NL" dirty="0"/>
+                    </a:p>
+                  </a:txBody>
+                  <a:tcPr anchor="ctr">
+                    <a:solidFill>
+                      <a:schemeClr val="accent2">
+                        <a:lumMod val="40000"/>
+                        <a:lumOff val="60000"/>
+                      </a:schemeClr>
+                    </a:solidFill>
+                  </a:tcPr>
+                </a:tc>
+                <a:extLst>
+                  <a:ext uri="{0D108BD9-81ED-4DB2-BD59-A6C34878D82A}">
+                    <a16:rowId xmlns:a16="http://schemas.microsoft.com/office/drawing/2014/main" val="393789912"/>
+                  </a:ext>
+                </a:extLst>
+              </a:tr>
+              <a:tr h="654567">
+                <a:tc>
+                  <a:txBody>
+                    <a:bodyPr/>
+                    <a:lstStyle/>
+                    <a:p>
+                      <a:pPr algn="ctr"/>
+                      <a:r>
+                        <a:rPr lang="en-US" dirty="0"/>
+                        <a:t>N</a:t>
+                      </a:r>
+                      <a:endParaRPr lang="nl-NL" dirty="0"/>
+                    </a:p>
+                  </a:txBody>
+                  <a:tcPr anchor="ctr"/>
+                </a:tc>
+                <a:tc>
+                  <a:txBody>
+                    <a:bodyPr/>
+                    <a:lstStyle/>
+                    <a:p>
+                      <a:pPr algn="ctr"/>
+                      <a:r>
+                        <a:rPr lang="en-US" dirty="0"/>
+                        <a:t>15</a:t>
+                      </a:r>
+                      <a:endParaRPr lang="nl-NL" dirty="0"/>
+                    </a:p>
+                  </a:txBody>
+                  <a:tcPr anchor="ctr">
+                    <a:solidFill>
+                      <a:schemeClr val="accent2">
+                        <a:lumMod val="40000"/>
+                        <a:lumOff val="60000"/>
+                      </a:schemeClr>
+                    </a:solidFill>
+                  </a:tcPr>
+                </a:tc>
+                <a:tc>
+                  <a:txBody>
+                    <a:bodyPr/>
+                    <a:lstStyle/>
+                    <a:p>
+                      <a:pPr algn="ctr"/>
+                      <a:r>
+                        <a:rPr lang="en-US" dirty="0"/>
+                        <a:t>400</a:t>
+                      </a:r>
+                      <a:endParaRPr lang="nl-NL" dirty="0"/>
+                    </a:p>
+                  </a:txBody>
+                  <a:tcPr anchor="ctr">
+                    <a:solidFill>
+                      <a:schemeClr val="accent6">
+                        <a:lumMod val="40000"/>
+                        <a:lumOff val="60000"/>
+                      </a:schemeClr>
+                    </a:solidFill>
+                  </a:tcPr>
+                </a:tc>
+                <a:extLst>
+                  <a:ext uri="{0D108BD9-81ED-4DB2-BD59-A6C34878D82A}">
+                    <a16:rowId xmlns:a16="http://schemas.microsoft.com/office/drawing/2014/main" val="780340197"/>
+                  </a:ext>
+                </a:extLst>
+              </a:tr>
+            </a:tbl>
+          </a:graphicData>
+        </a:graphic>
+      </p:graphicFrame>
+    </p:spTree>
+    <p:extLst>
+      <p:ext uri="{BB962C8B-B14F-4D97-AF65-F5344CB8AC3E}">
+        <p14:creationId xmlns:p14="http://schemas.microsoft.com/office/powerpoint/2010/main" val="2607966123"/>
+      </p:ext>
+    </p:extLst>
+  </p:cSld>
+  <p:clrMapOvr>
+    <a:masterClrMapping/>
+  </p:clrMapOvr>
+</p:sld>
+</file>
+
+<file path=ppt/slides/slide21.xml><?xml version="1.0" encoding="utf-8"?>
+<p:sld xmlns:a="http://schemas.openxmlformats.org/drawingml/2006/main" xmlns:r="http://schemas.openxmlformats.org/officeDocument/2006/relationships" xmlns:p="http://schemas.openxmlformats.org/presentationml/2006/main">
+  <p:cSld>
+    <p:spTree>
+      <p:nvGrpSpPr>
+        <p:cNvPr id="1" name=""/>
+        <p:cNvGrpSpPr/>
+        <p:nvPr/>
+      </p:nvGrpSpPr>
+      <p:grpSpPr>
+        <a:xfrm>
+          <a:off x="0" y="0"/>
+          <a:ext cx="0" cy="0"/>
+          <a:chOff x="0" y="0"/>
+          <a:chExt cx="0" cy="0"/>
+        </a:xfrm>
+      </p:grpSpPr>
+      <p:sp>
+        <p:nvSpPr>
+          <p:cNvPr id="4" name="Title 3">
+            <a:extLst>
+              <a:ext uri="{FF2B5EF4-FFF2-40B4-BE49-F238E27FC236}">
+                <a16:creationId xmlns:a16="http://schemas.microsoft.com/office/drawing/2014/main" id="{72C925CA-BCA3-3701-E08E-95652380B32E}"/>
+              </a:ext>
+            </a:extLst>
+          </p:cNvPr>
+          <p:cNvSpPr>
+            <a:spLocks noGrp="1"/>
+          </p:cNvSpPr>
+          <p:nvPr>
+            <p:ph type="title"/>
+          </p:nvPr>
+        </p:nvSpPr>
+        <p:spPr/>
+        <p:txBody>
+          <a:bodyPr/>
+          <a:lstStyle/>
+          <a:p>
+            <a:r>
+              <a:rPr lang="nl-NL" noProof="0" dirty="0"/>
+              <a:t>Selecteren</a:t>
+            </a:r>
+          </a:p>
+        </p:txBody>
+      </p:sp>
+      <p:sp>
+        <p:nvSpPr>
+          <p:cNvPr id="5" name="Text Placeholder 4">
+            <a:extLst>
+              <a:ext uri="{FF2B5EF4-FFF2-40B4-BE49-F238E27FC236}">
+                <a16:creationId xmlns:a16="http://schemas.microsoft.com/office/drawing/2014/main" id="{1AB31C95-91AF-DF13-FB58-0DA5F2D9F6F7}"/>
+              </a:ext>
+            </a:extLst>
+          </p:cNvPr>
+          <p:cNvSpPr>
+            <a:spLocks noGrp="1"/>
+          </p:cNvSpPr>
+          <p:nvPr>
+            <p:ph type="body" idx="1"/>
+          </p:nvPr>
+        </p:nvSpPr>
+        <p:spPr/>
+        <p:txBody>
+          <a:bodyPr/>
+          <a:lstStyle/>
+          <a:p>
+            <a:endParaRPr lang="en-NL"/>
+          </a:p>
+        </p:txBody>
+      </p:sp>
+    </p:spTree>
+    <p:extLst>
+      <p:ext uri="{BB962C8B-B14F-4D97-AF65-F5344CB8AC3E}">
+        <p14:creationId xmlns:p14="http://schemas.microsoft.com/office/powerpoint/2010/main" val="3009350591"/>
+      </p:ext>
+    </p:extLst>
+  </p:cSld>
+  <p:clrMapOvr>
+    <a:masterClrMapping/>
+  </p:clrMapOvr>
+</p:sld>
+</file>
+
+<file path=ppt/slides/slide22.xml><?xml version="1.0" encoding="utf-8"?>
+<p:sld xmlns:a="http://schemas.openxmlformats.org/drawingml/2006/main" xmlns:r="http://schemas.openxmlformats.org/officeDocument/2006/relationships" xmlns:p="http://schemas.openxmlformats.org/presentationml/2006/main">
+  <p:cSld>
+    <p:spTree>
+      <p:nvGrpSpPr>
+        <p:cNvPr id="1" name=""/>
+        <p:cNvGrpSpPr/>
+        <p:nvPr/>
+      </p:nvGrpSpPr>
+      <p:grpSpPr>
+        <a:xfrm>
+          <a:off x="0" y="0"/>
+          <a:ext cx="0" cy="0"/>
+          <a:chOff x="0" y="0"/>
+          <a:chExt cx="0" cy="0"/>
+        </a:xfrm>
+      </p:grpSpPr>
+      <p:sp>
+        <p:nvSpPr>
+          <p:cNvPr id="2" name="Title 1">
+            <a:extLst>
+              <a:ext uri="{FF2B5EF4-FFF2-40B4-BE49-F238E27FC236}">
+                <a16:creationId xmlns:a16="http://schemas.microsoft.com/office/drawing/2014/main" id="{39A1D606-8DD1-369C-5C09-471CDD551AD5}"/>
+              </a:ext>
+            </a:extLst>
+          </p:cNvPr>
+          <p:cNvSpPr>
+            <a:spLocks noGrp="1"/>
+          </p:cNvSpPr>
+          <p:nvPr>
+            <p:ph type="title"/>
+          </p:nvPr>
+        </p:nvSpPr>
+        <p:spPr>
+          <a:xfrm>
+            <a:off x="838200" y="365126"/>
+            <a:ext cx="10515600" cy="718608"/>
+          </a:xfrm>
+        </p:spPr>
+        <p:txBody>
+          <a:bodyPr>
+            <a:normAutofit/>
+          </a:bodyPr>
+          <a:lstStyle/>
+          <a:p>
+            <a:r>
+              <a:rPr lang="nl-NL" sz="3600" noProof="0" dirty="0"/>
+              <a:t>Valideren van een model</a:t>
+            </a:r>
+          </a:p>
+        </p:txBody>
+      </p:sp>
+      <p:sp>
+        <p:nvSpPr>
+          <p:cNvPr id="4" name="TextBox 3">
+            <a:extLst>
+              <a:ext uri="{FF2B5EF4-FFF2-40B4-BE49-F238E27FC236}">
+                <a16:creationId xmlns:a16="http://schemas.microsoft.com/office/drawing/2014/main" id="{B47EA95A-6DDD-ED89-357A-943A5BC87A94}"/>
+              </a:ext>
+            </a:extLst>
+          </p:cNvPr>
+          <p:cNvSpPr txBox="1"/>
+          <p:nvPr/>
+        </p:nvSpPr>
+        <p:spPr>
+          <a:xfrm>
+            <a:off x="6555232" y="2530561"/>
+            <a:ext cx="184731" cy="369332"/>
+          </a:xfrm>
+          <a:prstGeom prst="rect">
+            <a:avLst/>
+          </a:prstGeom>
+          <a:noFill/>
+        </p:spPr>
+        <p:txBody>
+          <a:bodyPr wrap="none" rtlCol="0">
+            <a:spAutoFit/>
+          </a:bodyPr>
+          <a:lstStyle/>
+          <a:p>
+            <a:endParaRPr lang="en-NL" dirty="0"/>
+          </a:p>
+        </p:txBody>
+      </p:sp>
+      <p:sp>
+        <p:nvSpPr>
+          <p:cNvPr id="9" name="Content Placeholder 2">
+            <a:extLst>
+              <a:ext uri="{FF2B5EF4-FFF2-40B4-BE49-F238E27FC236}">
+                <a16:creationId xmlns:a16="http://schemas.microsoft.com/office/drawing/2014/main" id="{859EFECF-ED02-A3B2-D77A-667F104FEDE5}"/>
+              </a:ext>
+            </a:extLst>
+          </p:cNvPr>
+          <p:cNvSpPr txBox="1">
+            <a:spLocks/>
+          </p:cNvSpPr>
+          <p:nvPr/>
+        </p:nvSpPr>
+        <p:spPr>
+          <a:xfrm>
+            <a:off x="990601" y="1608667"/>
+            <a:ext cx="6996403" cy="4720696"/>
+          </a:xfrm>
+          <a:prstGeom prst="rect">
+            <a:avLst/>
+          </a:prstGeom>
+        </p:spPr>
+        <p:txBody>
+          <a:bodyPr vert="horz" lIns="91440" tIns="45720" rIns="91440" bIns="45720" rtlCol="0">
+            <a:normAutofit/>
+          </a:bodyPr>
+          <a:lstStyle>
+            <a:lvl1pPr marL="228600" indent="-228600" algn="l" defTabSz="914400" rtl="0" eaLnBrk="1" latinLnBrk="0" hangingPunct="1">
+              <a:lnSpc>
+                <a:spcPct val="90000"/>
+              </a:lnSpc>
+              <a:spcBef>
+                <a:spcPts val="1000"/>
+              </a:spcBef>
+              <a:buFont typeface="Arial" panose="020B0604020202020204" pitchFamily="34" charset="0"/>
+              <a:buChar char="•"/>
+              <a:defRPr sz="2800" kern="1200">
+                <a:solidFill>
+                  <a:schemeClr val="tx1"/>
+                </a:solidFill>
+                <a:latin typeface="+mn-lt"/>
+                <a:ea typeface="+mn-ea"/>
+                <a:cs typeface="+mn-cs"/>
+              </a:defRPr>
+            </a:lvl1pPr>
+            <a:lvl2pPr marL="685800" indent="-228600" algn="l" defTabSz="914400" rtl="0" eaLnBrk="1" latinLnBrk="0" hangingPunct="1">
+              <a:lnSpc>
+                <a:spcPct val="90000"/>
+              </a:lnSpc>
+              <a:spcBef>
+                <a:spcPts val="500"/>
+              </a:spcBef>
+              <a:buFont typeface="Arial" panose="020B0604020202020204" pitchFamily="34" charset="0"/>
+              <a:buChar char="•"/>
+              <a:defRPr sz="2400" kern="1200">
+                <a:solidFill>
+                  <a:schemeClr val="tx1"/>
+                </a:solidFill>
+                <a:latin typeface="+mn-lt"/>
+                <a:ea typeface="+mn-ea"/>
+                <a:cs typeface="+mn-cs"/>
+              </a:defRPr>
+            </a:lvl2pPr>
+            <a:lvl3pPr marL="1143000" indent="-228600" algn="l" defTabSz="914400" rtl="0" eaLnBrk="1" latinLnBrk="0" hangingPunct="1">
+              <a:lnSpc>
+                <a:spcPct val="90000"/>
+              </a:lnSpc>
+              <a:spcBef>
+                <a:spcPts val="500"/>
+              </a:spcBef>
+              <a:buFont typeface="Arial" panose="020B0604020202020204" pitchFamily="34" charset="0"/>
+              <a:buChar char="•"/>
+              <a:defRPr sz="2000" kern="1200">
+                <a:solidFill>
+                  <a:schemeClr val="tx1"/>
+                </a:solidFill>
+                <a:latin typeface="+mn-lt"/>
+                <a:ea typeface="+mn-ea"/>
+                <a:cs typeface="+mn-cs"/>
+              </a:defRPr>
+            </a:lvl3pPr>
+            <a:lvl4pPr marL="1600200" indent="-228600" algn="l" defTabSz="914400" rtl="0" eaLnBrk="1" latinLnBrk="0" hangingPunct="1">
+              <a:lnSpc>
+                <a:spcPct val="90000"/>
+              </a:lnSpc>
+              <a:spcBef>
+                <a:spcPts val="500"/>
+              </a:spcBef>
+              <a:buFont typeface="Arial" panose="020B0604020202020204" pitchFamily="34" charset="0"/>
+              <a:buChar char="•"/>
+              <a:defRPr sz="1800" kern="1200">
+                <a:solidFill>
+                  <a:schemeClr val="tx1"/>
+                </a:solidFill>
+                <a:latin typeface="+mn-lt"/>
+                <a:ea typeface="+mn-ea"/>
+                <a:cs typeface="+mn-cs"/>
+              </a:defRPr>
+            </a:lvl4pPr>
+            <a:lvl5pPr marL="2057400" indent="-228600" algn="l" defTabSz="914400" rtl="0" eaLnBrk="1" latinLnBrk="0" hangingPunct="1">
+              <a:lnSpc>
+                <a:spcPct val="90000"/>
+              </a:lnSpc>
+              <a:spcBef>
+                <a:spcPts val="500"/>
+              </a:spcBef>
+              <a:buFont typeface="Arial" panose="020B0604020202020204" pitchFamily="34" charset="0"/>
+              <a:buChar char="•"/>
+              <a:defRPr sz="1800" kern="1200">
+                <a:solidFill>
+                  <a:schemeClr val="tx1"/>
+                </a:solidFill>
+                <a:latin typeface="+mn-lt"/>
+                <a:ea typeface="+mn-ea"/>
+                <a:cs typeface="+mn-cs"/>
+              </a:defRPr>
+            </a:lvl5pPr>
+            <a:lvl6pPr marL="2514600" indent="-228600" algn="l" defTabSz="914400" rtl="0" eaLnBrk="1" latinLnBrk="0" hangingPunct="1">
+              <a:lnSpc>
+                <a:spcPct val="90000"/>
+              </a:lnSpc>
+              <a:spcBef>
+                <a:spcPts val="500"/>
+              </a:spcBef>
+              <a:buFont typeface="Arial" panose="020B0604020202020204" pitchFamily="34" charset="0"/>
+              <a:buChar char="•"/>
+              <a:defRPr sz="1800" kern="1200">
+                <a:solidFill>
+                  <a:schemeClr val="tx1"/>
+                </a:solidFill>
+                <a:latin typeface="+mn-lt"/>
+                <a:ea typeface="+mn-ea"/>
+                <a:cs typeface="+mn-cs"/>
+              </a:defRPr>
+            </a:lvl6pPr>
+            <a:lvl7pPr marL="2971800" indent="-228600" algn="l" defTabSz="914400" rtl="0" eaLnBrk="1" latinLnBrk="0" hangingPunct="1">
+              <a:lnSpc>
+                <a:spcPct val="90000"/>
+              </a:lnSpc>
+              <a:spcBef>
+                <a:spcPts val="500"/>
+              </a:spcBef>
+              <a:buFont typeface="Arial" panose="020B0604020202020204" pitchFamily="34" charset="0"/>
+              <a:buChar char="•"/>
+              <a:defRPr sz="1800" kern="1200">
+                <a:solidFill>
+                  <a:schemeClr val="tx1"/>
+                </a:solidFill>
+                <a:latin typeface="+mn-lt"/>
+                <a:ea typeface="+mn-ea"/>
+                <a:cs typeface="+mn-cs"/>
+              </a:defRPr>
+            </a:lvl7pPr>
+            <a:lvl8pPr marL="3429000" indent="-228600" algn="l" defTabSz="914400" rtl="0" eaLnBrk="1" latinLnBrk="0" hangingPunct="1">
+              <a:lnSpc>
+                <a:spcPct val="90000"/>
+              </a:lnSpc>
+              <a:spcBef>
+                <a:spcPts val="500"/>
+              </a:spcBef>
+              <a:buFont typeface="Arial" panose="020B0604020202020204" pitchFamily="34" charset="0"/>
+              <a:buChar char="•"/>
+              <a:defRPr sz="1800" kern="1200">
+                <a:solidFill>
+                  <a:schemeClr val="tx1"/>
+                </a:solidFill>
+                <a:latin typeface="+mn-lt"/>
+                <a:ea typeface="+mn-ea"/>
+                <a:cs typeface="+mn-cs"/>
+              </a:defRPr>
+            </a:lvl8pPr>
+            <a:lvl9pPr marL="3886200" indent="-228600" algn="l" defTabSz="914400" rtl="0" eaLnBrk="1" latinLnBrk="0" hangingPunct="1">
+              <a:lnSpc>
+                <a:spcPct val="90000"/>
+              </a:lnSpc>
+              <a:spcBef>
+                <a:spcPts val="500"/>
+              </a:spcBef>
+              <a:buFont typeface="Arial" panose="020B0604020202020204" pitchFamily="34" charset="0"/>
+              <a:buChar char="•"/>
+              <a:defRPr sz="1800" kern="1200">
+                <a:solidFill>
+                  <a:schemeClr val="tx1"/>
+                </a:solidFill>
+                <a:latin typeface="+mn-lt"/>
+                <a:ea typeface="+mn-ea"/>
+                <a:cs typeface="+mn-cs"/>
+              </a:defRPr>
+            </a:lvl9pPr>
+          </a:lstStyle>
+          <a:p>
+            <a:pPr marL="0" indent="0">
+              <a:buNone/>
+            </a:pPr>
+            <a:r>
+              <a:rPr lang="en-US" sz="2000" dirty="0"/>
+              <a:t>Maten </a:t>
+            </a:r>
+            <a:r>
+              <a:rPr lang="en-US" sz="2000" dirty="0" err="1"/>
+              <a:t>voor</a:t>
+            </a:r>
+            <a:r>
+              <a:rPr lang="en-US" sz="2000" dirty="0"/>
+              <a:t> </a:t>
+            </a:r>
+            <a:r>
+              <a:rPr lang="en-US" sz="2000" dirty="0" err="1"/>
+              <a:t>kwaliteit</a:t>
+            </a:r>
+            <a:r>
+              <a:rPr lang="en-US" sz="2000" dirty="0"/>
+              <a:t> van </a:t>
+            </a:r>
+            <a:r>
+              <a:rPr lang="en-US" sz="2000" dirty="0" err="1"/>
+              <a:t>een</a:t>
+            </a:r>
+            <a:r>
+              <a:rPr lang="en-US" sz="2000" dirty="0"/>
+              <a:t> model:</a:t>
+            </a:r>
+          </a:p>
+          <a:p>
+            <a:pPr>
+              <a:buFontTx/>
+              <a:buChar char="-"/>
+            </a:pPr>
+            <a:r>
+              <a:rPr lang="en-US" sz="2000" dirty="0"/>
+              <a:t>Continue:	RMSE, mean absolute error, etc.</a:t>
+            </a:r>
+          </a:p>
+          <a:p>
+            <a:pPr>
+              <a:buFontTx/>
+              <a:buChar char="-"/>
+            </a:pPr>
+            <a:r>
+              <a:rPr lang="en-US" sz="2000" dirty="0" err="1"/>
+              <a:t>Categorisch</a:t>
+            </a:r>
+            <a:r>
+              <a:rPr lang="en-US" sz="2000" dirty="0"/>
+              <a:t>:	Accuracy, precision, recall, log loss, etc.</a:t>
+            </a:r>
+          </a:p>
+          <a:p>
+            <a:pPr marL="0" indent="0">
+              <a:buNone/>
+            </a:pPr>
+            <a:endParaRPr lang="nl-NL" sz="2000" dirty="0"/>
+          </a:p>
+          <a:p>
+            <a:pPr marL="0" indent="0">
+              <a:buNone/>
+            </a:pPr>
+            <a:r>
+              <a:rPr lang="nl-NL" sz="2000" dirty="0"/>
+              <a:t>Maar: waar vergelijk je mee?</a:t>
+            </a:r>
+            <a:endParaRPr lang="en-US" sz="2000" dirty="0"/>
+          </a:p>
+          <a:p>
+            <a:pPr>
+              <a:buFontTx/>
+              <a:buChar char="-"/>
+            </a:pPr>
+            <a:r>
+              <a:rPr lang="en-US" sz="2000" dirty="0" err="1"/>
+              <a:t>Kies</a:t>
+            </a:r>
+            <a:r>
+              <a:rPr lang="en-US" sz="2000" dirty="0"/>
+              <a:t> </a:t>
+            </a:r>
+            <a:r>
+              <a:rPr lang="en-US" sz="2000" dirty="0" err="1"/>
+              <a:t>altijd</a:t>
+            </a:r>
+            <a:r>
+              <a:rPr lang="en-US" sz="2000" dirty="0"/>
+              <a:t> </a:t>
+            </a:r>
+            <a:r>
+              <a:rPr lang="en-US" sz="2000" dirty="0" err="1"/>
+              <a:t>een</a:t>
+            </a:r>
+            <a:r>
+              <a:rPr lang="en-US" sz="2000" dirty="0"/>
+              <a:t> baseline model!</a:t>
+            </a:r>
+          </a:p>
+          <a:p>
+            <a:pPr>
+              <a:buFontTx/>
+              <a:buChar char="-"/>
+            </a:pPr>
+            <a:r>
+              <a:rPr lang="en-US" sz="2000" dirty="0" err="1"/>
+              <a:t>Gebruik</a:t>
+            </a:r>
+            <a:r>
+              <a:rPr lang="en-US" sz="2000" dirty="0"/>
+              <a:t> </a:t>
+            </a:r>
+            <a:r>
+              <a:rPr lang="en-US" sz="2000" dirty="0" err="1"/>
+              <a:t>een</a:t>
+            </a:r>
+            <a:r>
+              <a:rPr lang="en-US" sz="2000" dirty="0"/>
+              <a:t> </a:t>
+            </a:r>
+            <a:r>
+              <a:rPr lang="en-US" sz="2000" dirty="0" err="1"/>
+              <a:t>DummyRegressor</a:t>
+            </a:r>
+            <a:r>
+              <a:rPr lang="en-US" sz="2000" dirty="0"/>
+              <a:t> of </a:t>
+            </a:r>
+            <a:r>
+              <a:rPr lang="en-US" sz="2000" dirty="0" err="1"/>
+              <a:t>DummyClassifier</a:t>
+            </a:r>
+            <a:r>
+              <a:rPr lang="en-US" sz="2000" dirty="0"/>
+              <a:t>.</a:t>
+            </a:r>
+          </a:p>
+          <a:p>
+            <a:pPr marL="0" indent="0">
+              <a:buNone/>
+            </a:pPr>
+            <a:endParaRPr lang="nl-NL" sz="2000" dirty="0"/>
+          </a:p>
+          <a:p>
+            <a:pPr marL="0" indent="0">
+              <a:buNone/>
+            </a:pPr>
+            <a:r>
+              <a:rPr lang="en-US" sz="2000" dirty="0"/>
+              <a:t>Tot slot:</a:t>
+            </a:r>
+          </a:p>
+          <a:p>
+            <a:pPr>
+              <a:buFontTx/>
+              <a:buChar char="-"/>
+            </a:pPr>
+            <a:r>
+              <a:rPr lang="en-US" sz="2000" dirty="0" err="1"/>
+              <a:t>Valideer</a:t>
+            </a:r>
+            <a:r>
+              <a:rPr lang="en-US" sz="2000" dirty="0"/>
+              <a:t> of de </a:t>
+            </a:r>
+            <a:r>
+              <a:rPr lang="en-US" sz="2000" dirty="0" err="1"/>
+              <a:t>uitkomsten</a:t>
+            </a:r>
+            <a:r>
+              <a:rPr lang="en-US" sz="2000" dirty="0"/>
+              <a:t> </a:t>
+            </a:r>
+            <a:r>
+              <a:rPr lang="en-US" sz="2000" dirty="0" err="1"/>
+              <a:t>overeenkomen</a:t>
+            </a:r>
+            <a:r>
+              <a:rPr lang="en-US" sz="2000" dirty="0"/>
+              <a:t> met de </a:t>
+            </a:r>
+            <a:r>
+              <a:rPr lang="en-US" sz="2000" dirty="0" err="1"/>
+              <a:t>theorie</a:t>
+            </a:r>
+            <a:r>
+              <a:rPr lang="en-US" sz="2000" dirty="0"/>
+              <a:t>!</a:t>
+            </a:r>
+          </a:p>
+          <a:p>
+            <a:pPr marL="0" indent="0">
+              <a:buNone/>
+            </a:pPr>
+            <a:endParaRPr lang="nl-NL" sz="2000" dirty="0"/>
+          </a:p>
+        </p:txBody>
+      </p:sp>
+      <p:pic>
+        <p:nvPicPr>
+          <p:cNvPr id="11" name="Picture 10">
+            <a:extLst>
+              <a:ext uri="{FF2B5EF4-FFF2-40B4-BE49-F238E27FC236}">
+                <a16:creationId xmlns:a16="http://schemas.microsoft.com/office/drawing/2014/main" id="{5294E80B-3BA2-38FB-B257-7FFE439D227E}"/>
+              </a:ext>
+            </a:extLst>
+          </p:cNvPr>
+          <p:cNvPicPr>
+            <a:picLocks noChangeAspect="1"/>
+          </p:cNvPicPr>
+          <p:nvPr/>
+        </p:nvPicPr>
+        <p:blipFill>
+          <a:blip r:embed="rId2"/>
+          <a:stretch>
+            <a:fillRect/>
+          </a:stretch>
+        </p:blipFill>
+        <p:spPr>
+          <a:xfrm>
+            <a:off x="8727169" y="1035154"/>
+            <a:ext cx="2850566" cy="2779139"/>
+          </a:xfrm>
+          <a:prstGeom prst="rect">
+            <a:avLst/>
+          </a:prstGeom>
+        </p:spPr>
+      </p:pic>
+      <p:graphicFrame>
+        <p:nvGraphicFramePr>
+          <p:cNvPr id="12" name="Table 12">
+            <a:extLst>
+              <a:ext uri="{FF2B5EF4-FFF2-40B4-BE49-F238E27FC236}">
+                <a16:creationId xmlns:a16="http://schemas.microsoft.com/office/drawing/2014/main" id="{9032A68B-98A6-3019-038E-C9215620CE97}"/>
+              </a:ext>
+            </a:extLst>
+          </p:cNvPr>
+          <p:cNvGraphicFramePr>
+            <a:graphicFrameLocks noGrp="1"/>
+          </p:cNvGraphicFramePr>
+          <p:nvPr/>
+        </p:nvGraphicFramePr>
+        <p:xfrm>
+          <a:off x="8948058" y="4582537"/>
+          <a:ext cx="2537925" cy="1709144"/>
+        </p:xfrm>
+        <a:graphic>
+          <a:graphicData uri="http://schemas.openxmlformats.org/drawingml/2006/table">
+            <a:tbl>
+              <a:tblPr firstRow="1" bandRow="1">
+                <a:tableStyleId>{5940675A-B579-460E-94D1-54222C63F5DA}</a:tableStyleId>
+              </a:tblPr>
+              <a:tblGrid>
+                <a:gridCol w="447869">
+                  <a:extLst>
+                    <a:ext uri="{9D8B030D-6E8A-4147-A177-3AD203B41FA5}">
+                      <a16:colId xmlns:a16="http://schemas.microsoft.com/office/drawing/2014/main" val="842927131"/>
+                    </a:ext>
+                  </a:extLst>
+                </a:gridCol>
+                <a:gridCol w="1073020">
+                  <a:extLst>
+                    <a:ext uri="{9D8B030D-6E8A-4147-A177-3AD203B41FA5}">
+                      <a16:colId xmlns:a16="http://schemas.microsoft.com/office/drawing/2014/main" val="1663509690"/>
+                    </a:ext>
+                  </a:extLst>
+                </a:gridCol>
+                <a:gridCol w="1017036">
+                  <a:extLst>
+                    <a:ext uri="{9D8B030D-6E8A-4147-A177-3AD203B41FA5}">
+                      <a16:colId xmlns:a16="http://schemas.microsoft.com/office/drawing/2014/main" val="963932423"/>
+                    </a:ext>
+                  </a:extLst>
+                </a:gridCol>
+              </a:tblGrid>
+              <a:tr h="400010">
+                <a:tc>
+                  <a:txBody>
+                    <a:bodyPr/>
+                    <a:lstStyle/>
+                    <a:p>
+                      <a:pPr algn="ctr"/>
+                      <a:endParaRPr lang="nl-NL" dirty="0"/>
+                    </a:p>
+                  </a:txBody>
+                  <a:tcPr anchor="ctr"/>
+                </a:tc>
+                <a:tc>
+                  <a:txBody>
+                    <a:bodyPr/>
+                    <a:lstStyle/>
+                    <a:p>
+                      <a:pPr algn="ctr"/>
+                      <a:r>
+                        <a:rPr lang="en-US" dirty="0"/>
+                        <a:t>Y</a:t>
+                      </a:r>
+                      <a:endParaRPr lang="nl-NL" dirty="0"/>
+                    </a:p>
+                  </a:txBody>
+                  <a:tcPr anchor="ctr"/>
+                </a:tc>
+                <a:tc>
+                  <a:txBody>
+                    <a:bodyPr/>
+                    <a:lstStyle/>
+                    <a:p>
+                      <a:pPr algn="ctr"/>
+                      <a:r>
+                        <a:rPr lang="en-US" dirty="0"/>
+                        <a:t>N</a:t>
+                      </a:r>
+                      <a:endParaRPr lang="nl-NL" dirty="0"/>
+                    </a:p>
+                  </a:txBody>
+                  <a:tcPr anchor="ctr"/>
+                </a:tc>
+                <a:extLst>
+                  <a:ext uri="{0D108BD9-81ED-4DB2-BD59-A6C34878D82A}">
+                    <a16:rowId xmlns:a16="http://schemas.microsoft.com/office/drawing/2014/main" val="782275975"/>
+                  </a:ext>
+                </a:extLst>
+              </a:tr>
+              <a:tr h="654567">
+                <a:tc>
+                  <a:txBody>
+                    <a:bodyPr/>
+                    <a:lstStyle/>
+                    <a:p>
+                      <a:pPr algn="ctr"/>
+                      <a:r>
+                        <a:rPr lang="en-US" dirty="0"/>
+                        <a:t>Y</a:t>
+                      </a:r>
+                      <a:endParaRPr lang="nl-NL" dirty="0"/>
+                    </a:p>
+                  </a:txBody>
+                  <a:tcPr anchor="ctr"/>
+                </a:tc>
+                <a:tc>
+                  <a:txBody>
+                    <a:bodyPr/>
+                    <a:lstStyle/>
+                    <a:p>
+                      <a:pPr algn="ctr"/>
+                      <a:r>
+                        <a:rPr lang="en-US" dirty="0"/>
+                        <a:t>80</a:t>
+                      </a:r>
+                      <a:endParaRPr lang="nl-NL" dirty="0"/>
+                    </a:p>
+                  </a:txBody>
+                  <a:tcPr anchor="ctr">
+                    <a:solidFill>
+                      <a:schemeClr val="accent6">
+                        <a:lumMod val="40000"/>
+                        <a:lumOff val="60000"/>
+                      </a:schemeClr>
+                    </a:solidFill>
+                  </a:tcPr>
+                </a:tc>
+                <a:tc>
+                  <a:txBody>
+                    <a:bodyPr/>
+                    <a:lstStyle/>
+                    <a:p>
+                      <a:pPr algn="ctr"/>
+                      <a:r>
+                        <a:rPr lang="en-US" dirty="0"/>
+                        <a:t>5</a:t>
+                      </a:r>
+                      <a:endParaRPr lang="nl-NL" dirty="0"/>
+                    </a:p>
+                  </a:txBody>
+                  <a:tcPr anchor="ctr">
+                    <a:solidFill>
+                      <a:schemeClr val="accent2">
+                        <a:lumMod val="40000"/>
+                        <a:lumOff val="60000"/>
+                      </a:schemeClr>
+                    </a:solidFill>
+                  </a:tcPr>
+                </a:tc>
+                <a:extLst>
+                  <a:ext uri="{0D108BD9-81ED-4DB2-BD59-A6C34878D82A}">
+                    <a16:rowId xmlns:a16="http://schemas.microsoft.com/office/drawing/2014/main" val="393789912"/>
+                  </a:ext>
+                </a:extLst>
+              </a:tr>
+              <a:tr h="654567">
+                <a:tc>
+                  <a:txBody>
+                    <a:bodyPr/>
+                    <a:lstStyle/>
+                    <a:p>
+                      <a:pPr algn="ctr"/>
+                      <a:r>
+                        <a:rPr lang="en-US" dirty="0"/>
+                        <a:t>N</a:t>
+                      </a:r>
+                      <a:endParaRPr lang="nl-NL" dirty="0"/>
+                    </a:p>
+                  </a:txBody>
+                  <a:tcPr anchor="ctr"/>
+                </a:tc>
+                <a:tc>
+                  <a:txBody>
+                    <a:bodyPr/>
+                    <a:lstStyle/>
+                    <a:p>
+                      <a:pPr algn="ctr"/>
+                      <a:r>
+                        <a:rPr lang="en-US" dirty="0"/>
+                        <a:t>15</a:t>
+                      </a:r>
+                      <a:endParaRPr lang="nl-NL" dirty="0"/>
+                    </a:p>
+                  </a:txBody>
+                  <a:tcPr anchor="ctr">
+                    <a:solidFill>
+                      <a:schemeClr val="accent2">
+                        <a:lumMod val="40000"/>
+                        <a:lumOff val="60000"/>
+                      </a:schemeClr>
+                    </a:solidFill>
+                  </a:tcPr>
+                </a:tc>
+                <a:tc>
+                  <a:txBody>
+                    <a:bodyPr/>
+                    <a:lstStyle/>
+                    <a:p>
+                      <a:pPr algn="ctr"/>
+                      <a:r>
+                        <a:rPr lang="en-US" dirty="0"/>
+                        <a:t>400</a:t>
+                      </a:r>
+                      <a:endParaRPr lang="nl-NL" dirty="0"/>
+                    </a:p>
+                  </a:txBody>
+                  <a:tcPr anchor="ctr">
+                    <a:solidFill>
+                      <a:schemeClr val="accent6">
+                        <a:lumMod val="40000"/>
+                        <a:lumOff val="60000"/>
+                      </a:schemeClr>
+                    </a:solidFill>
+                  </a:tcPr>
+                </a:tc>
+                <a:extLst>
+                  <a:ext uri="{0D108BD9-81ED-4DB2-BD59-A6C34878D82A}">
+                    <a16:rowId xmlns:a16="http://schemas.microsoft.com/office/drawing/2014/main" val="780340197"/>
+                  </a:ext>
+                </a:extLst>
+              </a:tr>
+            </a:tbl>
+          </a:graphicData>
+        </a:graphic>
+      </p:graphicFrame>
+    </p:spTree>
+    <p:extLst>
+      <p:ext uri="{BB962C8B-B14F-4D97-AF65-F5344CB8AC3E}">
+        <p14:creationId xmlns:p14="http://schemas.microsoft.com/office/powerpoint/2010/main" val="2167907100"/>
+      </p:ext>
+    </p:extLst>
+  </p:cSld>
+  <p:clrMapOvr>
+    <a:masterClrMapping/>
+  </p:clrMapOvr>
+</p:sld>
+</file>
+
+<file path=ppt/slides/slide23.xml><?xml version="1.0" encoding="utf-8"?>
+<p:sld xmlns:a="http://schemas.openxmlformats.org/drawingml/2006/main" xmlns:r="http://schemas.openxmlformats.org/officeDocument/2006/relationships" xmlns:p="http://schemas.openxmlformats.org/presentationml/2006/main">
+  <p:cSld>
+    <p:spTree>
+      <p:nvGrpSpPr>
+        <p:cNvPr id="1" name=""/>
+        <p:cNvGrpSpPr/>
+        <p:nvPr/>
+      </p:nvGrpSpPr>
+      <p:grpSpPr>
+        <a:xfrm>
+          <a:off x="0" y="0"/>
+          <a:ext cx="0" cy="0"/>
+          <a:chOff x="0" y="0"/>
+          <a:chExt cx="0" cy="0"/>
+        </a:xfrm>
+      </p:grpSpPr>
+      <p:sp>
+        <p:nvSpPr>
+          <p:cNvPr id="4" name="Title 3">
+            <a:extLst>
+              <a:ext uri="{FF2B5EF4-FFF2-40B4-BE49-F238E27FC236}">
+                <a16:creationId xmlns:a16="http://schemas.microsoft.com/office/drawing/2014/main" id="{72C925CA-BCA3-3701-E08E-95652380B32E}"/>
+              </a:ext>
+            </a:extLst>
+          </p:cNvPr>
+          <p:cNvSpPr>
+            <a:spLocks noGrp="1"/>
+          </p:cNvSpPr>
+          <p:nvPr>
+            <p:ph type="title"/>
+          </p:nvPr>
+        </p:nvSpPr>
+        <p:spPr/>
+        <p:txBody>
+          <a:bodyPr/>
+          <a:lstStyle/>
+          <a:p>
+            <a:r>
+              <a:rPr lang="nl-NL" noProof="0" dirty="0"/>
+              <a:t>Natural Language Processing</a:t>
+            </a:r>
+          </a:p>
+        </p:txBody>
+      </p:sp>
+      <p:sp>
+        <p:nvSpPr>
+          <p:cNvPr id="5" name="Text Placeholder 4">
+            <a:extLst>
+              <a:ext uri="{FF2B5EF4-FFF2-40B4-BE49-F238E27FC236}">
+                <a16:creationId xmlns:a16="http://schemas.microsoft.com/office/drawing/2014/main" id="{1AB31C95-91AF-DF13-FB58-0DA5F2D9F6F7}"/>
+              </a:ext>
+            </a:extLst>
+          </p:cNvPr>
+          <p:cNvSpPr>
+            <a:spLocks noGrp="1"/>
+          </p:cNvSpPr>
+          <p:nvPr>
+            <p:ph type="body" idx="1"/>
+          </p:nvPr>
+        </p:nvSpPr>
+        <p:spPr/>
+        <p:txBody>
+          <a:bodyPr/>
+          <a:lstStyle/>
+          <a:p>
+            <a:endParaRPr lang="en-NL"/>
+          </a:p>
+        </p:txBody>
+      </p:sp>
+    </p:spTree>
+    <p:extLst>
+      <p:ext uri="{BB962C8B-B14F-4D97-AF65-F5344CB8AC3E}">
+        <p14:creationId xmlns:p14="http://schemas.microsoft.com/office/powerpoint/2010/main" val="2675372687"/>
+      </p:ext>
+    </p:extLst>
+  </p:cSld>
+  <p:clrMapOvr>
+    <a:masterClrMapping/>
+  </p:clrMapOvr>
+</p:sld>
+</file>
+
+<file path=ppt/slides/slide24.xml><?xml version="1.0" encoding="utf-8"?>
+<p:sld xmlns:a="http://schemas.openxmlformats.org/drawingml/2006/main" xmlns:r="http://schemas.openxmlformats.org/officeDocument/2006/relationships" xmlns:p="http://schemas.openxmlformats.org/presentationml/2006/main">
+  <p:cSld>
+    <p:spTree>
+      <p:nvGrpSpPr>
+        <p:cNvPr id="1" name=""/>
+        <p:cNvGrpSpPr/>
+        <p:nvPr/>
+      </p:nvGrpSpPr>
+      <p:grpSpPr>
+        <a:xfrm>
+          <a:off x="0" y="0"/>
+          <a:ext cx="0" cy="0"/>
+          <a:chOff x="0" y="0"/>
+          <a:chExt cx="0" cy="0"/>
+        </a:xfrm>
+      </p:grpSpPr>
+      <p:sp>
+        <p:nvSpPr>
+          <p:cNvPr id="2" name="Title 1">
+            <a:extLst>
+              <a:ext uri="{FF2B5EF4-FFF2-40B4-BE49-F238E27FC236}">
+                <a16:creationId xmlns:a16="http://schemas.microsoft.com/office/drawing/2014/main" id="{39A1D606-8DD1-369C-5C09-471CDD551AD5}"/>
+              </a:ext>
+            </a:extLst>
+          </p:cNvPr>
+          <p:cNvSpPr>
+            <a:spLocks noGrp="1"/>
+          </p:cNvSpPr>
+          <p:nvPr>
+            <p:ph type="title"/>
+          </p:nvPr>
+        </p:nvSpPr>
+        <p:spPr>
+          <a:xfrm>
+            <a:off x="838200" y="365126"/>
+            <a:ext cx="10515600" cy="718608"/>
+          </a:xfrm>
+        </p:spPr>
+        <p:txBody>
+          <a:bodyPr>
+            <a:normAutofit/>
+          </a:bodyPr>
+          <a:lstStyle/>
+          <a:p>
+            <a:r>
+              <a:rPr lang="nl-NL" sz="3600" noProof="0" dirty="0"/>
+              <a:t>Waar op te letten?</a:t>
+            </a:r>
+          </a:p>
+        </p:txBody>
+      </p:sp>
+      <p:sp>
+        <p:nvSpPr>
+          <p:cNvPr id="3" name="Content Placeholder 2">
+            <a:extLst>
+              <a:ext uri="{FF2B5EF4-FFF2-40B4-BE49-F238E27FC236}">
+                <a16:creationId xmlns:a16="http://schemas.microsoft.com/office/drawing/2014/main" id="{8F4C0E08-92A4-9F30-EF70-67DFBC8C5B8D}"/>
+              </a:ext>
+            </a:extLst>
+          </p:cNvPr>
+          <p:cNvSpPr>
+            <a:spLocks noGrp="1"/>
+          </p:cNvSpPr>
+          <p:nvPr>
+            <p:ph idx="1"/>
+          </p:nvPr>
+        </p:nvSpPr>
+        <p:spPr>
+          <a:xfrm>
+            <a:off x="838200" y="1456267"/>
+            <a:ext cx="9658865" cy="4720696"/>
+          </a:xfrm>
+        </p:spPr>
+        <p:txBody>
+          <a:bodyPr>
+            <a:normAutofit/>
+          </a:bodyPr>
+          <a:lstStyle/>
+          <a:p>
+            <a:pPr marL="0" indent="0">
+              <a:buNone/>
+            </a:pPr>
+            <a:r>
+              <a:rPr lang="nl-NL" sz="2000" b="1" noProof="0" dirty="0"/>
+              <a:t>Ken je data!</a:t>
+            </a:r>
+          </a:p>
+          <a:p>
+            <a:pPr>
+              <a:buFontTx/>
+              <a:buChar char="-"/>
+            </a:pPr>
+            <a:r>
+              <a:rPr lang="nl-NL" sz="2000" dirty="0"/>
+              <a:t>Data is belangrijkste sleutel voor succes!</a:t>
+            </a:r>
+          </a:p>
+          <a:p>
+            <a:pPr>
+              <a:buFontTx/>
+              <a:buChar char="-"/>
+            </a:pPr>
+            <a:r>
+              <a:rPr lang="nl-NL" sz="2000" dirty="0"/>
+              <a:t>Ken de achterliggende concepten en processen.</a:t>
+            </a:r>
+          </a:p>
+          <a:p>
+            <a:pPr marL="0" indent="0">
+              <a:buNone/>
+            </a:pPr>
+            <a:endParaRPr lang="nl-NL" sz="2000" b="1" noProof="0" dirty="0"/>
+          </a:p>
+          <a:p>
+            <a:pPr marL="0" indent="0">
+              <a:buNone/>
+            </a:pPr>
+            <a:r>
+              <a:rPr lang="nl-NL" sz="2000" b="1" dirty="0"/>
+              <a:t>Wat is het doel?</a:t>
+            </a:r>
+          </a:p>
+          <a:p>
+            <a:pPr>
+              <a:buFontTx/>
+              <a:buChar char="-"/>
+            </a:pPr>
+            <a:r>
+              <a:rPr lang="nl-NL" sz="2000" dirty="0"/>
+              <a:t>Wat wil men bereiken en wat is daarvoor belangrijk?</a:t>
+            </a:r>
+          </a:p>
+          <a:p>
+            <a:pPr>
+              <a:buFontTx/>
+              <a:buChar char="-"/>
+            </a:pPr>
+            <a:r>
+              <a:rPr lang="nl-NL" sz="2000" noProof="0" dirty="0"/>
+              <a:t>Accuratesse, geen fouten maken, uitlegbaarheid?</a:t>
+            </a:r>
+          </a:p>
+          <a:p>
+            <a:pPr>
+              <a:buFontTx/>
+              <a:buChar char="-"/>
+            </a:pPr>
+            <a:r>
+              <a:rPr lang="nl-NL" sz="2000" dirty="0"/>
+              <a:t>ML is niet altijd </a:t>
+            </a:r>
+            <a:r>
+              <a:rPr lang="nl-NL" sz="2000"/>
+              <a:t>de beste </a:t>
+            </a:r>
+            <a:r>
+              <a:rPr lang="nl-NL" sz="2000" dirty="0"/>
+              <a:t>optie…</a:t>
+            </a:r>
+          </a:p>
+          <a:p>
+            <a:pPr marL="0" indent="0">
+              <a:buNone/>
+            </a:pPr>
+            <a:endParaRPr lang="nl-NL" sz="2000" noProof="0" dirty="0"/>
+          </a:p>
+          <a:p>
+            <a:pPr marL="0" indent="0">
+              <a:buNone/>
+            </a:pPr>
+            <a:endParaRPr lang="nl-NL" sz="2000" noProof="0" dirty="0"/>
+          </a:p>
+          <a:p>
+            <a:pPr marL="0" indent="0">
+              <a:buNone/>
+            </a:pPr>
+            <a:endParaRPr lang="nl-NL" sz="2000" dirty="0"/>
+          </a:p>
+        </p:txBody>
+      </p:sp>
+    </p:spTree>
+    <p:extLst>
+      <p:ext uri="{BB962C8B-B14F-4D97-AF65-F5344CB8AC3E}">
+        <p14:creationId xmlns:p14="http://schemas.microsoft.com/office/powerpoint/2010/main" val="1542375319"/>
       </p:ext>
     </p:extLst>
   </p:cSld>

</xml_diff>

<commit_message>
Update python trainees regex slides
</commit_message>
<xml_diff>
--- a/python_trainees/4_scikit_learn/python_traineeship_4.pptx
+++ b/python_trainees/4_scikit_learn/python_traineeship_4.pptx
@@ -221,7 +221,7 @@
               <a:cs typeface="+mn-cs"/>
             </a:defRPr>
           </a:pPr>
-          <a:endParaRPr lang="nl-NL"/>
+          <a:endParaRPr lang="en-NL"/>
         </a:p>
       </c:txPr>
     </c:title>
@@ -400,7 +400,7 @@
                 <a:cs typeface="+mn-cs"/>
               </a:defRPr>
             </a:pPr>
-            <a:endParaRPr lang="nl-NL"/>
+            <a:endParaRPr lang="en-NL"/>
           </a:p>
         </c:txPr>
         <c:crossAx val="817693096"/>
@@ -459,7 +459,7 @@
                 <a:cs typeface="+mn-cs"/>
               </a:defRPr>
             </a:pPr>
-            <a:endParaRPr lang="nl-NL"/>
+            <a:endParaRPr lang="en-NL"/>
           </a:p>
         </c:txPr>
         <c:crossAx val="817693456"/>
@@ -501,7 +501,7 @@
       <a:pPr>
         <a:defRPr/>
       </a:pPr>
-      <a:endParaRPr lang="nl-NL"/>
+      <a:endParaRPr lang="en-NL"/>
     </a:p>
   </c:txPr>
   <c:externalData r:id="rId3">
@@ -1202,7 +1202,7 @@
           <a:p>
             <a:fld id="{5E9D55AD-DA6B-4A9D-BFE6-D0A1673E6EA9}" type="datetimeFigureOut">
               <a:rPr lang="en-NL" smtClean="0"/>
-              <a:t>20/04/2023</a:t>
+              <a:t>21/08/2023</a:t>
             </a:fld>
             <a:endParaRPr lang="en-NL"/>
           </a:p>
@@ -1402,7 +1402,7 @@
           <a:p>
             <a:fld id="{5E9D55AD-DA6B-4A9D-BFE6-D0A1673E6EA9}" type="datetimeFigureOut">
               <a:rPr lang="en-NL" smtClean="0"/>
-              <a:t>20/04/2023</a:t>
+              <a:t>21/08/2023</a:t>
             </a:fld>
             <a:endParaRPr lang="en-NL"/>
           </a:p>
@@ -1612,7 +1612,7 @@
           <a:p>
             <a:fld id="{5E9D55AD-DA6B-4A9D-BFE6-D0A1673E6EA9}" type="datetimeFigureOut">
               <a:rPr lang="en-NL" smtClean="0"/>
-              <a:t>20/04/2023</a:t>
+              <a:t>21/08/2023</a:t>
             </a:fld>
             <a:endParaRPr lang="en-NL"/>
           </a:p>
@@ -1812,7 +1812,7 @@
           <a:p>
             <a:fld id="{5E9D55AD-DA6B-4A9D-BFE6-D0A1673E6EA9}" type="datetimeFigureOut">
               <a:rPr lang="en-NL" smtClean="0"/>
-              <a:t>20/04/2023</a:t>
+              <a:t>21/08/2023</a:t>
             </a:fld>
             <a:endParaRPr lang="en-NL"/>
           </a:p>
@@ -2088,7 +2088,7 @@
           <a:p>
             <a:fld id="{5E9D55AD-DA6B-4A9D-BFE6-D0A1673E6EA9}" type="datetimeFigureOut">
               <a:rPr lang="en-NL" smtClean="0"/>
-              <a:t>20/04/2023</a:t>
+              <a:t>21/08/2023</a:t>
             </a:fld>
             <a:endParaRPr lang="en-NL"/>
           </a:p>
@@ -2356,7 +2356,7 @@
           <a:p>
             <a:fld id="{5E9D55AD-DA6B-4A9D-BFE6-D0A1673E6EA9}" type="datetimeFigureOut">
               <a:rPr lang="en-NL" smtClean="0"/>
-              <a:t>20/04/2023</a:t>
+              <a:t>21/08/2023</a:t>
             </a:fld>
             <a:endParaRPr lang="en-NL"/>
           </a:p>
@@ -2771,7 +2771,7 @@
           <a:p>
             <a:fld id="{5E9D55AD-DA6B-4A9D-BFE6-D0A1673E6EA9}" type="datetimeFigureOut">
               <a:rPr lang="en-NL" smtClean="0"/>
-              <a:t>20/04/2023</a:t>
+              <a:t>21/08/2023</a:t>
             </a:fld>
             <a:endParaRPr lang="en-NL"/>
           </a:p>
@@ -2913,7 +2913,7 @@
           <a:p>
             <a:fld id="{5E9D55AD-DA6B-4A9D-BFE6-D0A1673E6EA9}" type="datetimeFigureOut">
               <a:rPr lang="en-NL" smtClean="0"/>
-              <a:t>20/04/2023</a:t>
+              <a:t>21/08/2023</a:t>
             </a:fld>
             <a:endParaRPr lang="en-NL"/>
           </a:p>
@@ -3026,7 +3026,7 @@
           <a:p>
             <a:fld id="{5E9D55AD-DA6B-4A9D-BFE6-D0A1673E6EA9}" type="datetimeFigureOut">
               <a:rPr lang="en-NL" smtClean="0"/>
-              <a:t>20/04/2023</a:t>
+              <a:t>21/08/2023</a:t>
             </a:fld>
             <a:endParaRPr lang="en-NL"/>
           </a:p>
@@ -3339,7 +3339,7 @@
           <a:p>
             <a:fld id="{5E9D55AD-DA6B-4A9D-BFE6-D0A1673E6EA9}" type="datetimeFigureOut">
               <a:rPr lang="en-NL" smtClean="0"/>
-              <a:t>20/04/2023</a:t>
+              <a:t>21/08/2023</a:t>
             </a:fld>
             <a:endParaRPr lang="en-NL"/>
           </a:p>
@@ -3628,7 +3628,7 @@
           <a:p>
             <a:fld id="{5E9D55AD-DA6B-4A9D-BFE6-D0A1673E6EA9}" type="datetimeFigureOut">
               <a:rPr lang="en-NL" smtClean="0"/>
-              <a:t>20/04/2023</a:t>
+              <a:t>21/08/2023</a:t>
             </a:fld>
             <a:endParaRPr lang="en-NL"/>
           </a:p>
@@ -3871,7 +3871,7 @@
           <a:p>
             <a:fld id="{5E9D55AD-DA6B-4A9D-BFE6-D0A1673E6EA9}" type="datetimeFigureOut">
               <a:rPr lang="en-NL" smtClean="0"/>
-              <a:t>20/04/2023</a:t>
+              <a:t>21/08/2023</a:t>
             </a:fld>
             <a:endParaRPr lang="en-NL"/>
           </a:p>
@@ -25775,15 +25775,7 @@
             </a:pPr>
             <a:r>
               <a:rPr lang="nl-NL" sz="2000" dirty="0"/>
-              <a:t>Wat zijn de </a:t>
-            </a:r>
-            <a:r>
-              <a:rPr lang="nl-NL" sz="2000" dirty="0" err="1"/>
-              <a:t>hypothesese</a:t>
-            </a:r>
-            <a:r>
-              <a:rPr lang="nl-NL" sz="2000" dirty="0"/>
-              <a:t> en zijn ze meetbaar?</a:t>
+              <a:t>Wat zijn de hypothese en zijn ze meetbaar?</a:t>
             </a:r>
           </a:p>
           <a:p>

</xml_diff>

<commit_message>
Update Python trainees part 4 slides
</commit_message>
<xml_diff>
--- a/python_trainees/4_scikit_learn/python_traineeship_4.pptx
+++ b/python_trainees/4_scikit_learn/python_traineeship_4.pptx
@@ -4,6 +4,9 @@
   <p:sldMasterIdLst>
     <p:sldMasterId id="2147483648" r:id="rId1"/>
   </p:sldMasterIdLst>
+  <p:notesMasterIdLst>
+    <p:notesMasterId r:id="rId51"/>
+  </p:notesMasterIdLst>
   <p:sldIdLst>
     <p:sldId id="334" r:id="rId2"/>
     <p:sldId id="257" r:id="rId3"/>
@@ -237,7 +240,7 @@
               <a:cs typeface="+mn-cs"/>
             </a:defRPr>
           </a:pPr>
-          <a:endParaRPr lang="en-NL"/>
+          <a:endParaRPr lang="nl-NL"/>
         </a:p>
       </c:txPr>
     </c:title>
@@ -416,7 +419,7 @@
                 <a:cs typeface="+mn-cs"/>
               </a:defRPr>
             </a:pPr>
-            <a:endParaRPr lang="en-NL"/>
+            <a:endParaRPr lang="nl-NL"/>
           </a:p>
         </c:txPr>
         <c:crossAx val="817693096"/>
@@ -475,7 +478,7 @@
                 <a:cs typeface="+mn-cs"/>
               </a:defRPr>
             </a:pPr>
-            <a:endParaRPr lang="en-NL"/>
+            <a:endParaRPr lang="nl-NL"/>
           </a:p>
         </c:txPr>
         <c:crossAx val="817693456"/>
@@ -517,7 +520,7 @@
       <a:pPr>
         <a:defRPr/>
       </a:pPr>
-      <a:endParaRPr lang="en-NL"/>
+      <a:endParaRPr lang="nl-NL"/>
     </a:p>
   </c:txPr>
   <c:externalData r:id="rId3">
@@ -1069,6 +1072,620 @@
 </cs:chartStyle>
 </file>
 
+<file path=ppt/notesMasters/notesMaster1.xml><?xml version="1.0" encoding="utf-8"?>
+<p:notesMaster xmlns:a="http://schemas.openxmlformats.org/drawingml/2006/main" xmlns:r="http://schemas.openxmlformats.org/officeDocument/2006/relationships" xmlns:p="http://schemas.openxmlformats.org/presentationml/2006/main">
+  <p:cSld>
+    <p:bg>
+      <p:bgRef idx="1001">
+        <a:schemeClr val="bg1"/>
+      </p:bgRef>
+    </p:bg>
+    <p:spTree>
+      <p:nvGrpSpPr>
+        <p:cNvPr id="1" name=""/>
+        <p:cNvGrpSpPr/>
+        <p:nvPr/>
+      </p:nvGrpSpPr>
+      <p:grpSpPr>
+        <a:xfrm>
+          <a:off x="0" y="0"/>
+          <a:ext cx="0" cy="0"/>
+          <a:chOff x="0" y="0"/>
+          <a:chExt cx="0" cy="0"/>
+        </a:xfrm>
+      </p:grpSpPr>
+      <p:sp>
+        <p:nvSpPr>
+          <p:cNvPr id="2" name="Header Placeholder 1"/>
+          <p:cNvSpPr>
+            <a:spLocks noGrp="1"/>
+          </p:cNvSpPr>
+          <p:nvPr>
+            <p:ph type="hdr" sz="quarter"/>
+          </p:nvPr>
+        </p:nvSpPr>
+        <p:spPr>
+          <a:xfrm>
+            <a:off x="0" y="0"/>
+            <a:ext cx="2971800" cy="458788"/>
+          </a:xfrm>
+          <a:prstGeom prst="rect">
+            <a:avLst/>
+          </a:prstGeom>
+        </p:spPr>
+        <p:txBody>
+          <a:bodyPr vert="horz" lIns="91440" tIns="45720" rIns="91440" bIns="45720" rtlCol="0"/>
+          <a:lstStyle>
+            <a:lvl1pPr algn="l">
+              <a:defRPr sz="1200"/>
+            </a:lvl1pPr>
+          </a:lstStyle>
+          <a:p>
+            <a:endParaRPr lang="nl-NL"/>
+          </a:p>
+        </p:txBody>
+      </p:sp>
+      <p:sp>
+        <p:nvSpPr>
+          <p:cNvPr id="3" name="Date Placeholder 2"/>
+          <p:cNvSpPr>
+            <a:spLocks noGrp="1"/>
+          </p:cNvSpPr>
+          <p:nvPr>
+            <p:ph type="dt" idx="1"/>
+          </p:nvPr>
+        </p:nvSpPr>
+        <p:spPr>
+          <a:xfrm>
+            <a:off x="3884613" y="0"/>
+            <a:ext cx="2971800" cy="458788"/>
+          </a:xfrm>
+          <a:prstGeom prst="rect">
+            <a:avLst/>
+          </a:prstGeom>
+        </p:spPr>
+        <p:txBody>
+          <a:bodyPr vert="horz" lIns="91440" tIns="45720" rIns="91440" bIns="45720" rtlCol="0"/>
+          <a:lstStyle>
+            <a:lvl1pPr algn="r">
+              <a:defRPr sz="1200"/>
+            </a:lvl1pPr>
+          </a:lstStyle>
+          <a:p>
+            <a:fld id="{6F54D322-06CD-4C3F-9549-759BC5FDB94E}" type="datetimeFigureOut">
+              <a:rPr lang="nl-NL" smtClean="0"/>
+              <a:t>10-10-2023</a:t>
+            </a:fld>
+            <a:endParaRPr lang="nl-NL"/>
+          </a:p>
+        </p:txBody>
+      </p:sp>
+      <p:sp>
+        <p:nvSpPr>
+          <p:cNvPr id="4" name="Slide Image Placeholder 3"/>
+          <p:cNvSpPr>
+            <a:spLocks noGrp="1" noRot="1" noChangeAspect="1"/>
+          </p:cNvSpPr>
+          <p:nvPr>
+            <p:ph type="sldImg" idx="2"/>
+          </p:nvPr>
+        </p:nvSpPr>
+        <p:spPr>
+          <a:xfrm>
+            <a:off x="685800" y="1143000"/>
+            <a:ext cx="5486400" cy="3086100"/>
+          </a:xfrm>
+          <a:prstGeom prst="rect">
+            <a:avLst/>
+          </a:prstGeom>
+          <a:noFill/>
+          <a:ln w="12700">
+            <a:solidFill>
+              <a:prstClr val="black"/>
+            </a:solidFill>
+          </a:ln>
+        </p:spPr>
+        <p:txBody>
+          <a:bodyPr vert="horz" lIns="91440" tIns="45720" rIns="91440" bIns="45720" rtlCol="0" anchor="ctr"/>
+          <a:lstStyle/>
+          <a:p>
+            <a:endParaRPr lang="nl-NL"/>
+          </a:p>
+        </p:txBody>
+      </p:sp>
+      <p:sp>
+        <p:nvSpPr>
+          <p:cNvPr id="5" name="Notes Placeholder 4"/>
+          <p:cNvSpPr>
+            <a:spLocks noGrp="1"/>
+          </p:cNvSpPr>
+          <p:nvPr>
+            <p:ph type="body" sz="quarter" idx="3"/>
+          </p:nvPr>
+        </p:nvSpPr>
+        <p:spPr>
+          <a:xfrm>
+            <a:off x="685800" y="4400550"/>
+            <a:ext cx="5486400" cy="3600450"/>
+          </a:xfrm>
+          <a:prstGeom prst="rect">
+            <a:avLst/>
+          </a:prstGeom>
+        </p:spPr>
+        <p:txBody>
+          <a:bodyPr vert="horz" lIns="91440" tIns="45720" rIns="91440" bIns="45720" rtlCol="0"/>
+          <a:lstStyle/>
+          <a:p>
+            <a:pPr lvl="0"/>
+            <a:r>
+              <a:rPr lang="en-US"/>
+              <a:t>Click to edit Master text styles</a:t>
+            </a:r>
+          </a:p>
+          <a:p>
+            <a:pPr lvl="1"/>
+            <a:r>
+              <a:rPr lang="en-US"/>
+              <a:t>Second level</a:t>
+            </a:r>
+          </a:p>
+          <a:p>
+            <a:pPr lvl="2"/>
+            <a:r>
+              <a:rPr lang="en-US"/>
+              <a:t>Third level</a:t>
+            </a:r>
+          </a:p>
+          <a:p>
+            <a:pPr lvl="3"/>
+            <a:r>
+              <a:rPr lang="en-US"/>
+              <a:t>Fourth level</a:t>
+            </a:r>
+          </a:p>
+          <a:p>
+            <a:pPr lvl="4"/>
+            <a:r>
+              <a:rPr lang="en-US"/>
+              <a:t>Fifth level</a:t>
+            </a:r>
+            <a:endParaRPr lang="nl-NL"/>
+          </a:p>
+        </p:txBody>
+      </p:sp>
+      <p:sp>
+        <p:nvSpPr>
+          <p:cNvPr id="6" name="Footer Placeholder 5"/>
+          <p:cNvSpPr>
+            <a:spLocks noGrp="1"/>
+          </p:cNvSpPr>
+          <p:nvPr>
+            <p:ph type="ftr" sz="quarter" idx="4"/>
+          </p:nvPr>
+        </p:nvSpPr>
+        <p:spPr>
+          <a:xfrm>
+            <a:off x="0" y="8685213"/>
+            <a:ext cx="2971800" cy="458787"/>
+          </a:xfrm>
+          <a:prstGeom prst="rect">
+            <a:avLst/>
+          </a:prstGeom>
+        </p:spPr>
+        <p:txBody>
+          <a:bodyPr vert="horz" lIns="91440" tIns="45720" rIns="91440" bIns="45720" rtlCol="0" anchor="b"/>
+          <a:lstStyle>
+            <a:lvl1pPr algn="l">
+              <a:defRPr sz="1200"/>
+            </a:lvl1pPr>
+          </a:lstStyle>
+          <a:p>
+            <a:endParaRPr lang="nl-NL"/>
+          </a:p>
+        </p:txBody>
+      </p:sp>
+      <p:sp>
+        <p:nvSpPr>
+          <p:cNvPr id="7" name="Slide Number Placeholder 6"/>
+          <p:cNvSpPr>
+            <a:spLocks noGrp="1"/>
+          </p:cNvSpPr>
+          <p:nvPr>
+            <p:ph type="sldNum" sz="quarter" idx="5"/>
+          </p:nvPr>
+        </p:nvSpPr>
+        <p:spPr>
+          <a:xfrm>
+            <a:off x="3884613" y="8685213"/>
+            <a:ext cx="2971800" cy="458787"/>
+          </a:xfrm>
+          <a:prstGeom prst="rect">
+            <a:avLst/>
+          </a:prstGeom>
+        </p:spPr>
+        <p:txBody>
+          <a:bodyPr vert="horz" lIns="91440" tIns="45720" rIns="91440" bIns="45720" rtlCol="0" anchor="b"/>
+          <a:lstStyle>
+            <a:lvl1pPr algn="r">
+              <a:defRPr sz="1200"/>
+            </a:lvl1pPr>
+          </a:lstStyle>
+          <a:p>
+            <a:fld id="{E65DFEEA-F20E-4282-B486-E48C3273787F}" type="slidenum">
+              <a:rPr lang="nl-NL" smtClean="0"/>
+              <a:t>‹#›</a:t>
+            </a:fld>
+            <a:endParaRPr lang="nl-NL"/>
+          </a:p>
+        </p:txBody>
+      </p:sp>
+    </p:spTree>
+    <p:extLst>
+      <p:ext uri="{BB962C8B-B14F-4D97-AF65-F5344CB8AC3E}">
+        <p14:creationId xmlns:p14="http://schemas.microsoft.com/office/powerpoint/2010/main" val="2861073963"/>
+      </p:ext>
+    </p:extLst>
+  </p:cSld>
+  <p:clrMap bg1="lt1" tx1="dk1" bg2="lt2" tx2="dk2" accent1="accent1" accent2="accent2" accent3="accent3" accent4="accent4" accent5="accent5" accent6="accent6" hlink="hlink" folHlink="folHlink"/>
+  <p:notesStyle>
+    <a:lvl1pPr marL="0" algn="l" defTabSz="914400" rtl="0" eaLnBrk="1" latinLnBrk="0" hangingPunct="1">
+      <a:defRPr sz="1200" kern="1200">
+        <a:solidFill>
+          <a:schemeClr val="tx1"/>
+        </a:solidFill>
+        <a:latin typeface="+mn-lt"/>
+        <a:ea typeface="+mn-ea"/>
+        <a:cs typeface="+mn-cs"/>
+      </a:defRPr>
+    </a:lvl1pPr>
+    <a:lvl2pPr marL="457200" algn="l" defTabSz="914400" rtl="0" eaLnBrk="1" latinLnBrk="0" hangingPunct="1">
+      <a:defRPr sz="1200" kern="1200">
+        <a:solidFill>
+          <a:schemeClr val="tx1"/>
+        </a:solidFill>
+        <a:latin typeface="+mn-lt"/>
+        <a:ea typeface="+mn-ea"/>
+        <a:cs typeface="+mn-cs"/>
+      </a:defRPr>
+    </a:lvl2pPr>
+    <a:lvl3pPr marL="914400" algn="l" defTabSz="914400" rtl="0" eaLnBrk="1" latinLnBrk="0" hangingPunct="1">
+      <a:defRPr sz="1200" kern="1200">
+        <a:solidFill>
+          <a:schemeClr val="tx1"/>
+        </a:solidFill>
+        <a:latin typeface="+mn-lt"/>
+        <a:ea typeface="+mn-ea"/>
+        <a:cs typeface="+mn-cs"/>
+      </a:defRPr>
+    </a:lvl3pPr>
+    <a:lvl4pPr marL="1371600" algn="l" defTabSz="914400" rtl="0" eaLnBrk="1" latinLnBrk="0" hangingPunct="1">
+      <a:defRPr sz="1200" kern="1200">
+        <a:solidFill>
+          <a:schemeClr val="tx1"/>
+        </a:solidFill>
+        <a:latin typeface="+mn-lt"/>
+        <a:ea typeface="+mn-ea"/>
+        <a:cs typeface="+mn-cs"/>
+      </a:defRPr>
+    </a:lvl4pPr>
+    <a:lvl5pPr marL="1828800" algn="l" defTabSz="914400" rtl="0" eaLnBrk="1" latinLnBrk="0" hangingPunct="1">
+      <a:defRPr sz="1200" kern="1200">
+        <a:solidFill>
+          <a:schemeClr val="tx1"/>
+        </a:solidFill>
+        <a:latin typeface="+mn-lt"/>
+        <a:ea typeface="+mn-ea"/>
+        <a:cs typeface="+mn-cs"/>
+      </a:defRPr>
+    </a:lvl5pPr>
+    <a:lvl6pPr marL="2286000" algn="l" defTabSz="914400" rtl="0" eaLnBrk="1" latinLnBrk="0" hangingPunct="1">
+      <a:defRPr sz="1200" kern="1200">
+        <a:solidFill>
+          <a:schemeClr val="tx1"/>
+        </a:solidFill>
+        <a:latin typeface="+mn-lt"/>
+        <a:ea typeface="+mn-ea"/>
+        <a:cs typeface="+mn-cs"/>
+      </a:defRPr>
+    </a:lvl6pPr>
+    <a:lvl7pPr marL="2743200" algn="l" defTabSz="914400" rtl="0" eaLnBrk="1" latinLnBrk="0" hangingPunct="1">
+      <a:defRPr sz="1200" kern="1200">
+        <a:solidFill>
+          <a:schemeClr val="tx1"/>
+        </a:solidFill>
+        <a:latin typeface="+mn-lt"/>
+        <a:ea typeface="+mn-ea"/>
+        <a:cs typeface="+mn-cs"/>
+      </a:defRPr>
+    </a:lvl7pPr>
+    <a:lvl8pPr marL="3200400" algn="l" defTabSz="914400" rtl="0" eaLnBrk="1" latinLnBrk="0" hangingPunct="1">
+      <a:defRPr sz="1200" kern="1200">
+        <a:solidFill>
+          <a:schemeClr val="tx1"/>
+        </a:solidFill>
+        <a:latin typeface="+mn-lt"/>
+        <a:ea typeface="+mn-ea"/>
+        <a:cs typeface="+mn-cs"/>
+      </a:defRPr>
+    </a:lvl8pPr>
+    <a:lvl9pPr marL="3657600" algn="l" defTabSz="914400" rtl="0" eaLnBrk="1" latinLnBrk="0" hangingPunct="1">
+      <a:defRPr sz="1200" kern="1200">
+        <a:solidFill>
+          <a:schemeClr val="tx1"/>
+        </a:solidFill>
+        <a:latin typeface="+mn-lt"/>
+        <a:ea typeface="+mn-ea"/>
+        <a:cs typeface="+mn-cs"/>
+      </a:defRPr>
+    </a:lvl9pPr>
+  </p:notesStyle>
+</p:notesMaster>
+</file>
+
+<file path=ppt/notesSlides/notesSlide1.xml><?xml version="1.0" encoding="utf-8"?>
+<p:notes xmlns:a="http://schemas.openxmlformats.org/drawingml/2006/main" xmlns:r="http://schemas.openxmlformats.org/officeDocument/2006/relationships" xmlns:p="http://schemas.openxmlformats.org/presentationml/2006/main">
+  <p:cSld>
+    <p:spTree>
+      <p:nvGrpSpPr>
+        <p:cNvPr id="1" name=""/>
+        <p:cNvGrpSpPr/>
+        <p:nvPr/>
+      </p:nvGrpSpPr>
+      <p:grpSpPr>
+        <a:xfrm>
+          <a:off x="0" y="0"/>
+          <a:ext cx="0" cy="0"/>
+          <a:chOff x="0" y="0"/>
+          <a:chExt cx="0" cy="0"/>
+        </a:xfrm>
+      </p:grpSpPr>
+      <p:sp>
+        <p:nvSpPr>
+          <p:cNvPr id="2" name="Slide Image Placeholder 1"/>
+          <p:cNvSpPr>
+            <a:spLocks noGrp="1" noRot="1" noChangeAspect="1"/>
+          </p:cNvSpPr>
+          <p:nvPr>
+            <p:ph type="sldImg"/>
+          </p:nvPr>
+        </p:nvSpPr>
+        <p:spPr/>
+      </p:sp>
+      <p:sp>
+        <p:nvSpPr>
+          <p:cNvPr id="3" name="Notes Placeholder 2"/>
+          <p:cNvSpPr>
+            <a:spLocks noGrp="1"/>
+          </p:cNvSpPr>
+          <p:nvPr>
+            <p:ph type="body" idx="1"/>
+          </p:nvPr>
+        </p:nvSpPr>
+        <p:spPr/>
+        <p:txBody>
+          <a:bodyPr/>
+          <a:lstStyle/>
+          <a:p>
+            <a:r>
+              <a:rPr lang="en-US" dirty="0"/>
+              <a:t>1_transformers.ipynb</a:t>
+            </a:r>
+            <a:endParaRPr lang="nl-NL" dirty="0"/>
+          </a:p>
+        </p:txBody>
+      </p:sp>
+      <p:sp>
+        <p:nvSpPr>
+          <p:cNvPr id="4" name="Slide Number Placeholder 3"/>
+          <p:cNvSpPr>
+            <a:spLocks noGrp="1"/>
+          </p:cNvSpPr>
+          <p:nvPr>
+            <p:ph type="sldNum" sz="quarter" idx="5"/>
+          </p:nvPr>
+        </p:nvSpPr>
+        <p:spPr/>
+        <p:txBody>
+          <a:bodyPr/>
+          <a:lstStyle/>
+          <a:p>
+            <a:fld id="{E65DFEEA-F20E-4282-B486-E48C3273787F}" type="slidenum">
+              <a:rPr lang="nl-NL" smtClean="0"/>
+              <a:t>16</a:t>
+            </a:fld>
+            <a:endParaRPr lang="nl-NL"/>
+          </a:p>
+        </p:txBody>
+      </p:sp>
+    </p:spTree>
+    <p:extLst>
+      <p:ext uri="{BB962C8B-B14F-4D97-AF65-F5344CB8AC3E}">
+        <p14:creationId xmlns:p14="http://schemas.microsoft.com/office/powerpoint/2010/main" val="346737877"/>
+      </p:ext>
+    </p:extLst>
+  </p:cSld>
+  <p:clrMapOvr>
+    <a:masterClrMapping/>
+  </p:clrMapOvr>
+</p:notes>
+</file>
+
+<file path=ppt/notesSlides/notesSlide2.xml><?xml version="1.0" encoding="utf-8"?>
+<p:notes xmlns:a="http://schemas.openxmlformats.org/drawingml/2006/main" xmlns:r="http://schemas.openxmlformats.org/officeDocument/2006/relationships" xmlns:p="http://schemas.openxmlformats.org/presentationml/2006/main">
+  <p:cSld>
+    <p:spTree>
+      <p:nvGrpSpPr>
+        <p:cNvPr id="1" name=""/>
+        <p:cNvGrpSpPr/>
+        <p:nvPr/>
+      </p:nvGrpSpPr>
+      <p:grpSpPr>
+        <a:xfrm>
+          <a:off x="0" y="0"/>
+          <a:ext cx="0" cy="0"/>
+          <a:chOff x="0" y="0"/>
+          <a:chExt cx="0" cy="0"/>
+        </a:xfrm>
+      </p:grpSpPr>
+      <p:sp>
+        <p:nvSpPr>
+          <p:cNvPr id="2" name="Slide Image Placeholder 1"/>
+          <p:cNvSpPr>
+            <a:spLocks noGrp="1" noRot="1" noChangeAspect="1"/>
+          </p:cNvSpPr>
+          <p:nvPr>
+            <p:ph type="sldImg"/>
+          </p:nvPr>
+        </p:nvSpPr>
+        <p:spPr/>
+      </p:sp>
+      <p:sp>
+        <p:nvSpPr>
+          <p:cNvPr id="3" name="Notes Placeholder 2"/>
+          <p:cNvSpPr>
+            <a:spLocks noGrp="1"/>
+          </p:cNvSpPr>
+          <p:nvPr>
+            <p:ph type="body" idx="1"/>
+          </p:nvPr>
+        </p:nvSpPr>
+        <p:spPr/>
+        <p:txBody>
+          <a:bodyPr/>
+          <a:lstStyle/>
+          <a:p>
+            <a:r>
+              <a:rPr lang="en-US" dirty="0"/>
+              <a:t>2_modelling.ipynb</a:t>
+            </a:r>
+            <a:endParaRPr lang="nl-NL" dirty="0"/>
+          </a:p>
+        </p:txBody>
+      </p:sp>
+      <p:sp>
+        <p:nvSpPr>
+          <p:cNvPr id="4" name="Slide Number Placeholder 3"/>
+          <p:cNvSpPr>
+            <a:spLocks noGrp="1"/>
+          </p:cNvSpPr>
+          <p:nvPr>
+            <p:ph type="sldNum" sz="quarter" idx="5"/>
+          </p:nvPr>
+        </p:nvSpPr>
+        <p:spPr/>
+        <p:txBody>
+          <a:bodyPr/>
+          <a:lstStyle/>
+          <a:p>
+            <a:fld id="{E65DFEEA-F20E-4282-B486-E48C3273787F}" type="slidenum">
+              <a:rPr lang="nl-NL" smtClean="0"/>
+              <a:t>24</a:t>
+            </a:fld>
+            <a:endParaRPr lang="nl-NL"/>
+          </a:p>
+        </p:txBody>
+      </p:sp>
+    </p:spTree>
+    <p:extLst>
+      <p:ext uri="{BB962C8B-B14F-4D97-AF65-F5344CB8AC3E}">
+        <p14:creationId xmlns:p14="http://schemas.microsoft.com/office/powerpoint/2010/main" val="1120669651"/>
+      </p:ext>
+    </p:extLst>
+  </p:cSld>
+  <p:clrMapOvr>
+    <a:masterClrMapping/>
+  </p:clrMapOvr>
+</p:notes>
+</file>
+
+<file path=ppt/notesSlides/notesSlide3.xml><?xml version="1.0" encoding="utf-8"?>
+<p:notes xmlns:a="http://schemas.openxmlformats.org/drawingml/2006/main" xmlns:r="http://schemas.openxmlformats.org/officeDocument/2006/relationships" xmlns:p="http://schemas.openxmlformats.org/presentationml/2006/main">
+  <p:cSld>
+    <p:spTree>
+      <p:nvGrpSpPr>
+        <p:cNvPr id="1" name=""/>
+        <p:cNvGrpSpPr/>
+        <p:nvPr/>
+      </p:nvGrpSpPr>
+      <p:grpSpPr>
+        <a:xfrm>
+          <a:off x="0" y="0"/>
+          <a:ext cx="0" cy="0"/>
+          <a:chOff x="0" y="0"/>
+          <a:chExt cx="0" cy="0"/>
+        </a:xfrm>
+      </p:grpSpPr>
+      <p:sp>
+        <p:nvSpPr>
+          <p:cNvPr id="2" name="Slide Image Placeholder 1"/>
+          <p:cNvSpPr>
+            <a:spLocks noGrp="1" noRot="1" noChangeAspect="1"/>
+          </p:cNvSpPr>
+          <p:nvPr>
+            <p:ph type="sldImg"/>
+          </p:nvPr>
+        </p:nvSpPr>
+        <p:spPr/>
+      </p:sp>
+      <p:sp>
+        <p:nvSpPr>
+          <p:cNvPr id="3" name="Notes Placeholder 2"/>
+          <p:cNvSpPr>
+            <a:spLocks noGrp="1"/>
+          </p:cNvSpPr>
+          <p:nvPr>
+            <p:ph type="body" idx="1"/>
+          </p:nvPr>
+        </p:nvSpPr>
+        <p:spPr/>
+        <p:txBody>
+          <a:bodyPr/>
+          <a:lstStyle/>
+          <a:p>
+            <a:r>
+              <a:rPr lang="en-US" dirty="0"/>
+              <a:t>3_validation.ipynb</a:t>
+            </a:r>
+            <a:endParaRPr lang="nl-NL" dirty="0"/>
+          </a:p>
+        </p:txBody>
+      </p:sp>
+      <p:sp>
+        <p:nvSpPr>
+          <p:cNvPr id="4" name="Slide Number Placeholder 3"/>
+          <p:cNvSpPr>
+            <a:spLocks noGrp="1"/>
+          </p:cNvSpPr>
+          <p:nvPr>
+            <p:ph type="sldNum" sz="quarter" idx="5"/>
+          </p:nvPr>
+        </p:nvSpPr>
+        <p:spPr/>
+        <p:txBody>
+          <a:bodyPr/>
+          <a:lstStyle/>
+          <a:p>
+            <a:fld id="{E65DFEEA-F20E-4282-B486-E48C3273787F}" type="slidenum">
+              <a:rPr lang="nl-NL" smtClean="0"/>
+              <a:t>28</a:t>
+            </a:fld>
+            <a:endParaRPr lang="nl-NL"/>
+          </a:p>
+        </p:txBody>
+      </p:sp>
+    </p:spTree>
+    <p:extLst>
+      <p:ext uri="{BB962C8B-B14F-4D97-AF65-F5344CB8AC3E}">
+        <p14:creationId xmlns:p14="http://schemas.microsoft.com/office/powerpoint/2010/main" val="14703383"/>
+      </p:ext>
+    </p:extLst>
+  </p:cSld>
+  <p:clrMapOvr>
+    <a:masterClrMapping/>
+  </p:clrMapOvr>
+</p:notes>
+</file>
+
 <file path=ppt/slideLayouts/slideLayout1.xml><?xml version="1.0" encoding="utf-8"?>
 <p:sldLayout xmlns:a="http://schemas.openxmlformats.org/drawingml/2006/main" xmlns:r="http://schemas.openxmlformats.org/officeDocument/2006/relationships" xmlns:p="http://schemas.openxmlformats.org/presentationml/2006/main" type="title" preserve="1">
   <p:cSld name="Title Slide">
@@ -1218,7 +1835,7 @@
           <a:p>
             <a:fld id="{5E9D55AD-DA6B-4A9D-BFE6-D0A1673E6EA9}" type="datetimeFigureOut">
               <a:rPr lang="en-NL" smtClean="0"/>
-              <a:t>09/10/2023</a:t>
+              <a:t>10/10/2023</a:t>
             </a:fld>
             <a:endParaRPr lang="en-NL"/>
           </a:p>
@@ -1418,7 +2035,7 @@
           <a:p>
             <a:fld id="{5E9D55AD-DA6B-4A9D-BFE6-D0A1673E6EA9}" type="datetimeFigureOut">
               <a:rPr lang="en-NL" smtClean="0"/>
-              <a:t>09/10/2023</a:t>
+              <a:t>10/10/2023</a:t>
             </a:fld>
             <a:endParaRPr lang="en-NL"/>
           </a:p>
@@ -1628,7 +2245,7 @@
           <a:p>
             <a:fld id="{5E9D55AD-DA6B-4A9D-BFE6-D0A1673E6EA9}" type="datetimeFigureOut">
               <a:rPr lang="en-NL" smtClean="0"/>
-              <a:t>09/10/2023</a:t>
+              <a:t>10/10/2023</a:t>
             </a:fld>
             <a:endParaRPr lang="en-NL"/>
           </a:p>
@@ -1828,7 +2445,7 @@
           <a:p>
             <a:fld id="{5E9D55AD-DA6B-4A9D-BFE6-D0A1673E6EA9}" type="datetimeFigureOut">
               <a:rPr lang="en-NL" smtClean="0"/>
-              <a:t>09/10/2023</a:t>
+              <a:t>10/10/2023</a:t>
             </a:fld>
             <a:endParaRPr lang="en-NL"/>
           </a:p>
@@ -2104,7 +2721,7 @@
           <a:p>
             <a:fld id="{5E9D55AD-DA6B-4A9D-BFE6-D0A1673E6EA9}" type="datetimeFigureOut">
               <a:rPr lang="en-NL" smtClean="0"/>
-              <a:t>09/10/2023</a:t>
+              <a:t>10/10/2023</a:t>
             </a:fld>
             <a:endParaRPr lang="en-NL"/>
           </a:p>
@@ -2372,7 +2989,7 @@
           <a:p>
             <a:fld id="{5E9D55AD-DA6B-4A9D-BFE6-D0A1673E6EA9}" type="datetimeFigureOut">
               <a:rPr lang="en-NL" smtClean="0"/>
-              <a:t>09/10/2023</a:t>
+              <a:t>10/10/2023</a:t>
             </a:fld>
             <a:endParaRPr lang="en-NL"/>
           </a:p>
@@ -2787,7 +3404,7 @@
           <a:p>
             <a:fld id="{5E9D55AD-DA6B-4A9D-BFE6-D0A1673E6EA9}" type="datetimeFigureOut">
               <a:rPr lang="en-NL" smtClean="0"/>
-              <a:t>09/10/2023</a:t>
+              <a:t>10/10/2023</a:t>
             </a:fld>
             <a:endParaRPr lang="en-NL"/>
           </a:p>
@@ -2929,7 +3546,7 @@
           <a:p>
             <a:fld id="{5E9D55AD-DA6B-4A9D-BFE6-D0A1673E6EA9}" type="datetimeFigureOut">
               <a:rPr lang="en-NL" smtClean="0"/>
-              <a:t>09/10/2023</a:t>
+              <a:t>10/10/2023</a:t>
             </a:fld>
             <a:endParaRPr lang="en-NL"/>
           </a:p>
@@ -3042,7 +3659,7 @@
           <a:p>
             <a:fld id="{5E9D55AD-DA6B-4A9D-BFE6-D0A1673E6EA9}" type="datetimeFigureOut">
               <a:rPr lang="en-NL" smtClean="0"/>
-              <a:t>09/10/2023</a:t>
+              <a:t>10/10/2023</a:t>
             </a:fld>
             <a:endParaRPr lang="en-NL"/>
           </a:p>
@@ -3355,7 +3972,7 @@
           <a:p>
             <a:fld id="{5E9D55AD-DA6B-4A9D-BFE6-D0A1673E6EA9}" type="datetimeFigureOut">
               <a:rPr lang="en-NL" smtClean="0"/>
-              <a:t>09/10/2023</a:t>
+              <a:t>10/10/2023</a:t>
             </a:fld>
             <a:endParaRPr lang="en-NL"/>
           </a:p>
@@ -3644,7 +4261,7 @@
           <a:p>
             <a:fld id="{5E9D55AD-DA6B-4A9D-BFE6-D0A1673E6EA9}" type="datetimeFigureOut">
               <a:rPr lang="en-NL" smtClean="0"/>
-              <a:t>09/10/2023</a:t>
+              <a:t>10/10/2023</a:t>
             </a:fld>
             <a:endParaRPr lang="en-NL"/>
           </a:p>
@@ -3887,7 +4504,7 @@
           <a:p>
             <a:fld id="{5E9D55AD-DA6B-4A9D-BFE6-D0A1673E6EA9}" type="datetimeFigureOut">
               <a:rPr lang="en-NL" smtClean="0"/>
-              <a:t>09/10/2023</a:t>
+              <a:t>10/10/2023</a:t>
             </a:fld>
             <a:endParaRPr lang="en-NL"/>
           </a:p>
@@ -4327,13 +4944,8 @@
           <a:p>
             <a:r>
               <a:rPr lang="nl-NL" noProof="0" dirty="0"/>
-              <a:t>Python - </a:t>
-            </a:r>
-            <a:r>
-              <a:rPr lang="nl-NL" noProof="0" dirty="0" err="1"/>
-              <a:t>Traineeship</a:t>
-            </a:r>
-            <a:endParaRPr lang="nl-NL" noProof="0" dirty="0"/>
+              <a:t>Python - Cursus</a:t>
+            </a:r>
           </a:p>
         </p:txBody>
       </p:sp>
@@ -4360,15 +4972,7 @@
           <a:p>
             <a:r>
               <a:rPr lang="nl-NL" noProof="0" dirty="0"/>
-              <a:t>ACM / AFM / </a:t>
-            </a:r>
-            <a:r>
-              <a:rPr lang="nl-NL" noProof="0" dirty="0" err="1"/>
-              <a:t>NZa</a:t>
-            </a:r>
-            <a:r>
-              <a:rPr lang="nl-NL" noProof="0" dirty="0"/>
-              <a:t> - 2023</a:t>
+              <a:t>2023</a:t>
             </a:r>
           </a:p>
         </p:txBody>
@@ -15732,7 +16336,7 @@
             </a:pPr>
             <a:r>
               <a:rPr lang="nl-NL" sz="1800" dirty="0">
-                <a:hlinkClick r:id="rId2"/>
+                <a:hlinkClick r:id="rId3"/>
               </a:rPr>
               <a:t>https://scikit-learn.org/stable/modules/model_evaluation.html</a:t>
             </a:r>
@@ -17198,58 +17802,6 @@
               <a:rPr lang="nl-NL" sz="2000" dirty="0"/>
               <a:t>Test dataset:		Gebruikt voor accurate schatting prestaties.</a:t>
             </a:r>
-          </a:p>
-        </p:txBody>
-      </p:sp>
-      <p:sp>
-        <p:nvSpPr>
-          <p:cNvPr id="12" name="Oval 11">
-            <a:extLst>
-              <a:ext uri="{FF2B5EF4-FFF2-40B4-BE49-F238E27FC236}">
-                <a16:creationId xmlns:a16="http://schemas.microsoft.com/office/drawing/2014/main" id="{AD627D57-DAA1-66EB-04AD-B24ABD950046}"/>
-              </a:ext>
-            </a:extLst>
-          </p:cNvPr>
-          <p:cNvSpPr/>
-          <p:nvPr/>
-        </p:nvSpPr>
-        <p:spPr>
-          <a:xfrm>
-            <a:off x="9568542" y="6119948"/>
-            <a:ext cx="293915" cy="293915"/>
-          </a:xfrm>
-          <a:prstGeom prst="ellipse">
-            <a:avLst/>
-          </a:prstGeom>
-          <a:noFill/>
-          <a:ln>
-            <a:solidFill>
-              <a:srgbClr val="C00000"/>
-            </a:solidFill>
-          </a:ln>
-        </p:spPr>
-        <p:style>
-          <a:lnRef idx="2">
-            <a:schemeClr val="accent1">
-              <a:shade val="15000"/>
-            </a:schemeClr>
-          </a:lnRef>
-          <a:fillRef idx="1">
-            <a:schemeClr val="accent1"/>
-          </a:fillRef>
-          <a:effectRef idx="0">
-            <a:schemeClr val="accent1"/>
-          </a:effectRef>
-          <a:fontRef idx="minor">
-            <a:schemeClr val="lt1"/>
-          </a:fontRef>
-        </p:style>
-        <p:txBody>
-          <a:bodyPr rtlCol="0" anchor="ctr"/>
-          <a:lstStyle/>
-          <a:p>
-            <a:pPr algn="ctr"/>
-            <a:endParaRPr lang="en-NL"/>
           </a:p>
         </p:txBody>
       </p:sp>
@@ -32537,4 +33089,299 @@
     </a:ext>
   </a:extLst>
 </a:theme>
+</file>
+
+<file path=ppt/theme/theme2.xml><?xml version="1.0" encoding="utf-8"?>
+<a:theme xmlns:a="http://schemas.openxmlformats.org/drawingml/2006/main" name="Office Theme">
+  <a:themeElements>
+    <a:clrScheme name="Office">
+      <a:dk1>
+        <a:sysClr val="windowText" lastClr="000000"/>
+      </a:dk1>
+      <a:lt1>
+        <a:sysClr val="window" lastClr="FFFFFF"/>
+      </a:lt1>
+      <a:dk2>
+        <a:srgbClr val="44546A"/>
+      </a:dk2>
+      <a:lt2>
+        <a:srgbClr val="E7E6E6"/>
+      </a:lt2>
+      <a:accent1>
+        <a:srgbClr val="4472C4"/>
+      </a:accent1>
+      <a:accent2>
+        <a:srgbClr val="ED7D31"/>
+      </a:accent2>
+      <a:accent3>
+        <a:srgbClr val="A5A5A5"/>
+      </a:accent3>
+      <a:accent4>
+        <a:srgbClr val="FFC000"/>
+      </a:accent4>
+      <a:accent5>
+        <a:srgbClr val="5B9BD5"/>
+      </a:accent5>
+      <a:accent6>
+        <a:srgbClr val="70AD47"/>
+      </a:accent6>
+      <a:hlink>
+        <a:srgbClr val="0563C1"/>
+      </a:hlink>
+      <a:folHlink>
+        <a:srgbClr val="954F72"/>
+      </a:folHlink>
+    </a:clrScheme>
+    <a:fontScheme name="Office">
+      <a:majorFont>
+        <a:latin typeface="Calibri Light" panose="020F0302020204030204"/>
+        <a:ea typeface=""/>
+        <a:cs typeface=""/>
+        <a:font script="Jpan" typeface="游ゴシック Light"/>
+        <a:font script="Hang" typeface="맑은 고딕"/>
+        <a:font script="Hans" typeface="等线 Light"/>
+        <a:font script="Hant" typeface="新細明體"/>
+        <a:font script="Arab" typeface="Times New Roman"/>
+        <a:font script="Hebr" typeface="Times New Roman"/>
+        <a:font script="Thai" typeface="Angsana New"/>
+        <a:font script="Ethi" typeface="Nyala"/>
+        <a:font script="Beng" typeface="Vrinda"/>
+        <a:font script="Gujr" typeface="Shruti"/>
+        <a:font script="Khmr" typeface="MoolBoran"/>
+        <a:font script="Knda" typeface="Tunga"/>
+        <a:font script="Guru" typeface="Raavi"/>
+        <a:font script="Cans" typeface="Euphemia"/>
+        <a:font script="Cher" typeface="Plantagenet Cherokee"/>
+        <a:font script="Yiii" typeface="Microsoft Yi Baiti"/>
+        <a:font script="Tibt" typeface="Microsoft Himalaya"/>
+        <a:font script="Thaa" typeface="MV Boli"/>
+        <a:font script="Deva" typeface="Mangal"/>
+        <a:font script="Telu" typeface="Gautami"/>
+        <a:font script="Taml" typeface="Latha"/>
+        <a:font script="Syrc" typeface="Estrangelo Edessa"/>
+        <a:font script="Orya" typeface="Kalinga"/>
+        <a:font script="Mlym" typeface="Kartika"/>
+        <a:font script="Laoo" typeface="DokChampa"/>
+        <a:font script="Sinh" typeface="Iskoola Pota"/>
+        <a:font script="Mong" typeface="Mongolian Baiti"/>
+        <a:font script="Viet" typeface="Times New Roman"/>
+        <a:font script="Uigh" typeface="Microsoft Uighur"/>
+        <a:font script="Geor" typeface="Sylfaen"/>
+        <a:font script="Armn" typeface="Arial"/>
+        <a:font script="Bugi" typeface="Leelawadee UI"/>
+        <a:font script="Bopo" typeface="Microsoft JhengHei"/>
+        <a:font script="Java" typeface="Javanese Text"/>
+        <a:font script="Lisu" typeface="Segoe UI"/>
+        <a:font script="Mymr" typeface="Myanmar Text"/>
+        <a:font script="Nkoo" typeface="Ebrima"/>
+        <a:font script="Olck" typeface="Nirmala UI"/>
+        <a:font script="Osma" typeface="Ebrima"/>
+        <a:font script="Phag" typeface="Phagspa"/>
+        <a:font script="Syrn" typeface="Estrangelo Edessa"/>
+        <a:font script="Syrj" typeface="Estrangelo Edessa"/>
+        <a:font script="Syre" typeface="Estrangelo Edessa"/>
+        <a:font script="Sora" typeface="Nirmala UI"/>
+        <a:font script="Tale" typeface="Microsoft Tai Le"/>
+        <a:font script="Talu" typeface="Microsoft New Tai Lue"/>
+        <a:font script="Tfng" typeface="Ebrima"/>
+      </a:majorFont>
+      <a:minorFont>
+        <a:latin typeface="Calibri" panose="020F0502020204030204"/>
+        <a:ea typeface=""/>
+        <a:cs typeface=""/>
+        <a:font script="Jpan" typeface="游ゴシック"/>
+        <a:font script="Hang" typeface="맑은 고딕"/>
+        <a:font script="Hans" typeface="等线"/>
+        <a:font script="Hant" typeface="新細明體"/>
+        <a:font script="Arab" typeface="Arial"/>
+        <a:font script="Hebr" typeface="Arial"/>
+        <a:font script="Thai" typeface="Cordia New"/>
+        <a:font script="Ethi" typeface="Nyala"/>
+        <a:font script="Beng" typeface="Vrinda"/>
+        <a:font script="Gujr" typeface="Shruti"/>
+        <a:font script="Khmr" typeface="DaunPenh"/>
+        <a:font script="Knda" typeface="Tunga"/>
+        <a:font script="Guru" typeface="Raavi"/>
+        <a:font script="Cans" typeface="Euphemia"/>
+        <a:font script="Cher" typeface="Plantagenet Cherokee"/>
+        <a:font script="Yiii" typeface="Microsoft Yi Baiti"/>
+        <a:font script="Tibt" typeface="Microsoft Himalaya"/>
+        <a:font script="Thaa" typeface="MV Boli"/>
+        <a:font script="Deva" typeface="Mangal"/>
+        <a:font script="Telu" typeface="Gautami"/>
+        <a:font script="Taml" typeface="Latha"/>
+        <a:font script="Syrc" typeface="Estrangelo Edessa"/>
+        <a:font script="Orya" typeface="Kalinga"/>
+        <a:font script="Mlym" typeface="Kartika"/>
+        <a:font script="Laoo" typeface="DokChampa"/>
+        <a:font script="Sinh" typeface="Iskoola Pota"/>
+        <a:font script="Mong" typeface="Mongolian Baiti"/>
+        <a:font script="Viet" typeface="Arial"/>
+        <a:font script="Uigh" typeface="Microsoft Uighur"/>
+        <a:font script="Geor" typeface="Sylfaen"/>
+        <a:font script="Armn" typeface="Arial"/>
+        <a:font script="Bugi" typeface="Leelawadee UI"/>
+        <a:font script="Bopo" typeface="Microsoft JhengHei"/>
+        <a:font script="Java" typeface="Javanese Text"/>
+        <a:font script="Lisu" typeface="Segoe UI"/>
+        <a:font script="Mymr" typeface="Myanmar Text"/>
+        <a:font script="Nkoo" typeface="Ebrima"/>
+        <a:font script="Olck" typeface="Nirmala UI"/>
+        <a:font script="Osma" typeface="Ebrima"/>
+        <a:font script="Phag" typeface="Phagspa"/>
+        <a:font script="Syrn" typeface="Estrangelo Edessa"/>
+        <a:font script="Syrj" typeface="Estrangelo Edessa"/>
+        <a:font script="Syre" typeface="Estrangelo Edessa"/>
+        <a:font script="Sora" typeface="Nirmala UI"/>
+        <a:font script="Tale" typeface="Microsoft Tai Le"/>
+        <a:font script="Talu" typeface="Microsoft New Tai Lue"/>
+        <a:font script="Tfng" typeface="Ebrima"/>
+      </a:minorFont>
+    </a:fontScheme>
+    <a:fmtScheme name="Office">
+      <a:fillStyleLst>
+        <a:solidFill>
+          <a:schemeClr val="phClr"/>
+        </a:solidFill>
+        <a:gradFill rotWithShape="1">
+          <a:gsLst>
+            <a:gs pos="0">
+              <a:schemeClr val="phClr">
+                <a:lumMod val="110000"/>
+                <a:satMod val="105000"/>
+                <a:tint val="67000"/>
+              </a:schemeClr>
+            </a:gs>
+            <a:gs pos="50000">
+              <a:schemeClr val="phClr">
+                <a:lumMod val="105000"/>
+                <a:satMod val="103000"/>
+                <a:tint val="73000"/>
+              </a:schemeClr>
+            </a:gs>
+            <a:gs pos="100000">
+              <a:schemeClr val="phClr">
+                <a:lumMod val="105000"/>
+                <a:satMod val="109000"/>
+                <a:tint val="81000"/>
+              </a:schemeClr>
+            </a:gs>
+          </a:gsLst>
+          <a:lin ang="5400000" scaled="0"/>
+        </a:gradFill>
+        <a:gradFill rotWithShape="1">
+          <a:gsLst>
+            <a:gs pos="0">
+              <a:schemeClr val="phClr">
+                <a:satMod val="103000"/>
+                <a:lumMod val="102000"/>
+                <a:tint val="94000"/>
+              </a:schemeClr>
+            </a:gs>
+            <a:gs pos="50000">
+              <a:schemeClr val="phClr">
+                <a:satMod val="110000"/>
+                <a:lumMod val="100000"/>
+                <a:shade val="100000"/>
+              </a:schemeClr>
+            </a:gs>
+            <a:gs pos="100000">
+              <a:schemeClr val="phClr">
+                <a:lumMod val="99000"/>
+                <a:satMod val="120000"/>
+                <a:shade val="78000"/>
+              </a:schemeClr>
+            </a:gs>
+          </a:gsLst>
+          <a:lin ang="5400000" scaled="0"/>
+        </a:gradFill>
+      </a:fillStyleLst>
+      <a:lnStyleLst>
+        <a:ln w="6350" cap="flat" cmpd="sng" algn="ctr">
+          <a:solidFill>
+            <a:schemeClr val="phClr"/>
+          </a:solidFill>
+          <a:prstDash val="solid"/>
+          <a:miter lim="800000"/>
+        </a:ln>
+        <a:ln w="12700" cap="flat" cmpd="sng" algn="ctr">
+          <a:solidFill>
+            <a:schemeClr val="phClr"/>
+          </a:solidFill>
+          <a:prstDash val="solid"/>
+          <a:miter lim="800000"/>
+        </a:ln>
+        <a:ln w="19050" cap="flat" cmpd="sng" algn="ctr">
+          <a:solidFill>
+            <a:schemeClr val="phClr"/>
+          </a:solidFill>
+          <a:prstDash val="solid"/>
+          <a:miter lim="800000"/>
+        </a:ln>
+      </a:lnStyleLst>
+      <a:effectStyleLst>
+        <a:effectStyle>
+          <a:effectLst/>
+        </a:effectStyle>
+        <a:effectStyle>
+          <a:effectLst/>
+        </a:effectStyle>
+        <a:effectStyle>
+          <a:effectLst>
+            <a:outerShdw blurRad="57150" dist="19050" dir="5400000" algn="ctr" rotWithShape="0">
+              <a:srgbClr val="000000">
+                <a:alpha val="63000"/>
+              </a:srgbClr>
+            </a:outerShdw>
+          </a:effectLst>
+        </a:effectStyle>
+      </a:effectStyleLst>
+      <a:bgFillStyleLst>
+        <a:solidFill>
+          <a:schemeClr val="phClr"/>
+        </a:solidFill>
+        <a:solidFill>
+          <a:schemeClr val="phClr">
+            <a:tint val="95000"/>
+            <a:satMod val="170000"/>
+          </a:schemeClr>
+        </a:solidFill>
+        <a:gradFill rotWithShape="1">
+          <a:gsLst>
+            <a:gs pos="0">
+              <a:schemeClr val="phClr">
+                <a:tint val="93000"/>
+                <a:satMod val="150000"/>
+                <a:shade val="98000"/>
+                <a:lumMod val="102000"/>
+              </a:schemeClr>
+            </a:gs>
+            <a:gs pos="50000">
+              <a:schemeClr val="phClr">
+                <a:tint val="98000"/>
+                <a:satMod val="130000"/>
+                <a:shade val="90000"/>
+                <a:lumMod val="103000"/>
+              </a:schemeClr>
+            </a:gs>
+            <a:gs pos="100000">
+              <a:schemeClr val="phClr">
+                <a:shade val="63000"/>
+                <a:satMod val="120000"/>
+              </a:schemeClr>
+            </a:gs>
+          </a:gsLst>
+          <a:lin ang="5400000" scaled="0"/>
+        </a:gradFill>
+      </a:bgFillStyleLst>
+    </a:fmtScheme>
+  </a:themeElements>
+  <a:objectDefaults/>
+  <a:extraClrSchemeLst/>
+  <a:extLst>
+    <a:ext uri="{05A4C25C-085E-4340-85A3-A5531E510DB2}">
+      <thm15:themeFamily xmlns:thm15="http://schemas.microsoft.com/office/thememl/2012/main" name="Office Theme" id="{62F939B6-93AF-4DB8-9C6B-D6C7DFDC589F}" vid="{4A3C46E8-61CC-4603-A589-7422A47A8E4A}"/>
+    </a:ext>
+  </a:extLst>
+</a:theme>
 </file>
</xml_diff>